<commit_message>
Added more dat files and scripts
</commit_message>
<xml_diff>
--- a/Thesis/matlab_code/Simulation_files_and_curves.pptx
+++ b/Thesis/matlab_code/Simulation_files_and_curves.pptx
@@ -12,10 +12,26 @@
     <p:sldId id="259" r:id="rId7"/>
     <p:sldId id="260" r:id="rId8"/>
     <p:sldId id="261" r:id="rId9"/>
+    <p:sldId id="262" r:id="rId10"/>
   </p:sldIdLst>
   <p:sldSz cx="12192000" cy="6858000"/>
   <p:notesSz cx="7772400" cy="10058400"/>
 </p:presentation>
+</file>
+
+<file path=ppt/commentAuthors.xml><?xml version="1.0" encoding="utf-8"?>
+<p:cmAuthorLst xmlns:p="http://schemas.openxmlformats.org/presentationml/2006/main">
+  <p:cmAuthor id="0" name="" initials="" lastIdx="1" clrIdx="0"/>
+</p:cmAuthorLst>
+</file>
+
+<file path=ppt/comments/comment3.xml><?xml version="1.0" encoding="utf-8"?>
+<p:cmLst xmlns:p="http://schemas.openxmlformats.org/presentationml/2006/main">
+  <p:cm authorId="0" dt="2019-01-21T18:08:48.000000000" idx="1">
+    <p:pos x="0" y="0"/>
+    <p:text>Fixed fresnel_am_tf_s function, looked at if air on the bottom plays a role, it does not, see model_with_air_under_sub.m</p:text>
+  </p:cm>
+</p:cmLst>
 </file>
 
 <file path=ppt/slideLayouts/slideLayout1.xml><?xml version="1.0" encoding="utf-8"?>
@@ -59,7 +75,7 @@
       </p:grpSpPr>
       <p:sp>
         <p:nvSpPr>
-          <p:cNvPr id="26" name="PlaceHolder 1"/>
+          <p:cNvPr id="23" name="PlaceHolder 1"/>
           <p:cNvSpPr>
             <a:spLocks noGrp="1"/>
           </p:cNvSpPr>
@@ -79,13 +95,14 @@
         <p:txBody>
           <a:bodyPr lIns="0" rIns="0" tIns="0" bIns="0" anchor="ctr"/>
           <a:p>
-            <a:endParaRPr/>
-          </a:p>
-        </p:txBody>
-      </p:sp>
-      <p:sp>
-        <p:nvSpPr>
-          <p:cNvPr id="27" name="PlaceHolder 2"/>
+            <a:pPr algn="ctr"/>
+            <a:endParaRPr/>
+          </a:p>
+        </p:txBody>
+      </p:sp>
+      <p:sp>
+        <p:nvSpPr>
+          <p:cNvPr id="24" name="PlaceHolder 2"/>
           <p:cNvSpPr>
             <a:spLocks noGrp="1"/>
           </p:cNvSpPr>
@@ -111,7 +128,7 @@
       </p:sp>
       <p:sp>
         <p:nvSpPr>
-          <p:cNvPr id="28" name="PlaceHolder 3"/>
+          <p:cNvPr id="25" name="PlaceHolder 3"/>
           <p:cNvSpPr>
             <a:spLocks noGrp="1"/>
           </p:cNvSpPr>
@@ -159,7 +176,7 @@
       </p:grpSpPr>
       <p:sp>
         <p:nvSpPr>
-          <p:cNvPr id="29" name="PlaceHolder 1"/>
+          <p:cNvPr id="26" name="PlaceHolder 1"/>
           <p:cNvSpPr>
             <a:spLocks noGrp="1"/>
           </p:cNvSpPr>
@@ -179,13 +196,14 @@
         <p:txBody>
           <a:bodyPr lIns="0" rIns="0" tIns="0" bIns="0" anchor="ctr"/>
           <a:p>
-            <a:endParaRPr/>
-          </a:p>
-        </p:txBody>
-      </p:sp>
-      <p:sp>
-        <p:nvSpPr>
-          <p:cNvPr id="30" name="PlaceHolder 2"/>
+            <a:pPr algn="ctr"/>
+            <a:endParaRPr/>
+          </a:p>
+        </p:txBody>
+      </p:sp>
+      <p:sp>
+        <p:nvSpPr>
+          <p:cNvPr id="27" name="PlaceHolder 2"/>
           <p:cNvSpPr>
             <a:spLocks noGrp="1"/>
           </p:cNvSpPr>
@@ -211,7 +229,7 @@
       </p:sp>
       <p:sp>
         <p:nvSpPr>
-          <p:cNvPr id="31" name="PlaceHolder 3"/>
+          <p:cNvPr id="28" name="PlaceHolder 3"/>
           <p:cNvSpPr>
             <a:spLocks noGrp="1"/>
           </p:cNvSpPr>
@@ -237,7 +255,7 @@
       </p:sp>
       <p:sp>
         <p:nvSpPr>
-          <p:cNvPr id="32" name="PlaceHolder 4"/>
+          <p:cNvPr id="29" name="PlaceHolder 4"/>
           <p:cNvSpPr>
             <a:spLocks noGrp="1"/>
           </p:cNvSpPr>
@@ -263,7 +281,7 @@
       </p:sp>
       <p:sp>
         <p:nvSpPr>
-          <p:cNvPr id="33" name="PlaceHolder 5"/>
+          <p:cNvPr id="30" name="PlaceHolder 5"/>
           <p:cNvSpPr>
             <a:spLocks noGrp="1"/>
           </p:cNvSpPr>
@@ -311,7 +329,7 @@
       </p:grpSpPr>
       <p:sp>
         <p:nvSpPr>
-          <p:cNvPr id="34" name="PlaceHolder 1"/>
+          <p:cNvPr id="31" name="PlaceHolder 1"/>
           <p:cNvSpPr>
             <a:spLocks noGrp="1"/>
           </p:cNvSpPr>
@@ -331,13 +349,14 @@
         <p:txBody>
           <a:bodyPr lIns="0" rIns="0" tIns="0" bIns="0" anchor="ctr"/>
           <a:p>
-            <a:endParaRPr/>
-          </a:p>
-        </p:txBody>
-      </p:sp>
-      <p:sp>
-        <p:nvSpPr>
-          <p:cNvPr id="35" name="PlaceHolder 2"/>
+            <a:pPr algn="ctr"/>
+            <a:endParaRPr/>
+          </a:p>
+        </p:txBody>
+      </p:sp>
+      <p:sp>
+        <p:nvSpPr>
+          <p:cNvPr id="32" name="PlaceHolder 2"/>
           <p:cNvSpPr>
             <a:spLocks noGrp="1"/>
           </p:cNvSpPr>
@@ -363,7 +382,7 @@
       </p:sp>
       <p:sp>
         <p:nvSpPr>
-          <p:cNvPr id="36" name="PlaceHolder 3"/>
+          <p:cNvPr id="33" name="PlaceHolder 3"/>
           <p:cNvSpPr>
             <a:spLocks noGrp="1"/>
           </p:cNvSpPr>
@@ -389,7 +408,7 @@
       </p:sp>
       <p:pic>
         <p:nvPicPr>
-          <p:cNvPr id="37" name="" descr=""/>
+          <p:cNvPr id="34" name="" descr=""/>
           <p:cNvPicPr/>
           <p:nvPr/>
         </p:nvPicPr>
@@ -414,7 +433,7 @@
       </p:pic>
       <p:pic>
         <p:nvPicPr>
-          <p:cNvPr id="38" name="" descr=""/>
+          <p:cNvPr id="35" name="" descr=""/>
           <p:cNvPicPr/>
           <p:nvPr/>
         </p:nvPicPr>
@@ -483,7 +502,7 @@
       </p:grpSpPr>
       <p:sp>
         <p:nvSpPr>
-          <p:cNvPr id="44" name="PlaceHolder 1"/>
+          <p:cNvPr id="38" name="PlaceHolder 1"/>
           <p:cNvSpPr>
             <a:spLocks noGrp="1"/>
           </p:cNvSpPr>
@@ -503,13 +522,14 @@
         <p:txBody>
           <a:bodyPr lIns="0" rIns="0" tIns="0" bIns="0" anchor="ctr"/>
           <a:p>
-            <a:endParaRPr/>
-          </a:p>
-        </p:txBody>
-      </p:sp>
-      <p:sp>
-        <p:nvSpPr>
-          <p:cNvPr id="45" name="PlaceHolder 2"/>
+            <a:pPr algn="ctr"/>
+            <a:endParaRPr/>
+          </a:p>
+        </p:txBody>
+      </p:sp>
+      <p:sp>
+        <p:nvSpPr>
+          <p:cNvPr id="39" name="PlaceHolder 2"/>
           <p:cNvSpPr>
             <a:spLocks noGrp="1"/>
           </p:cNvSpPr>
@@ -558,7 +578,7 @@
       </p:grpSpPr>
       <p:sp>
         <p:nvSpPr>
-          <p:cNvPr id="46" name="PlaceHolder 1"/>
+          <p:cNvPr id="40" name="PlaceHolder 1"/>
           <p:cNvSpPr>
             <a:spLocks noGrp="1"/>
           </p:cNvSpPr>
@@ -578,13 +598,14 @@
         <p:txBody>
           <a:bodyPr lIns="0" rIns="0" tIns="0" bIns="0" anchor="ctr"/>
           <a:p>
-            <a:endParaRPr/>
-          </a:p>
-        </p:txBody>
-      </p:sp>
-      <p:sp>
-        <p:nvSpPr>
-          <p:cNvPr id="47" name="PlaceHolder 2"/>
+            <a:pPr algn="ctr"/>
+            <a:endParaRPr/>
+          </a:p>
+        </p:txBody>
+      </p:sp>
+      <p:sp>
+        <p:nvSpPr>
+          <p:cNvPr id="41" name="PlaceHolder 2"/>
           <p:cNvSpPr>
             <a:spLocks noGrp="1"/>
           </p:cNvSpPr>
@@ -632,7 +653,7 @@
       </p:grpSpPr>
       <p:sp>
         <p:nvSpPr>
-          <p:cNvPr id="48" name="PlaceHolder 1"/>
+          <p:cNvPr id="42" name="PlaceHolder 1"/>
           <p:cNvSpPr>
             <a:spLocks noGrp="1"/>
           </p:cNvSpPr>
@@ -652,13 +673,14 @@
         <p:txBody>
           <a:bodyPr lIns="0" rIns="0" tIns="0" bIns="0" anchor="ctr"/>
           <a:p>
-            <a:endParaRPr/>
-          </a:p>
-        </p:txBody>
-      </p:sp>
-      <p:sp>
-        <p:nvSpPr>
-          <p:cNvPr id="49" name="PlaceHolder 2"/>
+            <a:pPr algn="ctr"/>
+            <a:endParaRPr/>
+          </a:p>
+        </p:txBody>
+      </p:sp>
+      <p:sp>
+        <p:nvSpPr>
+          <p:cNvPr id="43" name="PlaceHolder 2"/>
           <p:cNvSpPr>
             <a:spLocks noGrp="1"/>
           </p:cNvSpPr>
@@ -684,7 +706,7 @@
       </p:sp>
       <p:sp>
         <p:nvSpPr>
-          <p:cNvPr id="50" name="PlaceHolder 3"/>
+          <p:cNvPr id="44" name="PlaceHolder 3"/>
           <p:cNvSpPr>
             <a:spLocks noGrp="1"/>
           </p:cNvSpPr>
@@ -732,7 +754,7 @@
       </p:grpSpPr>
       <p:sp>
         <p:nvSpPr>
-          <p:cNvPr id="51" name="PlaceHolder 1"/>
+          <p:cNvPr id="45" name="PlaceHolder 1"/>
           <p:cNvSpPr>
             <a:spLocks noGrp="1"/>
           </p:cNvSpPr>
@@ -752,6 +774,7 @@
         <p:txBody>
           <a:bodyPr lIns="0" rIns="0" tIns="0" bIns="0" anchor="ctr"/>
           <a:p>
+            <a:pPr algn="ctr"/>
             <a:endParaRPr/>
           </a:p>
         </p:txBody>
@@ -780,7 +803,7 @@
       </p:grpSpPr>
       <p:sp>
         <p:nvSpPr>
-          <p:cNvPr id="52" name="PlaceHolder 1"/>
+          <p:cNvPr id="46" name="PlaceHolder 1"/>
           <p:cNvSpPr>
             <a:spLocks noGrp="1"/>
           </p:cNvSpPr>
@@ -829,7 +852,7 @@
       </p:grpSpPr>
       <p:sp>
         <p:nvSpPr>
-          <p:cNvPr id="53" name="PlaceHolder 1"/>
+          <p:cNvPr id="47" name="PlaceHolder 1"/>
           <p:cNvSpPr>
             <a:spLocks noGrp="1"/>
           </p:cNvSpPr>
@@ -849,13 +872,14 @@
         <p:txBody>
           <a:bodyPr lIns="0" rIns="0" tIns="0" bIns="0" anchor="ctr"/>
           <a:p>
-            <a:endParaRPr/>
-          </a:p>
-        </p:txBody>
-      </p:sp>
-      <p:sp>
-        <p:nvSpPr>
-          <p:cNvPr id="54" name="PlaceHolder 2"/>
+            <a:pPr algn="ctr"/>
+            <a:endParaRPr/>
+          </a:p>
+        </p:txBody>
+      </p:sp>
+      <p:sp>
+        <p:nvSpPr>
+          <p:cNvPr id="48" name="PlaceHolder 2"/>
           <p:cNvSpPr>
             <a:spLocks noGrp="1"/>
           </p:cNvSpPr>
@@ -881,7 +905,7 @@
       </p:sp>
       <p:sp>
         <p:nvSpPr>
-          <p:cNvPr id="55" name="PlaceHolder 3"/>
+          <p:cNvPr id="49" name="PlaceHolder 3"/>
           <p:cNvSpPr>
             <a:spLocks noGrp="1"/>
           </p:cNvSpPr>
@@ -907,7 +931,7 @@
       </p:sp>
       <p:sp>
         <p:nvSpPr>
-          <p:cNvPr id="56" name="PlaceHolder 4"/>
+          <p:cNvPr id="50" name="PlaceHolder 4"/>
           <p:cNvSpPr>
             <a:spLocks noGrp="1"/>
           </p:cNvSpPr>
@@ -955,7 +979,7 @@
       </p:grpSpPr>
       <p:sp>
         <p:nvSpPr>
-          <p:cNvPr id="5" name="PlaceHolder 1"/>
+          <p:cNvPr id="2" name="PlaceHolder 1"/>
           <p:cNvSpPr>
             <a:spLocks noGrp="1"/>
           </p:cNvSpPr>
@@ -975,13 +999,14 @@
         <p:txBody>
           <a:bodyPr lIns="0" rIns="0" tIns="0" bIns="0" anchor="ctr"/>
           <a:p>
-            <a:endParaRPr/>
-          </a:p>
-        </p:txBody>
-      </p:sp>
-      <p:sp>
-        <p:nvSpPr>
-          <p:cNvPr id="6" name="PlaceHolder 2"/>
+            <a:pPr algn="ctr"/>
+            <a:endParaRPr/>
+          </a:p>
+        </p:txBody>
+      </p:sp>
+      <p:sp>
+        <p:nvSpPr>
+          <p:cNvPr id="3" name="PlaceHolder 2"/>
           <p:cNvSpPr>
             <a:spLocks noGrp="1"/>
           </p:cNvSpPr>
@@ -1030,7 +1055,7 @@
       </p:grpSpPr>
       <p:sp>
         <p:nvSpPr>
-          <p:cNvPr id="57" name="PlaceHolder 1"/>
+          <p:cNvPr id="51" name="PlaceHolder 1"/>
           <p:cNvSpPr>
             <a:spLocks noGrp="1"/>
           </p:cNvSpPr>
@@ -1050,13 +1075,14 @@
         <p:txBody>
           <a:bodyPr lIns="0" rIns="0" tIns="0" bIns="0" anchor="ctr"/>
           <a:p>
-            <a:endParaRPr/>
-          </a:p>
-        </p:txBody>
-      </p:sp>
-      <p:sp>
-        <p:nvSpPr>
-          <p:cNvPr id="58" name="PlaceHolder 2"/>
+            <a:pPr algn="ctr"/>
+            <a:endParaRPr/>
+          </a:p>
+        </p:txBody>
+      </p:sp>
+      <p:sp>
+        <p:nvSpPr>
+          <p:cNvPr id="52" name="PlaceHolder 2"/>
           <p:cNvSpPr>
             <a:spLocks noGrp="1"/>
           </p:cNvSpPr>
@@ -1082,7 +1108,7 @@
       </p:sp>
       <p:sp>
         <p:nvSpPr>
-          <p:cNvPr id="59" name="PlaceHolder 3"/>
+          <p:cNvPr id="53" name="PlaceHolder 3"/>
           <p:cNvSpPr>
             <a:spLocks noGrp="1"/>
           </p:cNvSpPr>
@@ -1108,7 +1134,7 @@
       </p:sp>
       <p:sp>
         <p:nvSpPr>
-          <p:cNvPr id="60" name="PlaceHolder 4"/>
+          <p:cNvPr id="54" name="PlaceHolder 4"/>
           <p:cNvSpPr>
             <a:spLocks noGrp="1"/>
           </p:cNvSpPr>
@@ -1156,7 +1182,7 @@
       </p:grpSpPr>
       <p:sp>
         <p:nvSpPr>
-          <p:cNvPr id="61" name="PlaceHolder 1"/>
+          <p:cNvPr id="55" name="PlaceHolder 1"/>
           <p:cNvSpPr>
             <a:spLocks noGrp="1"/>
           </p:cNvSpPr>
@@ -1176,13 +1202,14 @@
         <p:txBody>
           <a:bodyPr lIns="0" rIns="0" tIns="0" bIns="0" anchor="ctr"/>
           <a:p>
-            <a:endParaRPr/>
-          </a:p>
-        </p:txBody>
-      </p:sp>
-      <p:sp>
-        <p:nvSpPr>
-          <p:cNvPr id="62" name="PlaceHolder 2"/>
+            <a:pPr algn="ctr"/>
+            <a:endParaRPr/>
+          </a:p>
+        </p:txBody>
+      </p:sp>
+      <p:sp>
+        <p:nvSpPr>
+          <p:cNvPr id="56" name="PlaceHolder 2"/>
           <p:cNvSpPr>
             <a:spLocks noGrp="1"/>
           </p:cNvSpPr>
@@ -1208,7 +1235,7 @@
       </p:sp>
       <p:sp>
         <p:nvSpPr>
-          <p:cNvPr id="63" name="PlaceHolder 3"/>
+          <p:cNvPr id="57" name="PlaceHolder 3"/>
           <p:cNvSpPr>
             <a:spLocks noGrp="1"/>
           </p:cNvSpPr>
@@ -1234,7 +1261,7 @@
       </p:sp>
       <p:sp>
         <p:nvSpPr>
-          <p:cNvPr id="64" name="PlaceHolder 4"/>
+          <p:cNvPr id="58" name="PlaceHolder 4"/>
           <p:cNvSpPr>
             <a:spLocks noGrp="1"/>
           </p:cNvSpPr>
@@ -1282,7 +1309,7 @@
       </p:grpSpPr>
       <p:sp>
         <p:nvSpPr>
-          <p:cNvPr id="65" name="PlaceHolder 1"/>
+          <p:cNvPr id="59" name="PlaceHolder 1"/>
           <p:cNvSpPr>
             <a:spLocks noGrp="1"/>
           </p:cNvSpPr>
@@ -1302,13 +1329,14 @@
         <p:txBody>
           <a:bodyPr lIns="0" rIns="0" tIns="0" bIns="0" anchor="ctr"/>
           <a:p>
-            <a:endParaRPr/>
-          </a:p>
-        </p:txBody>
-      </p:sp>
-      <p:sp>
-        <p:nvSpPr>
-          <p:cNvPr id="66" name="PlaceHolder 2"/>
+            <a:pPr algn="ctr"/>
+            <a:endParaRPr/>
+          </a:p>
+        </p:txBody>
+      </p:sp>
+      <p:sp>
+        <p:nvSpPr>
+          <p:cNvPr id="60" name="PlaceHolder 2"/>
           <p:cNvSpPr>
             <a:spLocks noGrp="1"/>
           </p:cNvSpPr>
@@ -1334,7 +1362,7 @@
       </p:sp>
       <p:sp>
         <p:nvSpPr>
-          <p:cNvPr id="67" name="PlaceHolder 3"/>
+          <p:cNvPr id="61" name="PlaceHolder 3"/>
           <p:cNvSpPr>
             <a:spLocks noGrp="1"/>
           </p:cNvSpPr>
@@ -1382,7 +1410,7 @@
       </p:grpSpPr>
       <p:sp>
         <p:nvSpPr>
-          <p:cNvPr id="68" name="PlaceHolder 1"/>
+          <p:cNvPr id="62" name="PlaceHolder 1"/>
           <p:cNvSpPr>
             <a:spLocks noGrp="1"/>
           </p:cNvSpPr>
@@ -1402,13 +1430,14 @@
         <p:txBody>
           <a:bodyPr lIns="0" rIns="0" tIns="0" bIns="0" anchor="ctr"/>
           <a:p>
-            <a:endParaRPr/>
-          </a:p>
-        </p:txBody>
-      </p:sp>
-      <p:sp>
-        <p:nvSpPr>
-          <p:cNvPr id="69" name="PlaceHolder 2"/>
+            <a:pPr algn="ctr"/>
+            <a:endParaRPr/>
+          </a:p>
+        </p:txBody>
+      </p:sp>
+      <p:sp>
+        <p:nvSpPr>
+          <p:cNvPr id="63" name="PlaceHolder 2"/>
           <p:cNvSpPr>
             <a:spLocks noGrp="1"/>
           </p:cNvSpPr>
@@ -1434,7 +1463,7 @@
       </p:sp>
       <p:sp>
         <p:nvSpPr>
-          <p:cNvPr id="70" name="PlaceHolder 3"/>
+          <p:cNvPr id="64" name="PlaceHolder 3"/>
           <p:cNvSpPr>
             <a:spLocks noGrp="1"/>
           </p:cNvSpPr>
@@ -1460,7 +1489,7 @@
       </p:sp>
       <p:sp>
         <p:nvSpPr>
-          <p:cNvPr id="71" name="PlaceHolder 4"/>
+          <p:cNvPr id="65" name="PlaceHolder 4"/>
           <p:cNvSpPr>
             <a:spLocks noGrp="1"/>
           </p:cNvSpPr>
@@ -1486,7 +1515,7 @@
       </p:sp>
       <p:sp>
         <p:nvSpPr>
-          <p:cNvPr id="72" name="PlaceHolder 5"/>
+          <p:cNvPr id="66" name="PlaceHolder 5"/>
           <p:cNvSpPr>
             <a:spLocks noGrp="1"/>
           </p:cNvSpPr>
@@ -1534,7 +1563,7 @@
       </p:grpSpPr>
       <p:sp>
         <p:nvSpPr>
-          <p:cNvPr id="73" name="PlaceHolder 1"/>
+          <p:cNvPr id="67" name="PlaceHolder 1"/>
           <p:cNvSpPr>
             <a:spLocks noGrp="1"/>
           </p:cNvSpPr>
@@ -1554,13 +1583,14 @@
         <p:txBody>
           <a:bodyPr lIns="0" rIns="0" tIns="0" bIns="0" anchor="ctr"/>
           <a:p>
-            <a:endParaRPr/>
-          </a:p>
-        </p:txBody>
-      </p:sp>
-      <p:sp>
-        <p:nvSpPr>
-          <p:cNvPr id="74" name="PlaceHolder 2"/>
+            <a:pPr algn="ctr"/>
+            <a:endParaRPr/>
+          </a:p>
+        </p:txBody>
+      </p:sp>
+      <p:sp>
+        <p:nvSpPr>
+          <p:cNvPr id="68" name="PlaceHolder 2"/>
           <p:cNvSpPr>
             <a:spLocks noGrp="1"/>
           </p:cNvSpPr>
@@ -1586,7 +1616,7 @@
       </p:sp>
       <p:sp>
         <p:nvSpPr>
-          <p:cNvPr id="75" name="PlaceHolder 3"/>
+          <p:cNvPr id="69" name="PlaceHolder 3"/>
           <p:cNvSpPr>
             <a:spLocks noGrp="1"/>
           </p:cNvSpPr>
@@ -1612,7 +1642,7 @@
       </p:sp>
       <p:pic>
         <p:nvPicPr>
-          <p:cNvPr id="76" name="" descr=""/>
+          <p:cNvPr id="70" name="" descr=""/>
           <p:cNvPicPr/>
           <p:nvPr/>
         </p:nvPicPr>
@@ -1637,7 +1667,7 @@
       </p:pic>
       <p:pic>
         <p:nvPicPr>
-          <p:cNvPr id="77" name="" descr=""/>
+          <p:cNvPr id="71" name="" descr=""/>
           <p:cNvPicPr/>
           <p:nvPr/>
         </p:nvPicPr>
@@ -1684,7 +1714,7 @@
       </p:grpSpPr>
       <p:sp>
         <p:nvSpPr>
-          <p:cNvPr id="7" name="PlaceHolder 1"/>
+          <p:cNvPr id="4" name="PlaceHolder 1"/>
           <p:cNvSpPr>
             <a:spLocks noGrp="1"/>
           </p:cNvSpPr>
@@ -1704,13 +1734,14 @@
         <p:txBody>
           <a:bodyPr lIns="0" rIns="0" tIns="0" bIns="0" anchor="ctr"/>
           <a:p>
-            <a:endParaRPr/>
-          </a:p>
-        </p:txBody>
-      </p:sp>
-      <p:sp>
-        <p:nvSpPr>
-          <p:cNvPr id="8" name="PlaceHolder 2"/>
+            <a:pPr algn="ctr"/>
+            <a:endParaRPr/>
+          </a:p>
+        </p:txBody>
+      </p:sp>
+      <p:sp>
+        <p:nvSpPr>
+          <p:cNvPr id="5" name="PlaceHolder 2"/>
           <p:cNvSpPr>
             <a:spLocks noGrp="1"/>
           </p:cNvSpPr>
@@ -1758,7 +1789,7 @@
       </p:grpSpPr>
       <p:sp>
         <p:nvSpPr>
-          <p:cNvPr id="9" name="PlaceHolder 1"/>
+          <p:cNvPr id="6" name="PlaceHolder 1"/>
           <p:cNvSpPr>
             <a:spLocks noGrp="1"/>
           </p:cNvSpPr>
@@ -1778,13 +1809,14 @@
         <p:txBody>
           <a:bodyPr lIns="0" rIns="0" tIns="0" bIns="0" anchor="ctr"/>
           <a:p>
-            <a:endParaRPr/>
-          </a:p>
-        </p:txBody>
-      </p:sp>
-      <p:sp>
-        <p:nvSpPr>
-          <p:cNvPr id="10" name="PlaceHolder 2"/>
+            <a:pPr algn="ctr"/>
+            <a:endParaRPr/>
+          </a:p>
+        </p:txBody>
+      </p:sp>
+      <p:sp>
+        <p:nvSpPr>
+          <p:cNvPr id="7" name="PlaceHolder 2"/>
           <p:cNvSpPr>
             <a:spLocks noGrp="1"/>
           </p:cNvSpPr>
@@ -1810,7 +1842,7 @@
       </p:sp>
       <p:sp>
         <p:nvSpPr>
-          <p:cNvPr id="11" name="PlaceHolder 3"/>
+          <p:cNvPr id="8" name="PlaceHolder 3"/>
           <p:cNvSpPr>
             <a:spLocks noGrp="1"/>
           </p:cNvSpPr>
@@ -1858,7 +1890,7 @@
       </p:grpSpPr>
       <p:sp>
         <p:nvSpPr>
-          <p:cNvPr id="12" name="PlaceHolder 1"/>
+          <p:cNvPr id="9" name="PlaceHolder 1"/>
           <p:cNvSpPr>
             <a:spLocks noGrp="1"/>
           </p:cNvSpPr>
@@ -1878,6 +1910,7 @@
         <p:txBody>
           <a:bodyPr lIns="0" rIns="0" tIns="0" bIns="0" anchor="ctr"/>
           <a:p>
+            <a:pPr algn="ctr"/>
             <a:endParaRPr/>
           </a:p>
         </p:txBody>
@@ -1906,7 +1939,7 @@
       </p:grpSpPr>
       <p:sp>
         <p:nvSpPr>
-          <p:cNvPr id="13" name="PlaceHolder 1"/>
+          <p:cNvPr id="10" name="PlaceHolder 1"/>
           <p:cNvSpPr>
             <a:spLocks noGrp="1"/>
           </p:cNvSpPr>
@@ -1955,7 +1988,7 @@
       </p:grpSpPr>
       <p:sp>
         <p:nvSpPr>
-          <p:cNvPr id="14" name="PlaceHolder 1"/>
+          <p:cNvPr id="11" name="PlaceHolder 1"/>
           <p:cNvSpPr>
             <a:spLocks noGrp="1"/>
           </p:cNvSpPr>
@@ -1975,13 +2008,14 @@
         <p:txBody>
           <a:bodyPr lIns="0" rIns="0" tIns="0" bIns="0" anchor="ctr"/>
           <a:p>
-            <a:endParaRPr/>
-          </a:p>
-        </p:txBody>
-      </p:sp>
-      <p:sp>
-        <p:nvSpPr>
-          <p:cNvPr id="15" name="PlaceHolder 2"/>
+            <a:pPr algn="ctr"/>
+            <a:endParaRPr/>
+          </a:p>
+        </p:txBody>
+      </p:sp>
+      <p:sp>
+        <p:nvSpPr>
+          <p:cNvPr id="12" name="PlaceHolder 2"/>
           <p:cNvSpPr>
             <a:spLocks noGrp="1"/>
           </p:cNvSpPr>
@@ -2007,7 +2041,7 @@
       </p:sp>
       <p:sp>
         <p:nvSpPr>
-          <p:cNvPr id="16" name="PlaceHolder 3"/>
+          <p:cNvPr id="13" name="PlaceHolder 3"/>
           <p:cNvSpPr>
             <a:spLocks noGrp="1"/>
           </p:cNvSpPr>
@@ -2033,7 +2067,7 @@
       </p:sp>
       <p:sp>
         <p:nvSpPr>
-          <p:cNvPr id="17" name="PlaceHolder 4"/>
+          <p:cNvPr id="14" name="PlaceHolder 4"/>
           <p:cNvSpPr>
             <a:spLocks noGrp="1"/>
           </p:cNvSpPr>
@@ -2081,7 +2115,7 @@
       </p:grpSpPr>
       <p:sp>
         <p:nvSpPr>
-          <p:cNvPr id="18" name="PlaceHolder 1"/>
+          <p:cNvPr id="15" name="PlaceHolder 1"/>
           <p:cNvSpPr>
             <a:spLocks noGrp="1"/>
           </p:cNvSpPr>
@@ -2101,13 +2135,14 @@
         <p:txBody>
           <a:bodyPr lIns="0" rIns="0" tIns="0" bIns="0" anchor="ctr"/>
           <a:p>
-            <a:endParaRPr/>
-          </a:p>
-        </p:txBody>
-      </p:sp>
-      <p:sp>
-        <p:nvSpPr>
-          <p:cNvPr id="19" name="PlaceHolder 2"/>
+            <a:pPr algn="ctr"/>
+            <a:endParaRPr/>
+          </a:p>
+        </p:txBody>
+      </p:sp>
+      <p:sp>
+        <p:nvSpPr>
+          <p:cNvPr id="16" name="PlaceHolder 2"/>
           <p:cNvSpPr>
             <a:spLocks noGrp="1"/>
           </p:cNvSpPr>
@@ -2133,7 +2168,7 @@
       </p:sp>
       <p:sp>
         <p:nvSpPr>
-          <p:cNvPr id="20" name="PlaceHolder 3"/>
+          <p:cNvPr id="17" name="PlaceHolder 3"/>
           <p:cNvSpPr>
             <a:spLocks noGrp="1"/>
           </p:cNvSpPr>
@@ -2159,7 +2194,7 @@
       </p:sp>
       <p:sp>
         <p:nvSpPr>
-          <p:cNvPr id="21" name="PlaceHolder 4"/>
+          <p:cNvPr id="18" name="PlaceHolder 4"/>
           <p:cNvSpPr>
             <a:spLocks noGrp="1"/>
           </p:cNvSpPr>
@@ -2207,7 +2242,7 @@
       </p:grpSpPr>
       <p:sp>
         <p:nvSpPr>
-          <p:cNvPr id="22" name="PlaceHolder 1"/>
+          <p:cNvPr id="19" name="PlaceHolder 1"/>
           <p:cNvSpPr>
             <a:spLocks noGrp="1"/>
           </p:cNvSpPr>
@@ -2227,13 +2262,14 @@
         <p:txBody>
           <a:bodyPr lIns="0" rIns="0" tIns="0" bIns="0" anchor="ctr"/>
           <a:p>
-            <a:endParaRPr/>
-          </a:p>
-        </p:txBody>
-      </p:sp>
-      <p:sp>
-        <p:nvSpPr>
-          <p:cNvPr id="23" name="PlaceHolder 2"/>
+            <a:pPr algn="ctr"/>
+            <a:endParaRPr/>
+          </a:p>
+        </p:txBody>
+      </p:sp>
+      <p:sp>
+        <p:nvSpPr>
+          <p:cNvPr id="20" name="PlaceHolder 2"/>
           <p:cNvSpPr>
             <a:spLocks noGrp="1"/>
           </p:cNvSpPr>
@@ -2259,7 +2295,7 @@
       </p:sp>
       <p:sp>
         <p:nvSpPr>
-          <p:cNvPr id="24" name="PlaceHolder 3"/>
+          <p:cNvPr id="21" name="PlaceHolder 3"/>
           <p:cNvSpPr>
             <a:spLocks noGrp="1"/>
           </p:cNvSpPr>
@@ -2285,7 +2321,7 @@
       </p:sp>
       <p:sp>
         <p:nvSpPr>
-          <p:cNvPr id="25" name="PlaceHolder 4"/>
+          <p:cNvPr id="22" name="PlaceHolder 4"/>
           <p:cNvSpPr>
             <a:spLocks noGrp="1"/>
           </p:cNvSpPr>
@@ -2350,29 +2386,21 @@
         </p:nvSpPr>
         <p:spPr>
           <a:xfrm>
-            <a:off x="1523880" y="1122480"/>
-            <a:ext cx="9143640" cy="2387160"/>
-          </a:xfrm>
-          <a:prstGeom prst="rect">
-            <a:avLst/>
-          </a:prstGeom>
-        </p:spPr>
-        <p:txBody>
-          <a:bodyPr anchor="b"/>
-          <a:p>
-            <a:pPr algn="ctr">
-              <a:lnSpc>
-                <a:spcPct val="100000"/>
-              </a:lnSpc>
-            </a:pPr>
+            <a:off x="609480" y="273600"/>
+            <a:ext cx="10972080" cy="1144800"/>
+          </a:xfrm>
+          <a:prstGeom prst="rect">
+            <a:avLst/>
+          </a:prstGeom>
+        </p:spPr>
+        <p:txBody>
+          <a:bodyPr lIns="0" rIns="0" tIns="0" bIns="0" anchor="ctr"/>
+          <a:p>
             <a:r>
-              <a:rPr lang="da-DK" sz="6000">
-                <a:solidFill>
-                  <a:srgbClr val="000000"/>
-                </a:solidFill>
-                <a:latin typeface="Calibri Light"/>
+              <a:rPr lang="en-US">
+                <a:latin typeface="Arial"/>
               </a:rPr>
-              <a:t>Click to edit the title text formatClick to edit Master title style</a:t>
+              <a:t>Click to edit the title text format</a:t>
             </a:r>
             <a:endParaRPr/>
           </a:p>
@@ -2381,112 +2409,6 @@
       <p:sp>
         <p:nvSpPr>
           <p:cNvPr id="1" name="PlaceHolder 2"/>
-          <p:cNvSpPr>
-            <a:spLocks noGrp="1"/>
-          </p:cNvSpPr>
-          <p:nvPr>
-            <p:ph type="dt"/>
-          </p:nvPr>
-        </p:nvSpPr>
-        <p:spPr>
-          <a:xfrm>
-            <a:off x="838080" y="6356520"/>
-            <a:ext cx="2742840" cy="364680"/>
-          </a:xfrm>
-          <a:prstGeom prst="rect">
-            <a:avLst/>
-          </a:prstGeom>
-        </p:spPr>
-        <p:txBody>
-          <a:bodyPr anchor="ctr"/>
-          <a:p>
-            <a:pPr>
-              <a:lnSpc>
-                <a:spcPct val="100000"/>
-              </a:lnSpc>
-            </a:pPr>
-            <a:r>
-              <a:rPr lang="en-US" sz="1200">
-                <a:solidFill>
-                  <a:srgbClr val="8b8b8b"/>
-                </a:solidFill>
-                <a:latin typeface="Calibri"/>
-              </a:rPr>
-              <a:t>1/21/19</a:t>
-            </a:r>
-            <a:endParaRPr/>
-          </a:p>
-        </p:txBody>
-      </p:sp>
-      <p:sp>
-        <p:nvSpPr>
-          <p:cNvPr id="2" name="PlaceHolder 3"/>
-          <p:cNvSpPr>
-            <a:spLocks noGrp="1"/>
-          </p:cNvSpPr>
-          <p:nvPr>
-            <p:ph type="ftr"/>
-          </p:nvPr>
-        </p:nvSpPr>
-        <p:spPr>
-          <a:xfrm>
-            <a:off x="4038480" y="6356520"/>
-            <a:ext cx="4114440" cy="364680"/>
-          </a:xfrm>
-          <a:prstGeom prst="rect">
-            <a:avLst/>
-          </a:prstGeom>
-        </p:spPr>
-        <p:txBody>
-          <a:bodyPr anchor="ctr"/>
-          <a:p>
-            <a:endParaRPr/>
-          </a:p>
-        </p:txBody>
-      </p:sp>
-      <p:sp>
-        <p:nvSpPr>
-          <p:cNvPr id="3" name="PlaceHolder 4"/>
-          <p:cNvSpPr>
-            <a:spLocks noGrp="1"/>
-          </p:cNvSpPr>
-          <p:nvPr>
-            <p:ph type="sldNum"/>
-          </p:nvPr>
-        </p:nvSpPr>
-        <p:spPr>
-          <a:xfrm>
-            <a:off x="8610480" y="6356520"/>
-            <a:ext cx="2742840" cy="364680"/>
-          </a:xfrm>
-          <a:prstGeom prst="rect">
-            <a:avLst/>
-          </a:prstGeom>
-        </p:spPr>
-        <p:txBody>
-          <a:bodyPr anchor="ctr"/>
-          <a:p>
-            <a:pPr algn="r">
-              <a:lnSpc>
-                <a:spcPct val="100000"/>
-              </a:lnSpc>
-            </a:pPr>
-            <a:fld id="{4A6EB8C8-8E43-49C9-B4F3-F9B9FC92BB85}" type="slidenum">
-              <a:rPr lang="en-US" sz="1200">
-                <a:solidFill>
-                  <a:srgbClr val="8b8b8b"/>
-                </a:solidFill>
-                <a:latin typeface="Calibri"/>
-              </a:rPr>
-              <a:t>&lt;number&gt;</a:t>
-            </a:fld>
-            <a:endParaRPr/>
-          </a:p>
-        </p:txBody>
-      </p:sp>
-      <p:sp>
-        <p:nvSpPr>
-          <p:cNvPr id="4" name="PlaceHolder 5"/>
           <p:cNvSpPr>
             <a:spLocks noGrp="1"/>
           </p:cNvSpPr>
@@ -2512,8 +2434,8 @@
               <a:buChar char=""/>
             </a:pPr>
             <a:r>
-              <a:rPr lang="da-DK" sz="2800">
-                <a:latin typeface="Calibri"/>
+              <a:rPr lang="en-US" sz="3200">
+                <a:latin typeface="Arial"/>
               </a:rPr>
               <a:t>Click to edit the outline text format</a:t>
             </a:r>
@@ -2526,8 +2448,8 @@
               <a:buChar char=""/>
             </a:pPr>
             <a:r>
-              <a:rPr lang="da-DK" sz="2000">
-                <a:latin typeface="Calibri"/>
+              <a:rPr lang="en-US" sz="2800">
+                <a:latin typeface="Arial"/>
               </a:rPr>
               <a:t>Second Outline Level</a:t>
             </a:r>
@@ -2540,8 +2462,8 @@
               <a:buChar char=""/>
             </a:pPr>
             <a:r>
-              <a:rPr lang="da-DK">
-                <a:latin typeface="Calibri"/>
+              <a:rPr lang="en-US" sz="2400">
+                <a:latin typeface="Arial"/>
               </a:rPr>
               <a:t>Third Outline Level</a:t>
             </a:r>
@@ -2554,8 +2476,8 @@
               <a:buChar char=""/>
             </a:pPr>
             <a:r>
-              <a:rPr lang="da-DK">
-                <a:latin typeface="Calibri"/>
+              <a:rPr lang="en-US" sz="2000">
+                <a:latin typeface="Arial"/>
               </a:rPr>
               <a:t>Fourth Outline Level</a:t>
             </a:r>
@@ -2568,8 +2490,8 @@
               <a:buChar char=""/>
             </a:pPr>
             <a:r>
-              <a:rPr lang="da-DK" sz="2000">
-                <a:latin typeface="Calibri"/>
+              <a:rPr lang="en-US" sz="2000">
+                <a:latin typeface="Arial"/>
               </a:rPr>
               <a:t>Fifth Outline Level</a:t>
             </a:r>
@@ -2582,8 +2504,8 @@
               <a:buChar char=""/>
             </a:pPr>
             <a:r>
-              <a:rPr lang="da-DK" sz="2000">
-                <a:latin typeface="Calibri"/>
+              <a:rPr lang="en-US" sz="2000">
+                <a:latin typeface="Arial"/>
               </a:rPr>
               <a:t>Sixth Outline Level</a:t>
             </a:r>
@@ -2596,8 +2518,8 @@
               <a:buChar char=""/>
             </a:pPr>
             <a:r>
-              <a:rPr lang="da-DK" sz="2000">
-                <a:latin typeface="Calibri"/>
+              <a:rPr lang="en-US" sz="2000">
+                <a:latin typeface="Arial"/>
               </a:rPr>
               <a:t>Seventh Outline Level</a:t>
             </a:r>
@@ -2651,113 +2573,7 @@
       </p:grpSpPr>
       <p:sp>
         <p:nvSpPr>
-          <p:cNvPr id="39" name="PlaceHolder 1"/>
-          <p:cNvSpPr>
-            <a:spLocks noGrp="1"/>
-          </p:cNvSpPr>
-          <p:nvPr>
-            <p:ph type="dt"/>
-          </p:nvPr>
-        </p:nvSpPr>
-        <p:spPr>
-          <a:xfrm>
-            <a:off x="838080" y="6356520"/>
-            <a:ext cx="2742840" cy="364680"/>
-          </a:xfrm>
-          <a:prstGeom prst="rect">
-            <a:avLst/>
-          </a:prstGeom>
-        </p:spPr>
-        <p:txBody>
-          <a:bodyPr anchor="ctr"/>
-          <a:p>
-            <a:pPr>
-              <a:lnSpc>
-                <a:spcPct val="100000"/>
-              </a:lnSpc>
-            </a:pPr>
-            <a:r>
-              <a:rPr lang="en-US" sz="1200">
-                <a:solidFill>
-                  <a:srgbClr val="8b8b8b"/>
-                </a:solidFill>
-                <a:latin typeface="Calibri"/>
-              </a:rPr>
-              <a:t>1/21/19</a:t>
-            </a:r>
-            <a:endParaRPr/>
-          </a:p>
-        </p:txBody>
-      </p:sp>
-      <p:sp>
-        <p:nvSpPr>
-          <p:cNvPr id="40" name="PlaceHolder 2"/>
-          <p:cNvSpPr>
-            <a:spLocks noGrp="1"/>
-          </p:cNvSpPr>
-          <p:nvPr>
-            <p:ph type="ftr"/>
-          </p:nvPr>
-        </p:nvSpPr>
-        <p:spPr>
-          <a:xfrm>
-            <a:off x="4038480" y="6356520"/>
-            <a:ext cx="4114440" cy="364680"/>
-          </a:xfrm>
-          <a:prstGeom prst="rect">
-            <a:avLst/>
-          </a:prstGeom>
-        </p:spPr>
-        <p:txBody>
-          <a:bodyPr anchor="ctr"/>
-          <a:p>
-            <a:endParaRPr/>
-          </a:p>
-        </p:txBody>
-      </p:sp>
-      <p:sp>
-        <p:nvSpPr>
-          <p:cNvPr id="41" name="PlaceHolder 3"/>
-          <p:cNvSpPr>
-            <a:spLocks noGrp="1"/>
-          </p:cNvSpPr>
-          <p:nvPr>
-            <p:ph type="sldNum"/>
-          </p:nvPr>
-        </p:nvSpPr>
-        <p:spPr>
-          <a:xfrm>
-            <a:off x="8610480" y="6356520"/>
-            <a:ext cx="2742840" cy="364680"/>
-          </a:xfrm>
-          <a:prstGeom prst="rect">
-            <a:avLst/>
-          </a:prstGeom>
-        </p:spPr>
-        <p:txBody>
-          <a:bodyPr anchor="ctr"/>
-          <a:p>
-            <a:pPr algn="r">
-              <a:lnSpc>
-                <a:spcPct val="100000"/>
-              </a:lnSpc>
-            </a:pPr>
-            <a:fld id="{CEDEF497-FFB2-400A-AC9B-EB5CD524470F}" type="slidenum">
-              <a:rPr lang="en-US" sz="1200">
-                <a:solidFill>
-                  <a:srgbClr val="8b8b8b"/>
-                </a:solidFill>
-                <a:latin typeface="Calibri"/>
-              </a:rPr>
-              <a:t>&lt;number&gt;</a:t>
-            </a:fld>
-            <a:endParaRPr/>
-          </a:p>
-        </p:txBody>
-      </p:sp>
-      <p:sp>
-        <p:nvSpPr>
-          <p:cNvPr id="42" name="PlaceHolder 4"/>
+          <p:cNvPr id="36" name="PlaceHolder 1"/>
           <p:cNvSpPr>
             <a:spLocks noGrp="1"/>
           </p:cNvSpPr>
@@ -2777,9 +2593,10 @@
         <p:txBody>
           <a:bodyPr lIns="0" rIns="0" tIns="0" bIns="0" anchor="ctr"/>
           <a:p>
+            <a:pPr algn="ctr"/>
             <a:r>
-              <a:rPr lang="da-DK">
-                <a:latin typeface="Calibri"/>
+              <a:rPr lang="en-US" sz="4400">
+                <a:latin typeface="Arial"/>
               </a:rPr>
               <a:t>Click to edit the title text format</a:t>
             </a:r>
@@ -2789,7 +2606,7 @@
       </p:sp>
       <p:sp>
         <p:nvSpPr>
-          <p:cNvPr id="43" name="PlaceHolder 5"/>
+          <p:cNvPr id="37" name="PlaceHolder 2"/>
           <p:cNvSpPr>
             <a:spLocks noGrp="1"/>
           </p:cNvSpPr>
@@ -2815,8 +2632,8 @@
               <a:buChar char=""/>
             </a:pPr>
             <a:r>
-              <a:rPr lang="da-DK" sz="2800">
-                <a:latin typeface="Calibri"/>
+              <a:rPr lang="en-US" sz="3200">
+                <a:latin typeface="Arial"/>
               </a:rPr>
               <a:t>Click to edit the outline text format</a:t>
             </a:r>
@@ -2829,8 +2646,8 @@
               <a:buChar char=""/>
             </a:pPr>
             <a:r>
-              <a:rPr lang="da-DK" sz="2000">
-                <a:latin typeface="Calibri"/>
+              <a:rPr lang="en-US" sz="2800">
+                <a:latin typeface="Arial"/>
               </a:rPr>
               <a:t>Second Outline Level</a:t>
             </a:r>
@@ -2843,8 +2660,8 @@
               <a:buChar char=""/>
             </a:pPr>
             <a:r>
-              <a:rPr lang="da-DK">
-                <a:latin typeface="Calibri"/>
+              <a:rPr lang="en-US" sz="2400">
+                <a:latin typeface="Arial"/>
               </a:rPr>
               <a:t>Third Outline Level</a:t>
             </a:r>
@@ -2857,8 +2674,8 @@
               <a:buChar char=""/>
             </a:pPr>
             <a:r>
-              <a:rPr lang="da-DK">
-                <a:latin typeface="Calibri"/>
+              <a:rPr lang="en-US" sz="2000">
+                <a:latin typeface="Arial"/>
               </a:rPr>
               <a:t>Fourth Outline Level</a:t>
             </a:r>
@@ -2871,8 +2688,8 @@
               <a:buChar char=""/>
             </a:pPr>
             <a:r>
-              <a:rPr lang="da-DK" sz="2000">
-                <a:latin typeface="Calibri"/>
+              <a:rPr lang="en-US" sz="2000">
+                <a:latin typeface="Arial"/>
               </a:rPr>
               <a:t>Fifth Outline Level</a:t>
             </a:r>
@@ -2885,8 +2702,8 @@
               <a:buChar char=""/>
             </a:pPr>
             <a:r>
-              <a:rPr lang="da-DK" sz="2000">
-                <a:latin typeface="Calibri"/>
+              <a:rPr lang="en-US" sz="2000">
+                <a:latin typeface="Arial"/>
               </a:rPr>
               <a:t>Sixth Outline Level</a:t>
             </a:r>
@@ -2899,8 +2716,8 @@
               <a:buChar char=""/>
             </a:pPr>
             <a:r>
-              <a:rPr lang="da-DK" sz="2000">
-                <a:latin typeface="Calibri"/>
+              <a:rPr lang="en-US" sz="2000">
+                <a:latin typeface="Arial"/>
               </a:rPr>
               <a:t>Seventh Outline Level</a:t>
             </a:r>
@@ -2947,21 +2764,25 @@
       </p:grpSpPr>
       <p:sp>
         <p:nvSpPr>
-          <p:cNvPr id="78" name="TextShape 1"/>
-          <p:cNvSpPr txBox="1"/>
+          <p:cNvPr id="72" name="CustomShape 1"/>
+          <p:cNvSpPr/>
           <p:nvPr/>
         </p:nvSpPr>
         <p:spPr>
           <a:xfrm>
             <a:off x="1523880" y="1122480"/>
-            <a:ext cx="9143640" cy="2387160"/>
-          </a:xfrm>
-          <a:prstGeom prst="rect">
-            <a:avLst/>
-          </a:prstGeom>
-        </p:spPr>
-        <p:txBody>
-          <a:bodyPr anchor="b"/>
+            <a:ext cx="9143280" cy="2386800"/>
+          </a:xfrm>
+          <a:prstGeom prst="rect">
+            <a:avLst/>
+          </a:prstGeom>
+          <a:noFill/>
+          <a:ln>
+            <a:noFill/>
+          </a:ln>
+        </p:spPr>
+        <p:txBody>
+          <a:bodyPr lIns="90000" rIns="90000" tIns="45000" bIns="45000" anchor="b"/>
           <a:p>
             <a:pPr algn="ctr">
               <a:lnSpc>
@@ -2969,7 +2790,7 @@
               </a:lnSpc>
             </a:pPr>
             <a:r>
-              <a:rPr lang="da-DK" sz="6000">
+              <a:rPr lang="en-US" sz="6000">
                 <a:solidFill>
                   <a:srgbClr val="000000"/>
                 </a:solidFill>
@@ -2983,26 +2804,23 @@
       </p:sp>
       <p:sp>
         <p:nvSpPr>
-          <p:cNvPr id="79" name="TextShape 2"/>
-          <p:cNvSpPr txBox="1"/>
+          <p:cNvPr id="73" name="CustomShape 2"/>
+          <p:cNvSpPr/>
           <p:nvPr/>
         </p:nvSpPr>
         <p:spPr>
           <a:xfrm>
             <a:off x="1523880" y="3602160"/>
-            <a:ext cx="9143640" cy="1655280"/>
-          </a:xfrm>
-          <a:prstGeom prst="rect">
-            <a:avLst/>
-          </a:prstGeom>
-        </p:spPr>
-        <p:txBody>
-          <a:bodyPr/>
-          <a:p>
-            <a:pPr algn="ctr"/>
-            <a:endParaRPr/>
-          </a:p>
-        </p:txBody>
+            <a:ext cx="9143280" cy="1654920"/>
+          </a:xfrm>
+          <a:prstGeom prst="rect">
+            <a:avLst/>
+          </a:prstGeom>
+          <a:noFill/>
+          <a:ln>
+            <a:noFill/>
+          </a:ln>
+        </p:spPr>
       </p:sp>
     </p:spTree>
   </p:cSld>
@@ -3055,7 +2873,7 @@
       </p:grpSpPr>
       <p:pic>
         <p:nvPicPr>
-          <p:cNvPr id="80" name="Picture 8" descr=""/>
+          <p:cNvPr id="74" name="Picture 8" descr=""/>
           <p:cNvPicPr/>
           <p:nvPr/>
         </p:nvPicPr>
@@ -3068,7 +2886,7 @@
         <p:spPr>
           <a:xfrm>
             <a:off x="0" y="0"/>
-            <a:ext cx="12191760" cy="6857640"/>
+            <a:ext cx="12191400" cy="6857280"/>
           </a:xfrm>
           <a:prstGeom prst="rect">
             <a:avLst/>
@@ -3080,14 +2898,14 @@
       </p:pic>
       <p:sp>
         <p:nvSpPr>
-          <p:cNvPr id="81" name="CustomShape 1"/>
+          <p:cNvPr id="75" name="CustomShape 1"/>
           <p:cNvSpPr/>
           <p:nvPr/>
         </p:nvSpPr>
         <p:spPr>
           <a:xfrm>
             <a:off x="3091680" y="5197320"/>
-            <a:ext cx="3369240" cy="638280"/>
+            <a:ext cx="3368880" cy="637920"/>
           </a:xfrm>
           <a:prstGeom prst="rect">
             <a:avLst/>
@@ -3186,7 +3004,7 @@
       </p:grpSpPr>
       <p:pic>
         <p:nvPicPr>
-          <p:cNvPr id="82" name="Picture 1" descr=""/>
+          <p:cNvPr id="76" name="Picture 1" descr=""/>
           <p:cNvPicPr/>
           <p:nvPr/>
         </p:nvPicPr>
@@ -3199,7 +3017,7 @@
         <p:spPr>
           <a:xfrm>
             <a:off x="0" y="-2520"/>
-            <a:ext cx="12195720" cy="6860160"/>
+            <a:ext cx="12195360" cy="6859800"/>
           </a:xfrm>
           <a:prstGeom prst="rect">
             <a:avLst/>
@@ -3211,14 +3029,14 @@
       </p:pic>
       <p:sp>
         <p:nvSpPr>
-          <p:cNvPr id="83" name="CustomShape 1"/>
+          <p:cNvPr id="77" name="CustomShape 1"/>
           <p:cNvSpPr/>
           <p:nvPr/>
         </p:nvSpPr>
         <p:spPr>
           <a:xfrm>
-            <a:off x="1887840" y="5299920"/>
-            <a:ext cx="2851200" cy="364680"/>
+            <a:off x="1788120" y="5299920"/>
+            <a:ext cx="3050640" cy="637920"/>
           </a:xfrm>
           <a:prstGeom prst="rect">
             <a:avLst/>
@@ -3244,6 +3062,23 @@
                 <a:latin typeface="Calibri"/>
               </a:rPr>
               <a:t>Air_n1_5_SI(100)_Air.xy</a:t>
+            </a:r>
+            <a:endParaRPr/>
+          </a:p>
+          <a:p>
+            <a:pPr>
+              <a:lnSpc>
+                <a:spcPct val="100000"/>
+              </a:lnSpc>
+            </a:pPr>
+            <a:r>
+              <a:rPr lang="en-US">
+                <a:solidFill>
+                  <a:srgbClr val="000000"/>
+                </a:solidFill>
+                <a:latin typeface="Calibri"/>
+              </a:rPr>
+              <a:t>Done – Air_n1_5_SI_Air.m</a:t>
             </a:r>
             <a:endParaRPr/>
           </a:p>
@@ -3300,7 +3135,7 @@
       </p:grpSpPr>
       <p:pic>
         <p:nvPicPr>
-          <p:cNvPr id="84" name="Picture 1" descr=""/>
+          <p:cNvPr id="78" name="Picture 1" descr=""/>
           <p:cNvPicPr/>
           <p:nvPr/>
         </p:nvPicPr>
@@ -3313,7 +3148,7 @@
         <p:spPr>
           <a:xfrm>
             <a:off x="0" y="0"/>
-            <a:ext cx="12191760" cy="6857640"/>
+            <a:ext cx="12191400" cy="6857280"/>
           </a:xfrm>
           <a:prstGeom prst="rect">
             <a:avLst/>
@@ -3325,14 +3160,14 @@
       </p:pic>
       <p:sp>
         <p:nvSpPr>
-          <p:cNvPr id="85" name="CustomShape 1"/>
+          <p:cNvPr id="79" name="CustomShape 1"/>
           <p:cNvSpPr/>
           <p:nvPr/>
         </p:nvSpPr>
         <p:spPr>
           <a:xfrm>
             <a:off x="2175120" y="5159880"/>
-            <a:ext cx="3152880" cy="364680"/>
+            <a:ext cx="3152520" cy="364320"/>
           </a:xfrm>
           <a:prstGeom prst="rect">
             <a:avLst/>
@@ -3358,6 +3193,23 @@
                 <a:latin typeface="Calibri"/>
               </a:rPr>
               <a:t>Air_Cauchy_SI(100)_Air.xy</a:t>
+            </a:r>
+            <a:endParaRPr/>
+          </a:p>
+          <a:p>
+            <a:pPr>
+              <a:lnSpc>
+                <a:spcPct val="100000"/>
+              </a:lnSpc>
+            </a:pPr>
+            <a:r>
+              <a:rPr lang="en-US">
+                <a:solidFill>
+                  <a:srgbClr val="000000"/>
+                </a:solidFill>
+                <a:latin typeface="Calibri"/>
+              </a:rPr>
+              <a:t>Done - Air_Cauchy_SI_Air</a:t>
             </a:r>
             <a:endParaRPr/>
           </a:p>
@@ -3414,7 +3266,7 @@
       </p:grpSpPr>
       <p:pic>
         <p:nvPicPr>
-          <p:cNvPr id="86" name="Picture 1" descr=""/>
+          <p:cNvPr id="80" name="Picture 1" descr=""/>
           <p:cNvPicPr/>
           <p:nvPr/>
         </p:nvPicPr>
@@ -3427,7 +3279,7 @@
         <p:spPr>
           <a:xfrm>
             <a:off x="0" y="0"/>
-            <a:ext cx="12191760" cy="6857640"/>
+            <a:ext cx="12191400" cy="6857280"/>
           </a:xfrm>
           <a:prstGeom prst="rect">
             <a:avLst/>
@@ -3439,14 +3291,14 @@
       </p:pic>
       <p:sp>
         <p:nvSpPr>
-          <p:cNvPr id="87" name="CustomShape 1"/>
+          <p:cNvPr id="81" name="CustomShape 1"/>
           <p:cNvSpPr/>
           <p:nvPr/>
         </p:nvSpPr>
         <p:spPr>
           <a:xfrm>
             <a:off x="2161800" y="5159880"/>
-            <a:ext cx="3319200" cy="364680"/>
+            <a:ext cx="3318840" cy="364320"/>
           </a:xfrm>
           <a:prstGeom prst="rect">
             <a:avLst/>
@@ -3528,7 +3380,7 @@
       </p:grpSpPr>
       <p:pic>
         <p:nvPicPr>
-          <p:cNvPr id="88" name="Picture 1" descr=""/>
+          <p:cNvPr id="82" name="Picture 1" descr=""/>
           <p:cNvPicPr/>
           <p:nvPr/>
         </p:nvPicPr>
@@ -3541,7 +3393,7 @@
         <p:spPr>
           <a:xfrm>
             <a:off x="0" y="0"/>
-            <a:ext cx="12191760" cy="6857640"/>
+            <a:ext cx="12191400" cy="6857280"/>
           </a:xfrm>
           <a:prstGeom prst="rect">
             <a:avLst/>
@@ -3553,14 +3405,14 @@
       </p:pic>
       <p:sp>
         <p:nvSpPr>
-          <p:cNvPr id="89" name="CustomShape 1"/>
+          <p:cNvPr id="83" name="CustomShape 1"/>
           <p:cNvSpPr/>
           <p:nvPr/>
         </p:nvSpPr>
         <p:spPr>
           <a:xfrm>
             <a:off x="251640" y="5113080"/>
-            <a:ext cx="6013440" cy="364680"/>
+            <a:ext cx="6013080" cy="364320"/>
           </a:xfrm>
           <a:prstGeom prst="rect">
             <a:avLst/>
@@ -3589,8 +3441,99 @@
             </a:r>
             <a:endParaRPr/>
           </a:p>
-        </p:txBody>
-      </p:sp>
+          <a:p>
+            <a:pPr>
+              <a:lnSpc>
+                <a:spcPct val="100000"/>
+              </a:lnSpc>
+            </a:pPr>
+            <a:r>
+              <a:rPr lang="en-US">
+                <a:solidFill>
+                  <a:srgbClr val="000000"/>
+                </a:solidFill>
+                <a:latin typeface="Calibri"/>
+              </a:rPr>
+              <a:t>Done – Air_Cauchy_SI_Air2.m</a:t>
+            </a:r>
+            <a:endParaRPr/>
+          </a:p>
+        </p:txBody>
+      </p:sp>
+    </p:spTree>
+  </p:cSld>
+  <p:timing>
+    <p:tnLst>
+      <p:par>
+        <p:cTn id="11" dur="indefinite" restart="never" nodeType="tmRoot">
+          <p:childTnLst>
+            <p:seq>
+              <p:cTn id="12" nodeType="mainSeq"/>
+              <p:prevCondLst>
+                <p:cond delay="0" evt="onPrev">
+                  <p:tgtEl>
+                    <p:sldTgt/>
+                  </p:tgtEl>
+                </p:cond>
+              </p:prevCondLst>
+              <p:nextCondLst>
+                <p:cond delay="0" evt="onNext">
+                  <p:tgtEl>
+                    <p:sldTgt/>
+                  </p:tgtEl>
+                </p:cond>
+              </p:nextCondLst>
+            </p:seq>
+          </p:childTnLst>
+        </p:cTn>
+      </p:par>
+    </p:tnLst>
+  </p:timing>
+</p:sld>
+</file>
+
+<file path=ppt/slides/slide7.xml><?xml version="1.0" encoding="utf-8"?>
+<p:sld xmlns:a="http://schemas.openxmlformats.org/drawingml/2006/main" xmlns:p="http://schemas.openxmlformats.org/presentationml/2006/main" xmlns:r="http://schemas.openxmlformats.org/officeDocument/2006/relationships">
+  <p:cSld>
+    <p:spTree>
+      <p:nvGrpSpPr>
+        <p:cNvPr id="1" name=""/>
+        <p:cNvGrpSpPr/>
+        <p:nvPr/>
+      </p:nvGrpSpPr>
+      <p:grpSpPr>
+        <a:xfrm>
+          <a:off x="0" y="0"/>
+          <a:ext cx="0" cy="0"/>
+          <a:chOff x="0" y="0"/>
+          <a:chExt cx="0" cy="0"/>
+        </a:xfrm>
+      </p:grpSpPr>
+      <p:pic>
+        <p:nvPicPr>
+          <p:cNvPr id="84" name="Picture 3" descr=""/>
+          <p:cNvPicPr/>
+          <p:nvPr/>
+        </p:nvPicPr>
+        <p:blipFill>
+          <a:blip r:embed="rId1"/>
+          <a:stretch>
+            <a:fillRect/>
+          </a:stretch>
+        </p:blipFill>
+        <p:spPr>
+          <a:xfrm>
+            <a:off x="0" y="360"/>
+            <a:ext cx="12191760" cy="6857640"/>
+          </a:xfrm>
+          <a:prstGeom prst="rect">
+            <a:avLst/>
+          </a:prstGeom>
+          <a:ln>
+            <a:noFill/>
+          </a:ln>
+        </p:spPr>
+      </p:pic>
     </p:spTree>
   </p:cSld>
 </p:sld>

</xml_diff>

<commit_message>
Clean up in matlab code folder
</commit_message>
<xml_diff>
--- a/Thesis/matlab_code/Simulation_files_and_curves.pptx
+++ b/Thesis/matlab_code/Simulation_files_and_curves.pptx
@@ -4,15 +4,18 @@
   <p:sldMasterIdLst>
     <p:sldMasterId id="2147483648" r:id="rId2"/>
     <p:sldMasterId id="2147483661" r:id="rId3"/>
+    <p:sldMasterId id="2147483674" r:id="rId4"/>
   </p:sldMasterIdLst>
   <p:sldIdLst>
-    <p:sldId id="256" r:id="rId4"/>
-    <p:sldId id="257" r:id="rId5"/>
-    <p:sldId id="258" r:id="rId6"/>
-    <p:sldId id="259" r:id="rId7"/>
-    <p:sldId id="260" r:id="rId8"/>
-    <p:sldId id="261" r:id="rId9"/>
-    <p:sldId id="262" r:id="rId10"/>
+    <p:sldId id="256" r:id="rId5"/>
+    <p:sldId id="257" r:id="rId6"/>
+    <p:sldId id="258" r:id="rId7"/>
+    <p:sldId id="259" r:id="rId8"/>
+    <p:sldId id="260" r:id="rId9"/>
+    <p:sldId id="261" r:id="rId10"/>
+    <p:sldId id="262" r:id="rId11"/>
+    <p:sldId id="263" r:id="rId12"/>
+    <p:sldId id="264" r:id="rId13"/>
   </p:sldIdLst>
   <p:sldSz cx="12192000" cy="6858000"/>
   <p:notesSz cx="7772400" cy="10058400"/>
@@ -95,7 +98,6 @@
         <p:txBody>
           <a:bodyPr lIns="0" rIns="0" tIns="0" bIns="0" anchor="ctr"/>
           <a:p>
-            <a:pPr algn="ctr"/>
             <a:endParaRPr/>
           </a:p>
         </p:txBody>
@@ -196,7 +198,6 @@
         <p:txBody>
           <a:bodyPr lIns="0" rIns="0" tIns="0" bIns="0" anchor="ctr"/>
           <a:p>
-            <a:pPr algn="ctr"/>
             <a:endParaRPr/>
           </a:p>
         </p:txBody>
@@ -349,7 +350,6 @@
         <p:txBody>
           <a:bodyPr lIns="0" rIns="0" tIns="0" bIns="0" anchor="ctr"/>
           <a:p>
-            <a:pPr algn="ctr"/>
             <a:endParaRPr/>
           </a:p>
         </p:txBody>
@@ -522,7 +522,6 @@
         <p:txBody>
           <a:bodyPr lIns="0" rIns="0" tIns="0" bIns="0" anchor="ctr"/>
           <a:p>
-            <a:pPr algn="ctr"/>
             <a:endParaRPr/>
           </a:p>
         </p:txBody>
@@ -598,7 +597,6 @@
         <p:txBody>
           <a:bodyPr lIns="0" rIns="0" tIns="0" bIns="0" anchor="ctr"/>
           <a:p>
-            <a:pPr algn="ctr"/>
             <a:endParaRPr/>
           </a:p>
         </p:txBody>
@@ -673,7 +671,6 @@
         <p:txBody>
           <a:bodyPr lIns="0" rIns="0" tIns="0" bIns="0" anchor="ctr"/>
           <a:p>
-            <a:pPr algn="ctr"/>
             <a:endParaRPr/>
           </a:p>
         </p:txBody>
@@ -774,7 +771,6 @@
         <p:txBody>
           <a:bodyPr lIns="0" rIns="0" tIns="0" bIns="0" anchor="ctr"/>
           <a:p>
-            <a:pPr algn="ctr"/>
             <a:endParaRPr/>
           </a:p>
         </p:txBody>
@@ -872,7 +868,6 @@
         <p:txBody>
           <a:bodyPr lIns="0" rIns="0" tIns="0" bIns="0" anchor="ctr"/>
           <a:p>
-            <a:pPr algn="ctr"/>
             <a:endParaRPr/>
           </a:p>
         </p:txBody>
@@ -999,7 +994,6 @@
         <p:txBody>
           <a:bodyPr lIns="0" rIns="0" tIns="0" bIns="0" anchor="ctr"/>
           <a:p>
-            <a:pPr algn="ctr"/>
             <a:endParaRPr/>
           </a:p>
         </p:txBody>
@@ -1075,7 +1069,6 @@
         <p:txBody>
           <a:bodyPr lIns="0" rIns="0" tIns="0" bIns="0" anchor="ctr"/>
           <a:p>
-            <a:pPr algn="ctr"/>
             <a:endParaRPr/>
           </a:p>
         </p:txBody>
@@ -1202,7 +1195,6 @@
         <p:txBody>
           <a:bodyPr lIns="0" rIns="0" tIns="0" bIns="0" anchor="ctr"/>
           <a:p>
-            <a:pPr algn="ctr"/>
             <a:endParaRPr/>
           </a:p>
         </p:txBody>
@@ -1329,7 +1321,6 @@
         <p:txBody>
           <a:bodyPr lIns="0" rIns="0" tIns="0" bIns="0" anchor="ctr"/>
           <a:p>
-            <a:pPr algn="ctr"/>
             <a:endParaRPr/>
           </a:p>
         </p:txBody>
@@ -1430,7 +1421,6 @@
         <p:txBody>
           <a:bodyPr lIns="0" rIns="0" tIns="0" bIns="0" anchor="ctr"/>
           <a:p>
-            <a:pPr algn="ctr"/>
             <a:endParaRPr/>
           </a:p>
         </p:txBody>
@@ -1583,7 +1573,6 @@
         <p:txBody>
           <a:bodyPr lIns="0" rIns="0" tIns="0" bIns="0" anchor="ctr"/>
           <a:p>
-            <a:pPr algn="ctr"/>
             <a:endParaRPr/>
           </a:p>
         </p:txBody>
@@ -1690,6 +1679,325 @@
           </a:ln>
         </p:spPr>
       </p:pic>
+    </p:spTree>
+  </p:cSld>
+</p:sldLayout>
+</file>
+
+<file path=ppt/slideLayouts/slideLayout25.xml><?xml version="1.0" encoding="utf-8"?>
+<p:sldLayout xmlns:a="http://schemas.openxmlformats.org/drawingml/2006/main" xmlns:p="http://schemas.openxmlformats.org/presentationml/2006/main" xmlns:r="http://schemas.openxmlformats.org/officeDocument/2006/relationships" type="blank" preserve="1">
+  <p:cSld name="Blank Slide">
+    <p:spTree>
+      <p:nvGrpSpPr>
+        <p:cNvPr id="1" name=""/>
+        <p:cNvGrpSpPr/>
+        <p:nvPr/>
+      </p:nvGrpSpPr>
+      <p:grpSpPr>
+        <a:xfrm>
+          <a:off x="0" y="0"/>
+          <a:ext cx="0" cy="0"/>
+          <a:chOff x="0" y="0"/>
+          <a:chExt cx="0" cy="0"/>
+        </a:xfrm>
+      </p:grpSpPr>
+    </p:spTree>
+  </p:cSld>
+</p:sldLayout>
+</file>
+
+<file path=ppt/slideLayouts/slideLayout26.xml><?xml version="1.0" encoding="utf-8"?>
+<p:sldLayout xmlns:a="http://schemas.openxmlformats.org/drawingml/2006/main" xmlns:p="http://schemas.openxmlformats.org/presentationml/2006/main" xmlns:r="http://schemas.openxmlformats.org/officeDocument/2006/relationships" type="tx" preserve="1">
+  <p:cSld name="Title Slide">
+    <p:spTree>
+      <p:nvGrpSpPr>
+        <p:cNvPr id="1" name=""/>
+        <p:cNvGrpSpPr/>
+        <p:nvPr/>
+      </p:nvGrpSpPr>
+      <p:grpSpPr>
+        <a:xfrm>
+          <a:off x="0" y="0"/>
+          <a:ext cx="0" cy="0"/>
+          <a:chOff x="0" y="0"/>
+          <a:chExt cx="0" cy="0"/>
+        </a:xfrm>
+      </p:grpSpPr>
+      <p:sp>
+        <p:nvSpPr>
+          <p:cNvPr id="77" name="PlaceHolder 1"/>
+          <p:cNvSpPr>
+            <a:spLocks noGrp="1"/>
+          </p:cNvSpPr>
+          <p:nvPr>
+            <p:ph type="title"/>
+          </p:nvPr>
+        </p:nvSpPr>
+        <p:spPr>
+          <a:xfrm>
+            <a:off x="609480" y="273600"/>
+            <a:ext cx="10972440" cy="1145160"/>
+          </a:xfrm>
+          <a:prstGeom prst="rect">
+            <a:avLst/>
+          </a:prstGeom>
+        </p:spPr>
+        <p:txBody>
+          <a:bodyPr lIns="0" rIns="0" tIns="0" bIns="0" anchor="ctr"/>
+          <a:p>
+            <a:endParaRPr/>
+          </a:p>
+        </p:txBody>
+      </p:sp>
+      <p:sp>
+        <p:nvSpPr>
+          <p:cNvPr id="78" name="PlaceHolder 2"/>
+          <p:cNvSpPr>
+            <a:spLocks noGrp="1"/>
+          </p:cNvSpPr>
+          <p:nvPr>
+            <p:ph type="subTitle"/>
+          </p:nvPr>
+        </p:nvSpPr>
+        <p:spPr>
+          <a:xfrm>
+            <a:off x="609480" y="1604520"/>
+            <a:ext cx="10972440" cy="3977640"/>
+          </a:xfrm>
+          <a:prstGeom prst="rect">
+            <a:avLst/>
+          </a:prstGeom>
+        </p:spPr>
+        <p:txBody>
+          <a:bodyPr lIns="0" rIns="0" tIns="0" bIns="0" anchor="ctr"/>
+          <a:p>
+            <a:pPr algn="ctr"/>
+            <a:endParaRPr/>
+          </a:p>
+        </p:txBody>
+      </p:sp>
+    </p:spTree>
+  </p:cSld>
+</p:sldLayout>
+</file>
+
+<file path=ppt/slideLayouts/slideLayout27.xml><?xml version="1.0" encoding="utf-8"?>
+<p:sldLayout xmlns:a="http://schemas.openxmlformats.org/drawingml/2006/main" xmlns:p="http://schemas.openxmlformats.org/presentationml/2006/main" xmlns:r="http://schemas.openxmlformats.org/officeDocument/2006/relationships" type="obj" preserve="1">
+  <p:cSld name="Title, Content">
+    <p:spTree>
+      <p:nvGrpSpPr>
+        <p:cNvPr id="1" name=""/>
+        <p:cNvGrpSpPr/>
+        <p:nvPr/>
+      </p:nvGrpSpPr>
+      <p:grpSpPr>
+        <a:xfrm>
+          <a:off x="0" y="0"/>
+          <a:ext cx="0" cy="0"/>
+          <a:chOff x="0" y="0"/>
+          <a:chExt cx="0" cy="0"/>
+        </a:xfrm>
+      </p:grpSpPr>
+      <p:sp>
+        <p:nvSpPr>
+          <p:cNvPr id="79" name="PlaceHolder 1"/>
+          <p:cNvSpPr>
+            <a:spLocks noGrp="1"/>
+          </p:cNvSpPr>
+          <p:nvPr>
+            <p:ph type="title"/>
+          </p:nvPr>
+        </p:nvSpPr>
+        <p:spPr>
+          <a:xfrm>
+            <a:off x="609480" y="273600"/>
+            <a:ext cx="10972440" cy="1145160"/>
+          </a:xfrm>
+          <a:prstGeom prst="rect">
+            <a:avLst/>
+          </a:prstGeom>
+        </p:spPr>
+        <p:txBody>
+          <a:bodyPr lIns="0" rIns="0" tIns="0" bIns="0" anchor="ctr"/>
+          <a:p>
+            <a:endParaRPr/>
+          </a:p>
+        </p:txBody>
+      </p:sp>
+      <p:sp>
+        <p:nvSpPr>
+          <p:cNvPr id="80" name="PlaceHolder 2"/>
+          <p:cNvSpPr>
+            <a:spLocks noGrp="1"/>
+          </p:cNvSpPr>
+          <p:nvPr>
+            <p:ph type="body"/>
+          </p:nvPr>
+        </p:nvSpPr>
+        <p:spPr>
+          <a:xfrm>
+            <a:off x="609480" y="1604520"/>
+            <a:ext cx="10972440" cy="3977280"/>
+          </a:xfrm>
+          <a:prstGeom prst="rect">
+            <a:avLst/>
+          </a:prstGeom>
+        </p:spPr>
+        <p:txBody>
+          <a:bodyPr lIns="0" rIns="0" tIns="0" bIns="0"/>
+          <a:p>
+            <a:endParaRPr/>
+          </a:p>
+        </p:txBody>
+      </p:sp>
+    </p:spTree>
+  </p:cSld>
+</p:sldLayout>
+</file>
+
+<file path=ppt/slideLayouts/slideLayout28.xml><?xml version="1.0" encoding="utf-8"?>
+<p:sldLayout xmlns:a="http://schemas.openxmlformats.org/drawingml/2006/main" xmlns:p="http://schemas.openxmlformats.org/presentationml/2006/main" xmlns:r="http://schemas.openxmlformats.org/officeDocument/2006/relationships" type="twoObj" preserve="1">
+  <p:cSld name="Title, 2 Content">
+    <p:spTree>
+      <p:nvGrpSpPr>
+        <p:cNvPr id="1" name=""/>
+        <p:cNvGrpSpPr/>
+        <p:nvPr/>
+      </p:nvGrpSpPr>
+      <p:grpSpPr>
+        <a:xfrm>
+          <a:off x="0" y="0"/>
+          <a:ext cx="0" cy="0"/>
+          <a:chOff x="0" y="0"/>
+          <a:chExt cx="0" cy="0"/>
+        </a:xfrm>
+      </p:grpSpPr>
+      <p:sp>
+        <p:nvSpPr>
+          <p:cNvPr id="81" name="PlaceHolder 1"/>
+          <p:cNvSpPr>
+            <a:spLocks noGrp="1"/>
+          </p:cNvSpPr>
+          <p:nvPr>
+            <p:ph type="title"/>
+          </p:nvPr>
+        </p:nvSpPr>
+        <p:spPr>
+          <a:xfrm>
+            <a:off x="609480" y="273600"/>
+            <a:ext cx="10972440" cy="1145160"/>
+          </a:xfrm>
+          <a:prstGeom prst="rect">
+            <a:avLst/>
+          </a:prstGeom>
+        </p:spPr>
+        <p:txBody>
+          <a:bodyPr lIns="0" rIns="0" tIns="0" bIns="0" anchor="ctr"/>
+          <a:p>
+            <a:endParaRPr/>
+          </a:p>
+        </p:txBody>
+      </p:sp>
+      <p:sp>
+        <p:nvSpPr>
+          <p:cNvPr id="82" name="PlaceHolder 2"/>
+          <p:cNvSpPr>
+            <a:spLocks noGrp="1"/>
+          </p:cNvSpPr>
+          <p:nvPr>
+            <p:ph type="body"/>
+          </p:nvPr>
+        </p:nvSpPr>
+        <p:spPr>
+          <a:xfrm>
+            <a:off x="609480" y="1604520"/>
+            <a:ext cx="5354280" cy="3977280"/>
+          </a:xfrm>
+          <a:prstGeom prst="rect">
+            <a:avLst/>
+          </a:prstGeom>
+        </p:spPr>
+        <p:txBody>
+          <a:bodyPr lIns="0" rIns="0" tIns="0" bIns="0"/>
+          <a:p>
+            <a:endParaRPr/>
+          </a:p>
+        </p:txBody>
+      </p:sp>
+      <p:sp>
+        <p:nvSpPr>
+          <p:cNvPr id="83" name="PlaceHolder 3"/>
+          <p:cNvSpPr>
+            <a:spLocks noGrp="1"/>
+          </p:cNvSpPr>
+          <p:nvPr>
+            <p:ph type="body"/>
+          </p:nvPr>
+        </p:nvSpPr>
+        <p:spPr>
+          <a:xfrm>
+            <a:off x="6231960" y="1604520"/>
+            <a:ext cx="5354280" cy="3977280"/>
+          </a:xfrm>
+          <a:prstGeom prst="rect">
+            <a:avLst/>
+          </a:prstGeom>
+        </p:spPr>
+        <p:txBody>
+          <a:bodyPr lIns="0" rIns="0" tIns="0" bIns="0"/>
+          <a:p>
+            <a:endParaRPr/>
+          </a:p>
+        </p:txBody>
+      </p:sp>
+    </p:spTree>
+  </p:cSld>
+</p:sldLayout>
+</file>
+
+<file path=ppt/slideLayouts/slideLayout29.xml><?xml version="1.0" encoding="utf-8"?>
+<p:sldLayout xmlns:a="http://schemas.openxmlformats.org/drawingml/2006/main" xmlns:p="http://schemas.openxmlformats.org/presentationml/2006/main" xmlns:r="http://schemas.openxmlformats.org/officeDocument/2006/relationships" type="titleOnly" preserve="1">
+  <p:cSld name="Title Only">
+    <p:spTree>
+      <p:nvGrpSpPr>
+        <p:cNvPr id="1" name=""/>
+        <p:cNvGrpSpPr/>
+        <p:nvPr/>
+      </p:nvGrpSpPr>
+      <p:grpSpPr>
+        <a:xfrm>
+          <a:off x="0" y="0"/>
+          <a:ext cx="0" cy="0"/>
+          <a:chOff x="0" y="0"/>
+          <a:chExt cx="0" cy="0"/>
+        </a:xfrm>
+      </p:grpSpPr>
+      <p:sp>
+        <p:nvSpPr>
+          <p:cNvPr id="84" name="PlaceHolder 1"/>
+          <p:cNvSpPr>
+            <a:spLocks noGrp="1"/>
+          </p:cNvSpPr>
+          <p:nvPr>
+            <p:ph type="title"/>
+          </p:nvPr>
+        </p:nvSpPr>
+        <p:spPr>
+          <a:xfrm>
+            <a:off x="609480" y="273600"/>
+            <a:ext cx="10972440" cy="1145160"/>
+          </a:xfrm>
+          <a:prstGeom prst="rect">
+            <a:avLst/>
+          </a:prstGeom>
+        </p:spPr>
+        <p:txBody>
+          <a:bodyPr lIns="0" rIns="0" tIns="0" bIns="0" anchor="ctr"/>
+          <a:p>
+            <a:endParaRPr/>
+          </a:p>
+        </p:txBody>
+      </p:sp>
     </p:spTree>
   </p:cSld>
 </p:sldLayout>
@@ -1734,7 +2042,6 @@
         <p:txBody>
           <a:bodyPr lIns="0" rIns="0" tIns="0" bIns="0" anchor="ctr"/>
           <a:p>
-            <a:pPr algn="ctr"/>
             <a:endParaRPr/>
           </a:p>
         </p:txBody>
@@ -1765,6 +2072,835 @@
           </a:p>
         </p:txBody>
       </p:sp>
+    </p:spTree>
+  </p:cSld>
+</p:sldLayout>
+</file>
+
+<file path=ppt/slideLayouts/slideLayout30.xml><?xml version="1.0" encoding="utf-8"?>
+<p:sldLayout xmlns:a="http://schemas.openxmlformats.org/drawingml/2006/main" xmlns:p="http://schemas.openxmlformats.org/presentationml/2006/main" xmlns:r="http://schemas.openxmlformats.org/officeDocument/2006/relationships" type="objOnly" preserve="1">
+  <p:cSld name="Centered Text">
+    <p:spTree>
+      <p:nvGrpSpPr>
+        <p:cNvPr id="1" name=""/>
+        <p:cNvGrpSpPr/>
+        <p:nvPr/>
+      </p:nvGrpSpPr>
+      <p:grpSpPr>
+        <a:xfrm>
+          <a:off x="0" y="0"/>
+          <a:ext cx="0" cy="0"/>
+          <a:chOff x="0" y="0"/>
+          <a:chExt cx="0" cy="0"/>
+        </a:xfrm>
+      </p:grpSpPr>
+      <p:sp>
+        <p:nvSpPr>
+          <p:cNvPr id="85" name="PlaceHolder 1"/>
+          <p:cNvSpPr>
+            <a:spLocks noGrp="1"/>
+          </p:cNvSpPr>
+          <p:nvPr>
+            <p:ph type="subTitle"/>
+          </p:nvPr>
+        </p:nvSpPr>
+        <p:spPr>
+          <a:xfrm>
+            <a:off x="609480" y="273600"/>
+            <a:ext cx="10972440" cy="5308200"/>
+          </a:xfrm>
+          <a:prstGeom prst="rect">
+            <a:avLst/>
+          </a:prstGeom>
+        </p:spPr>
+        <p:txBody>
+          <a:bodyPr lIns="0" rIns="0" tIns="0" bIns="0" anchor="ctr"/>
+          <a:p>
+            <a:pPr algn="ctr"/>
+            <a:endParaRPr/>
+          </a:p>
+        </p:txBody>
+      </p:sp>
+    </p:spTree>
+  </p:cSld>
+</p:sldLayout>
+</file>
+
+<file path=ppt/slideLayouts/slideLayout31.xml><?xml version="1.0" encoding="utf-8"?>
+<p:sldLayout xmlns:a="http://schemas.openxmlformats.org/drawingml/2006/main" xmlns:p="http://schemas.openxmlformats.org/presentationml/2006/main" xmlns:r="http://schemas.openxmlformats.org/officeDocument/2006/relationships" type="twoObjAndObj" preserve="1">
+  <p:cSld name="Title, 2 Content and Content">
+    <p:spTree>
+      <p:nvGrpSpPr>
+        <p:cNvPr id="1" name=""/>
+        <p:cNvGrpSpPr/>
+        <p:nvPr/>
+      </p:nvGrpSpPr>
+      <p:grpSpPr>
+        <a:xfrm>
+          <a:off x="0" y="0"/>
+          <a:ext cx="0" cy="0"/>
+          <a:chOff x="0" y="0"/>
+          <a:chExt cx="0" cy="0"/>
+        </a:xfrm>
+      </p:grpSpPr>
+      <p:sp>
+        <p:nvSpPr>
+          <p:cNvPr id="86" name="PlaceHolder 1"/>
+          <p:cNvSpPr>
+            <a:spLocks noGrp="1"/>
+          </p:cNvSpPr>
+          <p:nvPr>
+            <p:ph type="title"/>
+          </p:nvPr>
+        </p:nvSpPr>
+        <p:spPr>
+          <a:xfrm>
+            <a:off x="609480" y="273600"/>
+            <a:ext cx="10972440" cy="1145160"/>
+          </a:xfrm>
+          <a:prstGeom prst="rect">
+            <a:avLst/>
+          </a:prstGeom>
+        </p:spPr>
+        <p:txBody>
+          <a:bodyPr lIns="0" rIns="0" tIns="0" bIns="0" anchor="ctr"/>
+          <a:p>
+            <a:endParaRPr/>
+          </a:p>
+        </p:txBody>
+      </p:sp>
+      <p:sp>
+        <p:nvSpPr>
+          <p:cNvPr id="87" name="PlaceHolder 2"/>
+          <p:cNvSpPr>
+            <a:spLocks noGrp="1"/>
+          </p:cNvSpPr>
+          <p:nvPr>
+            <p:ph type="body"/>
+          </p:nvPr>
+        </p:nvSpPr>
+        <p:spPr>
+          <a:xfrm>
+            <a:off x="609480" y="1604520"/>
+            <a:ext cx="5354280" cy="1896840"/>
+          </a:xfrm>
+          <a:prstGeom prst="rect">
+            <a:avLst/>
+          </a:prstGeom>
+        </p:spPr>
+        <p:txBody>
+          <a:bodyPr lIns="0" rIns="0" tIns="0" bIns="0"/>
+          <a:p>
+            <a:endParaRPr/>
+          </a:p>
+        </p:txBody>
+      </p:sp>
+      <p:sp>
+        <p:nvSpPr>
+          <p:cNvPr id="88" name="PlaceHolder 3"/>
+          <p:cNvSpPr>
+            <a:spLocks noGrp="1"/>
+          </p:cNvSpPr>
+          <p:nvPr>
+            <p:ph type="body"/>
+          </p:nvPr>
+        </p:nvSpPr>
+        <p:spPr>
+          <a:xfrm>
+            <a:off x="609480" y="3682080"/>
+            <a:ext cx="5354280" cy="1896840"/>
+          </a:xfrm>
+          <a:prstGeom prst="rect">
+            <a:avLst/>
+          </a:prstGeom>
+        </p:spPr>
+        <p:txBody>
+          <a:bodyPr lIns="0" rIns="0" tIns="0" bIns="0"/>
+          <a:p>
+            <a:endParaRPr/>
+          </a:p>
+        </p:txBody>
+      </p:sp>
+      <p:sp>
+        <p:nvSpPr>
+          <p:cNvPr id="89" name="PlaceHolder 4"/>
+          <p:cNvSpPr>
+            <a:spLocks noGrp="1"/>
+          </p:cNvSpPr>
+          <p:nvPr>
+            <p:ph type="body"/>
+          </p:nvPr>
+        </p:nvSpPr>
+        <p:spPr>
+          <a:xfrm>
+            <a:off x="6231960" y="1604520"/>
+            <a:ext cx="5354280" cy="3977280"/>
+          </a:xfrm>
+          <a:prstGeom prst="rect">
+            <a:avLst/>
+          </a:prstGeom>
+        </p:spPr>
+        <p:txBody>
+          <a:bodyPr lIns="0" rIns="0" tIns="0" bIns="0"/>
+          <a:p>
+            <a:endParaRPr/>
+          </a:p>
+        </p:txBody>
+      </p:sp>
+    </p:spTree>
+  </p:cSld>
+</p:sldLayout>
+</file>
+
+<file path=ppt/slideLayouts/slideLayout32.xml><?xml version="1.0" encoding="utf-8"?>
+<p:sldLayout xmlns:a="http://schemas.openxmlformats.org/drawingml/2006/main" xmlns:p="http://schemas.openxmlformats.org/presentationml/2006/main" xmlns:r="http://schemas.openxmlformats.org/officeDocument/2006/relationships" type="objAndTwoObj" preserve="1">
+  <p:cSld name="Title Content and 2 Content">
+    <p:spTree>
+      <p:nvGrpSpPr>
+        <p:cNvPr id="1" name=""/>
+        <p:cNvGrpSpPr/>
+        <p:nvPr/>
+      </p:nvGrpSpPr>
+      <p:grpSpPr>
+        <a:xfrm>
+          <a:off x="0" y="0"/>
+          <a:ext cx="0" cy="0"/>
+          <a:chOff x="0" y="0"/>
+          <a:chExt cx="0" cy="0"/>
+        </a:xfrm>
+      </p:grpSpPr>
+      <p:sp>
+        <p:nvSpPr>
+          <p:cNvPr id="90" name="PlaceHolder 1"/>
+          <p:cNvSpPr>
+            <a:spLocks noGrp="1"/>
+          </p:cNvSpPr>
+          <p:nvPr>
+            <p:ph type="title"/>
+          </p:nvPr>
+        </p:nvSpPr>
+        <p:spPr>
+          <a:xfrm>
+            <a:off x="609480" y="273600"/>
+            <a:ext cx="10972440" cy="1145160"/>
+          </a:xfrm>
+          <a:prstGeom prst="rect">
+            <a:avLst/>
+          </a:prstGeom>
+        </p:spPr>
+        <p:txBody>
+          <a:bodyPr lIns="0" rIns="0" tIns="0" bIns="0" anchor="ctr"/>
+          <a:p>
+            <a:endParaRPr/>
+          </a:p>
+        </p:txBody>
+      </p:sp>
+      <p:sp>
+        <p:nvSpPr>
+          <p:cNvPr id="91" name="PlaceHolder 2"/>
+          <p:cNvSpPr>
+            <a:spLocks noGrp="1"/>
+          </p:cNvSpPr>
+          <p:nvPr>
+            <p:ph type="body"/>
+          </p:nvPr>
+        </p:nvSpPr>
+        <p:spPr>
+          <a:xfrm>
+            <a:off x="609480" y="1604520"/>
+            <a:ext cx="5354280" cy="3977280"/>
+          </a:xfrm>
+          <a:prstGeom prst="rect">
+            <a:avLst/>
+          </a:prstGeom>
+        </p:spPr>
+        <p:txBody>
+          <a:bodyPr lIns="0" rIns="0" tIns="0" bIns="0"/>
+          <a:p>
+            <a:endParaRPr/>
+          </a:p>
+        </p:txBody>
+      </p:sp>
+      <p:sp>
+        <p:nvSpPr>
+          <p:cNvPr id="92" name="PlaceHolder 3"/>
+          <p:cNvSpPr>
+            <a:spLocks noGrp="1"/>
+          </p:cNvSpPr>
+          <p:nvPr>
+            <p:ph type="body"/>
+          </p:nvPr>
+        </p:nvSpPr>
+        <p:spPr>
+          <a:xfrm>
+            <a:off x="6231960" y="1604520"/>
+            <a:ext cx="5354280" cy="1896840"/>
+          </a:xfrm>
+          <a:prstGeom prst="rect">
+            <a:avLst/>
+          </a:prstGeom>
+        </p:spPr>
+        <p:txBody>
+          <a:bodyPr lIns="0" rIns="0" tIns="0" bIns="0"/>
+          <a:p>
+            <a:endParaRPr/>
+          </a:p>
+        </p:txBody>
+      </p:sp>
+      <p:sp>
+        <p:nvSpPr>
+          <p:cNvPr id="93" name="PlaceHolder 4"/>
+          <p:cNvSpPr>
+            <a:spLocks noGrp="1"/>
+          </p:cNvSpPr>
+          <p:nvPr>
+            <p:ph type="body"/>
+          </p:nvPr>
+        </p:nvSpPr>
+        <p:spPr>
+          <a:xfrm>
+            <a:off x="6231960" y="3682080"/>
+            <a:ext cx="5354280" cy="1896840"/>
+          </a:xfrm>
+          <a:prstGeom prst="rect">
+            <a:avLst/>
+          </a:prstGeom>
+        </p:spPr>
+        <p:txBody>
+          <a:bodyPr lIns="0" rIns="0" tIns="0" bIns="0"/>
+          <a:p>
+            <a:endParaRPr/>
+          </a:p>
+        </p:txBody>
+      </p:sp>
+    </p:spTree>
+  </p:cSld>
+</p:sldLayout>
+</file>
+
+<file path=ppt/slideLayouts/slideLayout33.xml><?xml version="1.0" encoding="utf-8"?>
+<p:sldLayout xmlns:a="http://schemas.openxmlformats.org/drawingml/2006/main" xmlns:p="http://schemas.openxmlformats.org/presentationml/2006/main" xmlns:r="http://schemas.openxmlformats.org/officeDocument/2006/relationships" type="twoObjOverTx" preserve="1">
+  <p:cSld name="Title, 2 Content over Content">
+    <p:spTree>
+      <p:nvGrpSpPr>
+        <p:cNvPr id="1" name=""/>
+        <p:cNvGrpSpPr/>
+        <p:nvPr/>
+      </p:nvGrpSpPr>
+      <p:grpSpPr>
+        <a:xfrm>
+          <a:off x="0" y="0"/>
+          <a:ext cx="0" cy="0"/>
+          <a:chOff x="0" y="0"/>
+          <a:chExt cx="0" cy="0"/>
+        </a:xfrm>
+      </p:grpSpPr>
+      <p:sp>
+        <p:nvSpPr>
+          <p:cNvPr id="94" name="PlaceHolder 1"/>
+          <p:cNvSpPr>
+            <a:spLocks noGrp="1"/>
+          </p:cNvSpPr>
+          <p:nvPr>
+            <p:ph type="title"/>
+          </p:nvPr>
+        </p:nvSpPr>
+        <p:spPr>
+          <a:xfrm>
+            <a:off x="609480" y="273600"/>
+            <a:ext cx="10972440" cy="1145160"/>
+          </a:xfrm>
+          <a:prstGeom prst="rect">
+            <a:avLst/>
+          </a:prstGeom>
+        </p:spPr>
+        <p:txBody>
+          <a:bodyPr lIns="0" rIns="0" tIns="0" bIns="0" anchor="ctr"/>
+          <a:p>
+            <a:endParaRPr/>
+          </a:p>
+        </p:txBody>
+      </p:sp>
+      <p:sp>
+        <p:nvSpPr>
+          <p:cNvPr id="95" name="PlaceHolder 2"/>
+          <p:cNvSpPr>
+            <a:spLocks noGrp="1"/>
+          </p:cNvSpPr>
+          <p:nvPr>
+            <p:ph type="body"/>
+          </p:nvPr>
+        </p:nvSpPr>
+        <p:spPr>
+          <a:xfrm>
+            <a:off x="609480" y="1604520"/>
+            <a:ext cx="5354280" cy="1896840"/>
+          </a:xfrm>
+          <a:prstGeom prst="rect">
+            <a:avLst/>
+          </a:prstGeom>
+        </p:spPr>
+        <p:txBody>
+          <a:bodyPr lIns="0" rIns="0" tIns="0" bIns="0"/>
+          <a:p>
+            <a:endParaRPr/>
+          </a:p>
+        </p:txBody>
+      </p:sp>
+      <p:sp>
+        <p:nvSpPr>
+          <p:cNvPr id="96" name="PlaceHolder 3"/>
+          <p:cNvSpPr>
+            <a:spLocks noGrp="1"/>
+          </p:cNvSpPr>
+          <p:nvPr>
+            <p:ph type="body"/>
+          </p:nvPr>
+        </p:nvSpPr>
+        <p:spPr>
+          <a:xfrm>
+            <a:off x="6231960" y="1604520"/>
+            <a:ext cx="5354280" cy="1896840"/>
+          </a:xfrm>
+          <a:prstGeom prst="rect">
+            <a:avLst/>
+          </a:prstGeom>
+        </p:spPr>
+        <p:txBody>
+          <a:bodyPr lIns="0" rIns="0" tIns="0" bIns="0"/>
+          <a:p>
+            <a:endParaRPr/>
+          </a:p>
+        </p:txBody>
+      </p:sp>
+      <p:sp>
+        <p:nvSpPr>
+          <p:cNvPr id="97" name="PlaceHolder 4"/>
+          <p:cNvSpPr>
+            <a:spLocks noGrp="1"/>
+          </p:cNvSpPr>
+          <p:nvPr>
+            <p:ph type="body"/>
+          </p:nvPr>
+        </p:nvSpPr>
+        <p:spPr>
+          <a:xfrm>
+            <a:off x="609480" y="3682080"/>
+            <a:ext cx="10972440" cy="1896840"/>
+          </a:xfrm>
+          <a:prstGeom prst="rect">
+            <a:avLst/>
+          </a:prstGeom>
+        </p:spPr>
+        <p:txBody>
+          <a:bodyPr lIns="0" rIns="0" tIns="0" bIns="0"/>
+          <a:p>
+            <a:endParaRPr/>
+          </a:p>
+        </p:txBody>
+      </p:sp>
+    </p:spTree>
+  </p:cSld>
+</p:sldLayout>
+</file>
+
+<file path=ppt/slideLayouts/slideLayout34.xml><?xml version="1.0" encoding="utf-8"?>
+<p:sldLayout xmlns:a="http://schemas.openxmlformats.org/drawingml/2006/main" xmlns:p="http://schemas.openxmlformats.org/presentationml/2006/main" xmlns:r="http://schemas.openxmlformats.org/officeDocument/2006/relationships" type="objOverTx" preserve="1">
+  <p:cSld name="Title, Content over Content">
+    <p:spTree>
+      <p:nvGrpSpPr>
+        <p:cNvPr id="1" name=""/>
+        <p:cNvGrpSpPr/>
+        <p:nvPr/>
+      </p:nvGrpSpPr>
+      <p:grpSpPr>
+        <a:xfrm>
+          <a:off x="0" y="0"/>
+          <a:ext cx="0" cy="0"/>
+          <a:chOff x="0" y="0"/>
+          <a:chExt cx="0" cy="0"/>
+        </a:xfrm>
+      </p:grpSpPr>
+      <p:sp>
+        <p:nvSpPr>
+          <p:cNvPr id="98" name="PlaceHolder 1"/>
+          <p:cNvSpPr>
+            <a:spLocks noGrp="1"/>
+          </p:cNvSpPr>
+          <p:nvPr>
+            <p:ph type="title"/>
+          </p:nvPr>
+        </p:nvSpPr>
+        <p:spPr>
+          <a:xfrm>
+            <a:off x="609480" y="273600"/>
+            <a:ext cx="10972440" cy="1145160"/>
+          </a:xfrm>
+          <a:prstGeom prst="rect">
+            <a:avLst/>
+          </a:prstGeom>
+        </p:spPr>
+        <p:txBody>
+          <a:bodyPr lIns="0" rIns="0" tIns="0" bIns="0" anchor="ctr"/>
+          <a:p>
+            <a:endParaRPr/>
+          </a:p>
+        </p:txBody>
+      </p:sp>
+      <p:sp>
+        <p:nvSpPr>
+          <p:cNvPr id="99" name="PlaceHolder 2"/>
+          <p:cNvSpPr>
+            <a:spLocks noGrp="1"/>
+          </p:cNvSpPr>
+          <p:nvPr>
+            <p:ph type="body"/>
+          </p:nvPr>
+        </p:nvSpPr>
+        <p:spPr>
+          <a:xfrm>
+            <a:off x="609480" y="1604520"/>
+            <a:ext cx="10972440" cy="1896840"/>
+          </a:xfrm>
+          <a:prstGeom prst="rect">
+            <a:avLst/>
+          </a:prstGeom>
+        </p:spPr>
+        <p:txBody>
+          <a:bodyPr lIns="0" rIns="0" tIns="0" bIns="0"/>
+          <a:p>
+            <a:endParaRPr/>
+          </a:p>
+        </p:txBody>
+      </p:sp>
+      <p:sp>
+        <p:nvSpPr>
+          <p:cNvPr id="100" name="PlaceHolder 3"/>
+          <p:cNvSpPr>
+            <a:spLocks noGrp="1"/>
+          </p:cNvSpPr>
+          <p:nvPr>
+            <p:ph type="body"/>
+          </p:nvPr>
+        </p:nvSpPr>
+        <p:spPr>
+          <a:xfrm>
+            <a:off x="609480" y="3682080"/>
+            <a:ext cx="10972440" cy="1896840"/>
+          </a:xfrm>
+          <a:prstGeom prst="rect">
+            <a:avLst/>
+          </a:prstGeom>
+        </p:spPr>
+        <p:txBody>
+          <a:bodyPr lIns="0" rIns="0" tIns="0" bIns="0"/>
+          <a:p>
+            <a:endParaRPr/>
+          </a:p>
+        </p:txBody>
+      </p:sp>
+    </p:spTree>
+  </p:cSld>
+</p:sldLayout>
+</file>
+
+<file path=ppt/slideLayouts/slideLayout35.xml><?xml version="1.0" encoding="utf-8"?>
+<p:sldLayout xmlns:a="http://schemas.openxmlformats.org/drawingml/2006/main" xmlns:p="http://schemas.openxmlformats.org/presentationml/2006/main" xmlns:r="http://schemas.openxmlformats.org/officeDocument/2006/relationships" type="fourObj" preserve="1">
+  <p:cSld name="Title, 4 Content">
+    <p:spTree>
+      <p:nvGrpSpPr>
+        <p:cNvPr id="1" name=""/>
+        <p:cNvGrpSpPr/>
+        <p:nvPr/>
+      </p:nvGrpSpPr>
+      <p:grpSpPr>
+        <a:xfrm>
+          <a:off x="0" y="0"/>
+          <a:ext cx="0" cy="0"/>
+          <a:chOff x="0" y="0"/>
+          <a:chExt cx="0" cy="0"/>
+        </a:xfrm>
+      </p:grpSpPr>
+      <p:sp>
+        <p:nvSpPr>
+          <p:cNvPr id="101" name="PlaceHolder 1"/>
+          <p:cNvSpPr>
+            <a:spLocks noGrp="1"/>
+          </p:cNvSpPr>
+          <p:nvPr>
+            <p:ph type="title"/>
+          </p:nvPr>
+        </p:nvSpPr>
+        <p:spPr>
+          <a:xfrm>
+            <a:off x="609480" y="273600"/>
+            <a:ext cx="10972440" cy="1145160"/>
+          </a:xfrm>
+          <a:prstGeom prst="rect">
+            <a:avLst/>
+          </a:prstGeom>
+        </p:spPr>
+        <p:txBody>
+          <a:bodyPr lIns="0" rIns="0" tIns="0" bIns="0" anchor="ctr"/>
+          <a:p>
+            <a:endParaRPr/>
+          </a:p>
+        </p:txBody>
+      </p:sp>
+      <p:sp>
+        <p:nvSpPr>
+          <p:cNvPr id="102" name="PlaceHolder 2"/>
+          <p:cNvSpPr>
+            <a:spLocks noGrp="1"/>
+          </p:cNvSpPr>
+          <p:nvPr>
+            <p:ph type="body"/>
+          </p:nvPr>
+        </p:nvSpPr>
+        <p:spPr>
+          <a:xfrm>
+            <a:off x="609480" y="1604520"/>
+            <a:ext cx="5354280" cy="1896840"/>
+          </a:xfrm>
+          <a:prstGeom prst="rect">
+            <a:avLst/>
+          </a:prstGeom>
+        </p:spPr>
+        <p:txBody>
+          <a:bodyPr lIns="0" rIns="0" tIns="0" bIns="0"/>
+          <a:p>
+            <a:endParaRPr/>
+          </a:p>
+        </p:txBody>
+      </p:sp>
+      <p:sp>
+        <p:nvSpPr>
+          <p:cNvPr id="103" name="PlaceHolder 3"/>
+          <p:cNvSpPr>
+            <a:spLocks noGrp="1"/>
+          </p:cNvSpPr>
+          <p:nvPr>
+            <p:ph type="body"/>
+          </p:nvPr>
+        </p:nvSpPr>
+        <p:spPr>
+          <a:xfrm>
+            <a:off x="6231960" y="1604520"/>
+            <a:ext cx="5354280" cy="1896840"/>
+          </a:xfrm>
+          <a:prstGeom prst="rect">
+            <a:avLst/>
+          </a:prstGeom>
+        </p:spPr>
+        <p:txBody>
+          <a:bodyPr lIns="0" rIns="0" tIns="0" bIns="0"/>
+          <a:p>
+            <a:endParaRPr/>
+          </a:p>
+        </p:txBody>
+      </p:sp>
+      <p:sp>
+        <p:nvSpPr>
+          <p:cNvPr id="104" name="PlaceHolder 4"/>
+          <p:cNvSpPr>
+            <a:spLocks noGrp="1"/>
+          </p:cNvSpPr>
+          <p:nvPr>
+            <p:ph type="body"/>
+          </p:nvPr>
+        </p:nvSpPr>
+        <p:spPr>
+          <a:xfrm>
+            <a:off x="6231960" y="3682080"/>
+            <a:ext cx="5354280" cy="1896840"/>
+          </a:xfrm>
+          <a:prstGeom prst="rect">
+            <a:avLst/>
+          </a:prstGeom>
+        </p:spPr>
+        <p:txBody>
+          <a:bodyPr lIns="0" rIns="0" tIns="0" bIns="0"/>
+          <a:p>
+            <a:endParaRPr/>
+          </a:p>
+        </p:txBody>
+      </p:sp>
+      <p:sp>
+        <p:nvSpPr>
+          <p:cNvPr id="105" name="PlaceHolder 5"/>
+          <p:cNvSpPr>
+            <a:spLocks noGrp="1"/>
+          </p:cNvSpPr>
+          <p:nvPr>
+            <p:ph type="body"/>
+          </p:nvPr>
+        </p:nvSpPr>
+        <p:spPr>
+          <a:xfrm>
+            <a:off x="609480" y="3682080"/>
+            <a:ext cx="5354280" cy="1896840"/>
+          </a:xfrm>
+          <a:prstGeom prst="rect">
+            <a:avLst/>
+          </a:prstGeom>
+        </p:spPr>
+        <p:txBody>
+          <a:bodyPr lIns="0" rIns="0" tIns="0" bIns="0"/>
+          <a:p>
+            <a:endParaRPr/>
+          </a:p>
+        </p:txBody>
+      </p:sp>
+    </p:spTree>
+  </p:cSld>
+</p:sldLayout>
+</file>
+
+<file path=ppt/slideLayouts/slideLayout36.xml><?xml version="1.0" encoding="utf-8"?>
+<p:sldLayout xmlns:a="http://schemas.openxmlformats.org/drawingml/2006/main" xmlns:p="http://schemas.openxmlformats.org/presentationml/2006/main" xmlns:r="http://schemas.openxmlformats.org/officeDocument/2006/relationships" type="blank" preserve="1">
+  <p:cSld name="Title, 6 Content">
+    <p:spTree>
+      <p:nvGrpSpPr>
+        <p:cNvPr id="1" name=""/>
+        <p:cNvGrpSpPr/>
+        <p:nvPr/>
+      </p:nvGrpSpPr>
+      <p:grpSpPr>
+        <a:xfrm>
+          <a:off x="0" y="0"/>
+          <a:ext cx="0" cy="0"/>
+          <a:chOff x="0" y="0"/>
+          <a:chExt cx="0" cy="0"/>
+        </a:xfrm>
+      </p:grpSpPr>
+      <p:sp>
+        <p:nvSpPr>
+          <p:cNvPr id="106" name="PlaceHolder 1"/>
+          <p:cNvSpPr>
+            <a:spLocks noGrp="1"/>
+          </p:cNvSpPr>
+          <p:nvPr>
+            <p:ph type="title"/>
+          </p:nvPr>
+        </p:nvSpPr>
+        <p:spPr>
+          <a:xfrm>
+            <a:off x="609480" y="273600"/>
+            <a:ext cx="10972440" cy="1145160"/>
+          </a:xfrm>
+          <a:prstGeom prst="rect">
+            <a:avLst/>
+          </a:prstGeom>
+        </p:spPr>
+        <p:txBody>
+          <a:bodyPr lIns="0" rIns="0" tIns="0" bIns="0" anchor="ctr"/>
+          <a:p>
+            <a:endParaRPr/>
+          </a:p>
+        </p:txBody>
+      </p:sp>
+      <p:sp>
+        <p:nvSpPr>
+          <p:cNvPr id="107" name="PlaceHolder 2"/>
+          <p:cNvSpPr>
+            <a:spLocks noGrp="1"/>
+          </p:cNvSpPr>
+          <p:nvPr>
+            <p:ph type="body"/>
+          </p:nvPr>
+        </p:nvSpPr>
+        <p:spPr>
+          <a:xfrm>
+            <a:off x="609480" y="1604520"/>
+            <a:ext cx="10972440" cy="3977280"/>
+          </a:xfrm>
+          <a:prstGeom prst="rect">
+            <a:avLst/>
+          </a:prstGeom>
+        </p:spPr>
+        <p:txBody>
+          <a:bodyPr lIns="0" rIns="0" tIns="0" bIns="0"/>
+          <a:p>
+            <a:endParaRPr/>
+          </a:p>
+        </p:txBody>
+      </p:sp>
+      <p:sp>
+        <p:nvSpPr>
+          <p:cNvPr id="108" name="PlaceHolder 3"/>
+          <p:cNvSpPr>
+            <a:spLocks noGrp="1"/>
+          </p:cNvSpPr>
+          <p:nvPr>
+            <p:ph type="body"/>
+          </p:nvPr>
+        </p:nvSpPr>
+        <p:spPr>
+          <a:xfrm>
+            <a:off x="609480" y="1604520"/>
+            <a:ext cx="10972440" cy="3977280"/>
+          </a:xfrm>
+          <a:prstGeom prst="rect">
+            <a:avLst/>
+          </a:prstGeom>
+        </p:spPr>
+        <p:txBody>
+          <a:bodyPr lIns="0" rIns="0" tIns="0" bIns="0"/>
+          <a:p>
+            <a:endParaRPr/>
+          </a:p>
+        </p:txBody>
+      </p:sp>
+      <p:pic>
+        <p:nvPicPr>
+          <p:cNvPr id="109" name="" descr=""/>
+          <p:cNvPicPr/>
+          <p:nvPr/>
+        </p:nvPicPr>
+        <p:blipFill>
+          <a:blip r:embed="rId2"/>
+          <a:stretch>
+            <a:fillRect/>
+          </a:stretch>
+        </p:blipFill>
+        <p:spPr>
+          <a:xfrm>
+            <a:off x="3602880" y="1604520"/>
+            <a:ext cx="4984920" cy="3977280"/>
+          </a:xfrm>
+          <a:prstGeom prst="rect">
+            <a:avLst/>
+          </a:prstGeom>
+          <a:ln>
+            <a:noFill/>
+          </a:ln>
+        </p:spPr>
+      </p:pic>
+      <p:pic>
+        <p:nvPicPr>
+          <p:cNvPr id="110" name="" descr=""/>
+          <p:cNvPicPr/>
+          <p:nvPr/>
+        </p:nvPicPr>
+        <p:blipFill>
+          <a:blip r:embed="rId3"/>
+          <a:stretch>
+            <a:fillRect/>
+          </a:stretch>
+        </p:blipFill>
+        <p:spPr>
+          <a:xfrm>
+            <a:off x="3602880" y="1604520"/>
+            <a:ext cx="4984920" cy="3977280"/>
+          </a:xfrm>
+          <a:prstGeom prst="rect">
+            <a:avLst/>
+          </a:prstGeom>
+          <a:ln>
+            <a:noFill/>
+          </a:ln>
+        </p:spPr>
+      </p:pic>
     </p:spTree>
   </p:cSld>
 </p:sldLayout>
@@ -1809,7 +2945,6 @@
         <p:txBody>
           <a:bodyPr lIns="0" rIns="0" tIns="0" bIns="0" anchor="ctr"/>
           <a:p>
-            <a:pPr algn="ctr"/>
             <a:endParaRPr/>
           </a:p>
         </p:txBody>
@@ -1910,7 +3045,6 @@
         <p:txBody>
           <a:bodyPr lIns="0" rIns="0" tIns="0" bIns="0" anchor="ctr"/>
           <a:p>
-            <a:pPr algn="ctr"/>
             <a:endParaRPr/>
           </a:p>
         </p:txBody>
@@ -2008,7 +3142,6 @@
         <p:txBody>
           <a:bodyPr lIns="0" rIns="0" tIns="0" bIns="0" anchor="ctr"/>
           <a:p>
-            <a:pPr algn="ctr"/>
             <a:endParaRPr/>
           </a:p>
         </p:txBody>
@@ -2135,7 +3268,6 @@
         <p:txBody>
           <a:bodyPr lIns="0" rIns="0" tIns="0" bIns="0" anchor="ctr"/>
           <a:p>
-            <a:pPr algn="ctr"/>
             <a:endParaRPr/>
           </a:p>
         </p:txBody>
@@ -2262,7 +3394,6 @@
         <p:txBody>
           <a:bodyPr lIns="0" rIns="0" tIns="0" bIns="0" anchor="ctr"/>
           <a:p>
-            <a:pPr algn="ctr"/>
             <a:endParaRPr/>
           </a:p>
         </p:txBody>
@@ -2419,7 +3550,7 @@
         <p:spPr>
           <a:xfrm>
             <a:off x="609480" y="1604520"/>
-            <a:ext cx="10972440" cy="3977280"/>
+            <a:ext cx="10972080" cy="3976920"/>
           </a:xfrm>
           <a:prstGeom prst="rect">
             <a:avLst/>
@@ -2434,7 +3565,7 @@
               <a:buChar char=""/>
             </a:pPr>
             <a:r>
-              <a:rPr lang="en-US" sz="3200">
+              <a:rPr lang="en-US">
                 <a:latin typeface="Arial"/>
               </a:rPr>
               <a:t>Click to edit the outline text format</a:t>
@@ -2448,7 +3579,7 @@
               <a:buChar char=""/>
             </a:pPr>
             <a:r>
-              <a:rPr lang="en-US" sz="2800">
+              <a:rPr lang="en-US">
                 <a:latin typeface="Arial"/>
               </a:rPr>
               <a:t>Second Outline Level</a:t>
@@ -2462,7 +3593,7 @@
               <a:buChar char=""/>
             </a:pPr>
             <a:r>
-              <a:rPr lang="en-US" sz="2400">
+              <a:rPr lang="en-US">
                 <a:latin typeface="Arial"/>
               </a:rPr>
               <a:t>Third Outline Level</a:t>
@@ -2476,7 +3607,7 @@
               <a:buChar char=""/>
             </a:pPr>
             <a:r>
-              <a:rPr lang="en-US" sz="2000">
+              <a:rPr lang="en-US">
                 <a:latin typeface="Arial"/>
               </a:rPr>
               <a:t>Fourth Outline Level</a:t>
@@ -2490,7 +3621,7 @@
               <a:buChar char=""/>
             </a:pPr>
             <a:r>
-              <a:rPr lang="en-US" sz="2000">
+              <a:rPr lang="en-US">
                 <a:latin typeface="Arial"/>
               </a:rPr>
               <a:t>Fifth Outline Level</a:t>
@@ -2504,7 +3635,7 @@
               <a:buChar char=""/>
             </a:pPr>
             <a:r>
-              <a:rPr lang="en-US" sz="2000">
+              <a:rPr lang="en-US">
                 <a:latin typeface="Arial"/>
               </a:rPr>
               <a:t>Sixth Outline Level</a:t>
@@ -2518,7 +3649,7 @@
               <a:buChar char=""/>
             </a:pPr>
             <a:r>
-              <a:rPr lang="en-US" sz="2000">
+              <a:rPr lang="en-US">
                 <a:latin typeface="Arial"/>
               </a:rPr>
               <a:t>Seventh Outline Level</a:t>
@@ -2745,6 +3876,309 @@
 </p:sldMaster>
 </file>
 
+<file path=ppt/slideMasters/slideMaster3.xml><?xml version="1.0" encoding="utf-8"?>
+<p:sldMaster xmlns:a="http://schemas.openxmlformats.org/drawingml/2006/main" xmlns:p="http://schemas.openxmlformats.org/presentationml/2006/main" xmlns:r="http://schemas.openxmlformats.org/officeDocument/2006/relationships">
+  <p:cSld>
+    <p:bg>
+      <p:bgPr>
+        <a:solidFill>
+          <a:srgbClr val="ffffff"/>
+        </a:solidFill>
+      </p:bgPr>
+    </p:bg>
+    <p:spTree>
+      <p:nvGrpSpPr>
+        <p:cNvPr id="1" name=""/>
+        <p:cNvGrpSpPr/>
+        <p:nvPr/>
+      </p:nvGrpSpPr>
+      <p:grpSpPr>
+        <a:xfrm>
+          <a:off x="0" y="0"/>
+          <a:ext cx="0" cy="0"/>
+          <a:chOff x="0" y="0"/>
+          <a:chExt cx="0" cy="0"/>
+        </a:xfrm>
+      </p:grpSpPr>
+      <p:sp>
+        <p:nvSpPr>
+          <p:cNvPr id="72" name="PlaceHolder 1"/>
+          <p:cNvSpPr>
+            <a:spLocks noGrp="1"/>
+          </p:cNvSpPr>
+          <p:nvPr>
+            <p:ph type="dt"/>
+          </p:nvPr>
+        </p:nvSpPr>
+        <p:spPr>
+          <a:xfrm>
+            <a:off x="838080" y="6356520"/>
+            <a:ext cx="2742840" cy="364680"/>
+          </a:xfrm>
+          <a:prstGeom prst="rect">
+            <a:avLst/>
+          </a:prstGeom>
+        </p:spPr>
+        <p:txBody>
+          <a:bodyPr anchor="ctr"/>
+          <a:p>
+            <a:pPr>
+              <a:lnSpc>
+                <a:spcPct val="100000"/>
+              </a:lnSpc>
+            </a:pPr>
+            <a:r>
+              <a:rPr lang="en-US" sz="1200">
+                <a:solidFill>
+                  <a:srgbClr val="8b8b8b"/>
+                </a:solidFill>
+                <a:latin typeface="Calibri"/>
+              </a:rPr>
+              <a:t>1/25/19</a:t>
+            </a:r>
+            <a:endParaRPr/>
+          </a:p>
+        </p:txBody>
+      </p:sp>
+      <p:sp>
+        <p:nvSpPr>
+          <p:cNvPr id="73" name="PlaceHolder 2"/>
+          <p:cNvSpPr>
+            <a:spLocks noGrp="1"/>
+          </p:cNvSpPr>
+          <p:nvPr>
+            <p:ph type="ftr"/>
+          </p:nvPr>
+        </p:nvSpPr>
+        <p:spPr>
+          <a:xfrm>
+            <a:off x="4038480" y="6356520"/>
+            <a:ext cx="4114440" cy="364680"/>
+          </a:xfrm>
+          <a:prstGeom prst="rect">
+            <a:avLst/>
+          </a:prstGeom>
+        </p:spPr>
+        <p:txBody>
+          <a:bodyPr anchor="ctr"/>
+          <a:p>
+            <a:endParaRPr/>
+          </a:p>
+        </p:txBody>
+      </p:sp>
+      <p:sp>
+        <p:nvSpPr>
+          <p:cNvPr id="74" name="PlaceHolder 3"/>
+          <p:cNvSpPr>
+            <a:spLocks noGrp="1"/>
+          </p:cNvSpPr>
+          <p:nvPr>
+            <p:ph type="sldNum"/>
+          </p:nvPr>
+        </p:nvSpPr>
+        <p:spPr>
+          <a:xfrm>
+            <a:off x="8610480" y="6356520"/>
+            <a:ext cx="2742840" cy="364680"/>
+          </a:xfrm>
+          <a:prstGeom prst="rect">
+            <a:avLst/>
+          </a:prstGeom>
+        </p:spPr>
+        <p:txBody>
+          <a:bodyPr anchor="ctr"/>
+          <a:p>
+            <a:pPr algn="r">
+              <a:lnSpc>
+                <a:spcPct val="100000"/>
+              </a:lnSpc>
+            </a:pPr>
+            <a:fld id="{FA82F5ED-7CF2-4C33-B097-DCBB668CAEDE}" type="slidenum">
+              <a:rPr lang="en-US" sz="1200">
+                <a:solidFill>
+                  <a:srgbClr val="8b8b8b"/>
+                </a:solidFill>
+                <a:latin typeface="Calibri"/>
+              </a:rPr>
+              <a:t>&lt;number&gt;</a:t>
+            </a:fld>
+            <a:endParaRPr/>
+          </a:p>
+        </p:txBody>
+      </p:sp>
+      <p:sp>
+        <p:nvSpPr>
+          <p:cNvPr id="75" name="PlaceHolder 4"/>
+          <p:cNvSpPr>
+            <a:spLocks noGrp="1"/>
+          </p:cNvSpPr>
+          <p:nvPr>
+            <p:ph type="title"/>
+          </p:nvPr>
+        </p:nvSpPr>
+        <p:spPr>
+          <a:xfrm>
+            <a:off x="609480" y="273600"/>
+            <a:ext cx="10972440" cy="1144800"/>
+          </a:xfrm>
+          <a:prstGeom prst="rect">
+            <a:avLst/>
+          </a:prstGeom>
+        </p:spPr>
+        <p:txBody>
+          <a:bodyPr lIns="0" rIns="0" tIns="0" bIns="0" anchor="ctr"/>
+          <a:p>
+            <a:r>
+              <a:rPr lang="da-DK">
+                <a:latin typeface="Calibri"/>
+              </a:rPr>
+              <a:t>Click to edit the title text format</a:t>
+            </a:r>
+            <a:endParaRPr/>
+          </a:p>
+        </p:txBody>
+      </p:sp>
+      <p:sp>
+        <p:nvSpPr>
+          <p:cNvPr id="76" name="PlaceHolder 5"/>
+          <p:cNvSpPr>
+            <a:spLocks noGrp="1"/>
+          </p:cNvSpPr>
+          <p:nvPr>
+            <p:ph type="body"/>
+          </p:nvPr>
+        </p:nvSpPr>
+        <p:spPr>
+          <a:xfrm>
+            <a:off x="609480" y="1604520"/>
+            <a:ext cx="10972440" cy="3977280"/>
+          </a:xfrm>
+          <a:prstGeom prst="rect">
+            <a:avLst/>
+          </a:prstGeom>
+        </p:spPr>
+        <p:txBody>
+          <a:bodyPr lIns="0" rIns="0" tIns="0" bIns="0"/>
+          <a:p>
+            <a:pPr>
+              <a:buSzPct val="45000"/>
+              <a:buFont typeface="StarSymbol"/>
+              <a:buChar char=""/>
+            </a:pPr>
+            <a:r>
+              <a:rPr lang="da-DK" sz="2800">
+                <a:latin typeface="Calibri"/>
+              </a:rPr>
+              <a:t>Click to edit the outline text format</a:t>
+            </a:r>
+            <a:endParaRPr/>
+          </a:p>
+          <a:p>
+            <a:pPr lvl="1">
+              <a:buSzPct val="75000"/>
+              <a:buFont typeface="StarSymbol"/>
+              <a:buChar char=""/>
+            </a:pPr>
+            <a:r>
+              <a:rPr lang="da-DK" sz="2000">
+                <a:latin typeface="Calibri"/>
+              </a:rPr>
+              <a:t>Second Outline Level</a:t>
+            </a:r>
+            <a:endParaRPr/>
+          </a:p>
+          <a:p>
+            <a:pPr lvl="2">
+              <a:buSzPct val="45000"/>
+              <a:buFont typeface="StarSymbol"/>
+              <a:buChar char=""/>
+            </a:pPr>
+            <a:r>
+              <a:rPr lang="da-DK">
+                <a:latin typeface="Calibri"/>
+              </a:rPr>
+              <a:t>Third Outline Level</a:t>
+            </a:r>
+            <a:endParaRPr/>
+          </a:p>
+          <a:p>
+            <a:pPr lvl="3">
+              <a:buSzPct val="75000"/>
+              <a:buFont typeface="StarSymbol"/>
+              <a:buChar char=""/>
+            </a:pPr>
+            <a:r>
+              <a:rPr lang="da-DK">
+                <a:latin typeface="Calibri"/>
+              </a:rPr>
+              <a:t>Fourth Outline Level</a:t>
+            </a:r>
+            <a:endParaRPr/>
+          </a:p>
+          <a:p>
+            <a:pPr lvl="4">
+              <a:buSzPct val="45000"/>
+              <a:buFont typeface="StarSymbol"/>
+              <a:buChar char=""/>
+            </a:pPr>
+            <a:r>
+              <a:rPr lang="da-DK" sz="2000">
+                <a:latin typeface="Calibri"/>
+              </a:rPr>
+              <a:t>Fifth Outline Level</a:t>
+            </a:r>
+            <a:endParaRPr/>
+          </a:p>
+          <a:p>
+            <a:pPr lvl="5">
+              <a:buSzPct val="45000"/>
+              <a:buFont typeface="StarSymbol"/>
+              <a:buChar char=""/>
+            </a:pPr>
+            <a:r>
+              <a:rPr lang="da-DK" sz="2000">
+                <a:latin typeface="Calibri"/>
+              </a:rPr>
+              <a:t>Sixth Outline Level</a:t>
+            </a:r>
+            <a:endParaRPr/>
+          </a:p>
+          <a:p>
+            <a:pPr lvl="6">
+              <a:buSzPct val="45000"/>
+              <a:buFont typeface="StarSymbol"/>
+              <a:buChar char=""/>
+            </a:pPr>
+            <a:r>
+              <a:rPr lang="da-DK" sz="2000">
+                <a:latin typeface="Calibri"/>
+              </a:rPr>
+              <a:t>Seventh Outline Level</a:t>
+            </a:r>
+            <a:endParaRPr/>
+          </a:p>
+        </p:txBody>
+      </p:sp>
+    </p:spTree>
+  </p:cSld>
+  <p:clrMap bg1="lt1" bg2="lt2" tx1="dk1" tx2="dk2" accent1="accent1" accent2="accent2" accent3="accent3" accent4="accent4" accent5="accent5" accent6="accent6" hlink="hlink" folHlink="folHlink"/>
+  <p:sldLayoutIdLst>
+    <p:sldLayoutId id="2147483675" r:id="rId2"/>
+    <p:sldLayoutId id="2147483676" r:id="rId3"/>
+    <p:sldLayoutId id="2147483677" r:id="rId4"/>
+    <p:sldLayoutId id="2147483678" r:id="rId5"/>
+    <p:sldLayoutId id="2147483679" r:id="rId6"/>
+    <p:sldLayoutId id="2147483680" r:id="rId7"/>
+    <p:sldLayoutId id="2147483681" r:id="rId8"/>
+    <p:sldLayoutId id="2147483682" r:id="rId9"/>
+    <p:sldLayoutId id="2147483683" r:id="rId10"/>
+    <p:sldLayoutId id="2147483684" r:id="rId11"/>
+    <p:sldLayoutId id="2147483685" r:id="rId12"/>
+    <p:sldLayoutId id="2147483686" r:id="rId13"/>
+  </p:sldLayoutIdLst>
+</p:sldMaster>
+</file>
+
 <file path=ppt/slides/slide1.xml><?xml version="1.0" encoding="utf-8"?>
 <p:sld xmlns:a="http://schemas.openxmlformats.org/drawingml/2006/main" xmlns:p="http://schemas.openxmlformats.org/presentationml/2006/main" xmlns:r="http://schemas.openxmlformats.org/officeDocument/2006/relationships">
   <p:cSld>
@@ -2764,14 +4198,14 @@
       </p:grpSpPr>
       <p:sp>
         <p:nvSpPr>
-          <p:cNvPr id="72" name="CustomShape 1"/>
+          <p:cNvPr id="111" name="CustomShape 1"/>
           <p:cNvSpPr/>
           <p:nvPr/>
         </p:nvSpPr>
         <p:spPr>
           <a:xfrm>
             <a:off x="1523880" y="1122480"/>
-            <a:ext cx="9143280" cy="2386800"/>
+            <a:ext cx="9142920" cy="2386440"/>
           </a:xfrm>
           <a:prstGeom prst="rect">
             <a:avLst/>
@@ -2804,14 +4238,14 @@
       </p:sp>
       <p:sp>
         <p:nvSpPr>
-          <p:cNvPr id="73" name="CustomShape 2"/>
+          <p:cNvPr id="112" name="CustomShape 2"/>
           <p:cNvSpPr/>
           <p:nvPr/>
         </p:nvSpPr>
         <p:spPr>
           <a:xfrm>
             <a:off x="1523880" y="3602160"/>
-            <a:ext cx="9143280" cy="1654920"/>
+            <a:ext cx="9142920" cy="1654560"/>
           </a:xfrm>
           <a:prstGeom prst="rect">
             <a:avLst/>
@@ -2873,7 +4307,7 @@
       </p:grpSpPr>
       <p:pic>
         <p:nvPicPr>
-          <p:cNvPr id="74" name="Picture 8" descr=""/>
+          <p:cNvPr id="113" name="Picture 8" descr=""/>
           <p:cNvPicPr/>
           <p:nvPr/>
         </p:nvPicPr>
@@ -2886,7 +4320,7 @@
         <p:spPr>
           <a:xfrm>
             <a:off x="0" y="0"/>
-            <a:ext cx="12191400" cy="6857280"/>
+            <a:ext cx="12191040" cy="6856920"/>
           </a:xfrm>
           <a:prstGeom prst="rect">
             <a:avLst/>
@@ -2898,14 +4332,14 @@
       </p:pic>
       <p:sp>
         <p:nvSpPr>
-          <p:cNvPr id="75" name="CustomShape 1"/>
+          <p:cNvPr id="114" name="CustomShape 1"/>
           <p:cNvSpPr/>
           <p:nvPr/>
         </p:nvSpPr>
         <p:spPr>
           <a:xfrm>
             <a:off x="3091680" y="5197320"/>
-            <a:ext cx="3368880" cy="637920"/>
+            <a:ext cx="3368520" cy="637560"/>
           </a:xfrm>
           <a:prstGeom prst="rect">
             <a:avLst/>
@@ -3004,7 +4438,7 @@
       </p:grpSpPr>
       <p:pic>
         <p:nvPicPr>
-          <p:cNvPr id="76" name="Picture 1" descr=""/>
+          <p:cNvPr id="115" name="Picture 1" descr=""/>
           <p:cNvPicPr/>
           <p:nvPr/>
         </p:nvPicPr>
@@ -3017,7 +4451,7 @@
         <p:spPr>
           <a:xfrm>
             <a:off x="0" y="-2520"/>
-            <a:ext cx="12195360" cy="6859800"/>
+            <a:ext cx="12195000" cy="6859440"/>
           </a:xfrm>
           <a:prstGeom prst="rect">
             <a:avLst/>
@@ -3029,14 +4463,14 @@
       </p:pic>
       <p:sp>
         <p:nvSpPr>
-          <p:cNvPr id="77" name="CustomShape 1"/>
+          <p:cNvPr id="116" name="CustomShape 1"/>
           <p:cNvSpPr/>
           <p:nvPr/>
         </p:nvSpPr>
         <p:spPr>
           <a:xfrm>
             <a:off x="1788120" y="5299920"/>
-            <a:ext cx="3050640" cy="637920"/>
+            <a:ext cx="3050280" cy="637560"/>
           </a:xfrm>
           <a:prstGeom prst="rect">
             <a:avLst/>
@@ -3135,7 +4569,7 @@
       </p:grpSpPr>
       <p:pic>
         <p:nvPicPr>
-          <p:cNvPr id="78" name="Picture 1" descr=""/>
+          <p:cNvPr id="117" name="Picture 1" descr=""/>
           <p:cNvPicPr/>
           <p:nvPr/>
         </p:nvPicPr>
@@ -3148,7 +4582,7 @@
         <p:spPr>
           <a:xfrm>
             <a:off x="0" y="0"/>
-            <a:ext cx="12191400" cy="6857280"/>
+            <a:ext cx="12191040" cy="6856920"/>
           </a:xfrm>
           <a:prstGeom prst="rect">
             <a:avLst/>
@@ -3160,14 +4594,14 @@
       </p:pic>
       <p:sp>
         <p:nvSpPr>
-          <p:cNvPr id="79" name="CustomShape 1"/>
+          <p:cNvPr id="118" name="CustomShape 1"/>
           <p:cNvSpPr/>
           <p:nvPr/>
         </p:nvSpPr>
         <p:spPr>
           <a:xfrm>
             <a:off x="2175120" y="5159880"/>
-            <a:ext cx="3152520" cy="364320"/>
+            <a:ext cx="3152160" cy="363960"/>
           </a:xfrm>
           <a:prstGeom prst="rect">
             <a:avLst/>
@@ -3266,7 +4700,7 @@
       </p:grpSpPr>
       <p:pic>
         <p:nvPicPr>
-          <p:cNvPr id="80" name="Picture 1" descr=""/>
+          <p:cNvPr id="119" name="Picture 1" descr=""/>
           <p:cNvPicPr/>
           <p:nvPr/>
         </p:nvPicPr>
@@ -3279,7 +4713,7 @@
         <p:spPr>
           <a:xfrm>
             <a:off x="0" y="0"/>
-            <a:ext cx="12191400" cy="6857280"/>
+            <a:ext cx="12191040" cy="6856920"/>
           </a:xfrm>
           <a:prstGeom prst="rect">
             <a:avLst/>
@@ -3291,14 +4725,14 @@
       </p:pic>
       <p:sp>
         <p:nvSpPr>
-          <p:cNvPr id="81" name="CustomShape 1"/>
+          <p:cNvPr id="120" name="CustomShape 1"/>
           <p:cNvSpPr/>
           <p:nvPr/>
         </p:nvSpPr>
         <p:spPr>
           <a:xfrm>
             <a:off x="2161800" y="5159880"/>
-            <a:ext cx="3318840" cy="364320"/>
+            <a:ext cx="3318480" cy="363960"/>
           </a:xfrm>
           <a:prstGeom prst="rect">
             <a:avLst/>
@@ -3380,7 +4814,7 @@
       </p:grpSpPr>
       <p:pic>
         <p:nvPicPr>
-          <p:cNvPr id="82" name="Picture 1" descr=""/>
+          <p:cNvPr id="121" name="Picture 1" descr=""/>
           <p:cNvPicPr/>
           <p:nvPr/>
         </p:nvPicPr>
@@ -3393,7 +4827,7 @@
         <p:spPr>
           <a:xfrm>
             <a:off x="0" y="0"/>
-            <a:ext cx="12191400" cy="6857280"/>
+            <a:ext cx="12191040" cy="6856920"/>
           </a:xfrm>
           <a:prstGeom prst="rect">
             <a:avLst/>
@@ -3405,14 +4839,14 @@
       </p:pic>
       <p:sp>
         <p:nvSpPr>
-          <p:cNvPr id="83" name="CustomShape 1"/>
+          <p:cNvPr id="122" name="CustomShape 1"/>
           <p:cNvSpPr/>
           <p:nvPr/>
         </p:nvSpPr>
         <p:spPr>
           <a:xfrm>
             <a:off x="251640" y="5113080"/>
-            <a:ext cx="6013080" cy="364320"/>
+            <a:ext cx="6012720" cy="363960"/>
           </a:xfrm>
           <a:prstGeom prst="rect">
             <a:avLst/>
@@ -3511,7 +4945,7 @@
       </p:grpSpPr>
       <p:pic>
         <p:nvPicPr>
-          <p:cNvPr id="84" name="Picture 3" descr=""/>
+          <p:cNvPr id="123" name="Picture 3" descr=""/>
           <p:cNvPicPr/>
           <p:nvPr/>
         </p:nvPicPr>
@@ -3524,7 +4958,7 @@
         <p:spPr>
           <a:xfrm>
             <a:off x="0" y="360"/>
-            <a:ext cx="12191760" cy="6857640"/>
+            <a:ext cx="12191400" cy="6857280"/>
           </a:xfrm>
           <a:prstGeom prst="rect">
             <a:avLst/>
@@ -3536,6 +4970,261 @@
       </p:pic>
     </p:spTree>
   </p:cSld>
+  <p:timing>
+    <p:tnLst>
+      <p:par>
+        <p:cTn id="13" dur="indefinite" restart="never" nodeType="tmRoot">
+          <p:childTnLst>
+            <p:seq>
+              <p:cTn id="14" nodeType="mainSeq"/>
+              <p:prevCondLst>
+                <p:cond delay="0" evt="onPrev">
+                  <p:tgtEl>
+                    <p:sldTgt/>
+                  </p:tgtEl>
+                </p:cond>
+              </p:prevCondLst>
+              <p:nextCondLst>
+                <p:cond delay="0" evt="onNext">
+                  <p:tgtEl>
+                    <p:sldTgt/>
+                  </p:tgtEl>
+                </p:cond>
+              </p:nextCondLst>
+            </p:seq>
+          </p:childTnLst>
+        </p:cTn>
+      </p:par>
+    </p:tnLst>
+  </p:timing>
+</p:sld>
+</file>
+
+<file path=ppt/slides/slide8.xml><?xml version="1.0" encoding="utf-8"?>
+<p:sld xmlns:a="http://schemas.openxmlformats.org/drawingml/2006/main" xmlns:p="http://schemas.openxmlformats.org/presentationml/2006/main" xmlns:r="http://schemas.openxmlformats.org/officeDocument/2006/relationships">
+  <p:cSld>
+    <p:spTree>
+      <p:nvGrpSpPr>
+        <p:cNvPr id="1" name=""/>
+        <p:cNvGrpSpPr/>
+        <p:nvPr/>
+      </p:nvGrpSpPr>
+      <p:grpSpPr>
+        <a:xfrm>
+          <a:off x="0" y="0"/>
+          <a:ext cx="0" cy="0"/>
+          <a:chOff x="0" y="0"/>
+          <a:chExt cx="0" cy="0"/>
+        </a:xfrm>
+      </p:grpSpPr>
+      <p:pic>
+        <p:nvPicPr>
+          <p:cNvPr id="124" name="Picture 1" descr=""/>
+          <p:cNvPicPr/>
+          <p:nvPr/>
+        </p:nvPicPr>
+        <p:blipFill>
+          <a:blip r:embed="rId1"/>
+          <a:stretch>
+            <a:fillRect/>
+          </a:stretch>
+        </p:blipFill>
+        <p:spPr>
+          <a:xfrm>
+            <a:off x="0" y="96480"/>
+            <a:ext cx="12191760" cy="6761160"/>
+          </a:xfrm>
+          <a:prstGeom prst="rect">
+            <a:avLst/>
+          </a:prstGeom>
+          <a:ln>
+            <a:noFill/>
+          </a:ln>
+        </p:spPr>
+      </p:pic>
+      <p:sp>
+        <p:nvSpPr>
+          <p:cNvPr id="125" name="CustomShape 1"/>
+          <p:cNvSpPr/>
+          <p:nvPr/>
+        </p:nvSpPr>
+        <p:spPr>
+          <a:xfrm>
+            <a:off x="236880" y="5319360"/>
+            <a:ext cx="3949920" cy="364680"/>
+          </a:xfrm>
+          <a:prstGeom prst="rect">
+            <a:avLst/>
+          </a:prstGeom>
+          <a:noFill/>
+          <a:ln>
+            <a:noFill/>
+          </a:ln>
+        </p:spPr>
+        <p:txBody>
+          <a:bodyPr wrap="none" lIns="90000" rIns="90000" tIns="45000" bIns="45000"/>
+          <a:p>
+            <a:pPr>
+              <a:lnSpc>
+                <a:spcPct val="100000"/>
+              </a:lnSpc>
+            </a:pPr>
+            <a:r>
+              <a:rPr lang="en-US">
+                <a:solidFill>
+                  <a:srgbClr val="000000"/>
+                </a:solidFill>
+                <a:latin typeface="Calibri"/>
+              </a:rPr>
+              <a:t>Filename: Air_Cauchy_SiOx_SI.xy</a:t>
+            </a:r>
+            <a:endParaRPr/>
+          </a:p>
+        </p:txBody>
+      </p:sp>
+    </p:spTree>
+  </p:cSld>
+  <p:timing>
+    <p:tnLst>
+      <p:par>
+        <p:cTn id="15" dur="indefinite" restart="never" nodeType="tmRoot">
+          <p:childTnLst>
+            <p:seq>
+              <p:cTn id="16" nodeType="mainSeq"/>
+              <p:prevCondLst>
+                <p:cond delay="0" evt="onPrev">
+                  <p:tgtEl>
+                    <p:sldTgt/>
+                  </p:tgtEl>
+                </p:cond>
+              </p:prevCondLst>
+              <p:nextCondLst>
+                <p:cond delay="0" evt="onNext">
+                  <p:tgtEl>
+                    <p:sldTgt/>
+                  </p:tgtEl>
+                </p:cond>
+              </p:nextCondLst>
+            </p:seq>
+          </p:childTnLst>
+        </p:cTn>
+      </p:par>
+    </p:tnLst>
+  </p:timing>
+</p:sld>
+</file>
+
+<file path=ppt/slides/slide9.xml><?xml version="1.0" encoding="utf-8"?>
+<p:sld xmlns:a="http://schemas.openxmlformats.org/drawingml/2006/main" xmlns:p="http://schemas.openxmlformats.org/presentationml/2006/main" xmlns:r="http://schemas.openxmlformats.org/officeDocument/2006/relationships">
+  <p:cSld>
+    <p:spTree>
+      <p:nvGrpSpPr>
+        <p:cNvPr id="1" name=""/>
+        <p:cNvGrpSpPr/>
+        <p:nvPr/>
+      </p:nvGrpSpPr>
+      <p:grpSpPr>
+        <a:xfrm>
+          <a:off x="0" y="0"/>
+          <a:ext cx="0" cy="0"/>
+          <a:chOff x="0" y="0"/>
+          <a:chExt cx="0" cy="0"/>
+        </a:xfrm>
+      </p:grpSpPr>
+      <p:pic>
+        <p:nvPicPr>
+          <p:cNvPr id="126" name="Picture 1" descr=""/>
+          <p:cNvPicPr/>
+          <p:nvPr/>
+        </p:nvPicPr>
+        <p:blipFill>
+          <a:blip r:embed="rId1"/>
+          <a:stretch>
+            <a:fillRect/>
+          </a:stretch>
+        </p:blipFill>
+        <p:spPr>
+          <a:xfrm>
+            <a:off x="0" y="0"/>
+            <a:ext cx="12191760" cy="6857640"/>
+          </a:xfrm>
+          <a:prstGeom prst="rect">
+            <a:avLst/>
+          </a:prstGeom>
+          <a:ln>
+            <a:noFill/>
+          </a:ln>
+        </p:spPr>
+      </p:pic>
+      <p:sp>
+        <p:nvSpPr>
+          <p:cNvPr id="127" name="CustomShape 1"/>
+          <p:cNvSpPr/>
+          <p:nvPr/>
+        </p:nvSpPr>
+        <p:spPr>
+          <a:xfrm>
+            <a:off x="1103760" y="5222520"/>
+            <a:ext cx="4638960" cy="364680"/>
+          </a:xfrm>
+          <a:prstGeom prst="rect">
+            <a:avLst/>
+          </a:prstGeom>
+          <a:noFill/>
+          <a:ln>
+            <a:noFill/>
+          </a:ln>
+        </p:spPr>
+        <p:txBody>
+          <a:bodyPr wrap="none" lIns="90000" rIns="90000" tIns="45000" bIns="45000"/>
+          <a:p>
+            <a:pPr>
+              <a:lnSpc>
+                <a:spcPct val="100000"/>
+              </a:lnSpc>
+            </a:pPr>
+            <a:r>
+              <a:rPr lang="en-US">
+                <a:solidFill>
+                  <a:srgbClr val="000000"/>
+                </a:solidFill>
+                <a:latin typeface="Calibri"/>
+              </a:rPr>
+              <a:t>Filename: Air_Cauchy_SiOx(4nm)_Si.xy</a:t>
+            </a:r>
+            <a:endParaRPr/>
+          </a:p>
+        </p:txBody>
+      </p:sp>
+    </p:spTree>
+  </p:cSld>
+  <p:timing>
+    <p:tnLst>
+      <p:par>
+        <p:cTn id="17" dur="indefinite" restart="never" nodeType="tmRoot">
+          <p:childTnLst>
+            <p:seq>
+              <p:cTn id="18" nodeType="mainSeq"/>
+              <p:prevCondLst>
+                <p:cond delay="0" evt="onPrev">
+                  <p:tgtEl>
+                    <p:sldTgt/>
+                  </p:tgtEl>
+                </p:cond>
+              </p:prevCondLst>
+              <p:nextCondLst>
+                <p:cond delay="0" evt="onNext">
+                  <p:tgtEl>
+                    <p:sldTgt/>
+                  </p:tgtEl>
+                </p:cond>
+              </p:nextCondLst>
+            </p:seq>
+          </p:childTnLst>
+        </p:cTn>
+      </p:par>
+    </p:tnLst>
+  </p:timing>
 </p:sld>
 </file>
 
@@ -3983,4 +5672,227 @@
     </a:fmtScheme>
   </a:themeElements>
 </a:theme>
+</file>
+
+<file path=ppt/theme/theme3.xml><?xml version="1.0" encoding="utf-8"?>
+<a:theme xmlns:a="http://schemas.openxmlformats.org/drawingml/2006/main" name="Office Theme">
+  <a:themeElements>
+    <a:clrScheme name="Office">
+      <a:dk1>
+        <a:sysClr val="windowText" lastClr="000000"/>
+      </a:dk1>
+      <a:lt1>
+        <a:sysClr val="window" lastClr="FFFFFF"/>
+      </a:lt1>
+      <a:dk2>
+        <a:srgbClr val="1F497D"/>
+      </a:dk2>
+      <a:lt2>
+        <a:srgbClr val="EEECE1"/>
+      </a:lt2>
+      <a:accent1>
+        <a:srgbClr val="4F81BD"/>
+      </a:accent1>
+      <a:accent2>
+        <a:srgbClr val="C0504D"/>
+      </a:accent2>
+      <a:accent3>
+        <a:srgbClr val="9BBB59"/>
+      </a:accent3>
+      <a:accent4>
+        <a:srgbClr val="8064A2"/>
+      </a:accent4>
+      <a:accent5>
+        <a:srgbClr val="4BACC6"/>
+      </a:accent5>
+      <a:accent6>
+        <a:srgbClr val="F79646"/>
+      </a:accent6>
+      <a:hlink>
+        <a:srgbClr val="0000FF"/>
+      </a:hlink>
+      <a:folHlink>
+        <a:srgbClr val="800080"/>
+      </a:folHlink>
+    </a:clrScheme>
+    <a:fontScheme name="Office">
+      <a:majorFont>
+        <a:latin typeface="Arial"/>
+        <a:ea typeface="DejaVu Sans"/>
+        <a:cs typeface="DejaVu Sans"/>
+      </a:majorFont>
+      <a:minorFont>
+        <a:latin typeface="Arial"/>
+        <a:ea typeface="DejaVu Sans"/>
+        <a:cs typeface="DejaVu Sans"/>
+      </a:minorFont>
+    </a:fontScheme>
+    <a:fmtScheme name="Office">
+      <a:fillStyleLst>
+        <a:solidFill>
+          <a:schemeClr val="phClr"/>
+        </a:solidFill>
+        <a:gradFill rotWithShape="1">
+          <a:gsLst>
+            <a:gs pos="0">
+              <a:schemeClr val="phClr">
+                <a:tint val="50000"/>
+                <a:satMod val="300000"/>
+              </a:schemeClr>
+            </a:gs>
+            <a:gs pos="35000">
+              <a:schemeClr val="phClr">
+                <a:tint val="37000"/>
+                <a:satMod val="300000"/>
+              </a:schemeClr>
+            </a:gs>
+            <a:gs pos="100000">
+              <a:schemeClr val="phClr">
+                <a:tint val="15000"/>
+                <a:satMod val="350000"/>
+              </a:schemeClr>
+            </a:gs>
+          </a:gsLst>
+          <a:lin ang="16200000" scaled="1"/>
+        </a:gradFill>
+        <a:gradFill rotWithShape="1">
+          <a:gsLst>
+            <a:gs pos="0">
+              <a:schemeClr val="phClr">
+                <a:shade val="51000"/>
+                <a:satMod val="130000"/>
+              </a:schemeClr>
+            </a:gs>
+            <a:gs pos="80000">
+              <a:schemeClr val="phClr">
+                <a:shade val="93000"/>
+                <a:satMod val="130000"/>
+              </a:schemeClr>
+            </a:gs>
+            <a:gs pos="100000">
+              <a:schemeClr val="phClr">
+                <a:shade val="94000"/>
+                <a:satMod val="135000"/>
+              </a:schemeClr>
+            </a:gs>
+          </a:gsLst>
+          <a:lin ang="16200000" scaled="0"/>
+        </a:gradFill>
+      </a:fillStyleLst>
+      <a:lnStyleLst>
+        <a:ln w="9525" cap="flat" cmpd="sng" algn="ctr">
+          <a:solidFill>
+            <a:schemeClr val="phClr">
+              <a:shade val="95000"/>
+              <a:satMod val="105000"/>
+            </a:schemeClr>
+          </a:solidFill>
+          <a:prstDash val="solid"/>
+        </a:ln>
+        <a:ln w="25400" cap="flat" cmpd="sng" algn="ctr">
+          <a:solidFill>
+            <a:schemeClr val="phClr"/>
+          </a:solidFill>
+          <a:prstDash val="solid"/>
+        </a:ln>
+        <a:ln w="38100" cap="flat" cmpd="sng" algn="ctr">
+          <a:solidFill>
+            <a:schemeClr val="phClr"/>
+          </a:solidFill>
+          <a:prstDash val="solid"/>
+        </a:ln>
+      </a:lnStyleLst>
+      <a:effectStyleLst>
+        <a:effectStyle>
+          <a:effectLst>
+            <a:outerShdw blurRad="40000" dist="20000" dir="5400000" rotWithShape="0">
+              <a:srgbClr val="000000">
+                <a:alpha val="38000"/>
+              </a:srgbClr>
+            </a:outerShdw>
+          </a:effectLst>
+        </a:effectStyle>
+        <a:effectStyle>
+          <a:effectLst>
+            <a:outerShdw blurRad="40000" dist="23000" dir="5400000" rotWithShape="0">
+              <a:srgbClr val="000000">
+                <a:alpha val="35000"/>
+              </a:srgbClr>
+            </a:outerShdw>
+          </a:effectLst>
+        </a:effectStyle>
+        <a:effectStyle>
+          <a:effectLst>
+            <a:outerShdw blurRad="40000" dist="23000" dir="5400000" rotWithShape="0">
+              <a:srgbClr val="000000">
+                <a:alpha val="35000"/>
+              </a:srgbClr>
+            </a:outerShdw>
+          </a:effectLst>
+          <a:scene3d>
+            <a:camera prst="orthographicFront">
+              <a:rot lat="0" lon="0" rev="0"/>
+            </a:camera>
+            <a:lightRig rig="threePt" dir="t">
+              <a:rot lat="0" lon="0" rev="1200000"/>
+            </a:lightRig>
+          </a:scene3d>
+          <a:sp3d>
+            <a:bevelT w="63500" h="25400"/>
+          </a:sp3d>
+        </a:effectStyle>
+      </a:effectStyleLst>
+      <a:bgFillStyleLst>
+        <a:solidFill>
+          <a:schemeClr val="phClr"/>
+        </a:solidFill>
+        <a:gradFill rotWithShape="1">
+          <a:gsLst>
+            <a:gs pos="0">
+              <a:schemeClr val="phClr">
+                <a:tint val="40000"/>
+                <a:satMod val="350000"/>
+              </a:schemeClr>
+            </a:gs>
+            <a:gs pos="40000">
+              <a:schemeClr val="phClr">
+                <a:tint val="45000"/>
+                <a:shade val="99000"/>
+                <a:satMod val="350000"/>
+              </a:schemeClr>
+            </a:gs>
+            <a:gs pos="100000">
+              <a:schemeClr val="phClr">
+                <a:shade val="20000"/>
+                <a:satMod val="255000"/>
+              </a:schemeClr>
+            </a:gs>
+          </a:gsLst>
+          <a:path path="circle">
+            <a:fillToRect l="50000" t="-80000" r="50000" b="180000"/>
+          </a:path>
+        </a:gradFill>
+        <a:gradFill rotWithShape="1">
+          <a:gsLst>
+            <a:gs pos="0">
+              <a:schemeClr val="phClr">
+                <a:tint val="80000"/>
+                <a:satMod val="300000"/>
+              </a:schemeClr>
+            </a:gs>
+            <a:gs pos="100000">
+              <a:schemeClr val="phClr">
+                <a:shade val="30000"/>
+                <a:satMod val="200000"/>
+              </a:schemeClr>
+            </a:gs>
+          </a:gsLst>
+          <a:path path="circle">
+            <a:fillToRect l="50000" t="50000" r="50000" b="50000"/>
+          </a:path>
+        </a:gradFill>
+      </a:bgFillStyleLst>
+    </a:fmtScheme>
+  </a:themeElements>
+</a:theme>
 </file>
</xml_diff>

<commit_message>
Cleaned up matlab code and renamed
</commit_message>
<xml_diff>
--- a/Thesis/matlab_code/Simulation_files_and_curves.pptx
+++ b/Thesis/matlab_code/Simulation_files_and_curves.pptx
@@ -5,17 +5,21 @@
     <p:sldMasterId id="2147483648" r:id="rId2"/>
     <p:sldMasterId id="2147483661" r:id="rId3"/>
     <p:sldMasterId id="2147483674" r:id="rId4"/>
+    <p:sldMasterId id="2147483687" r:id="rId5"/>
   </p:sldMasterIdLst>
   <p:sldIdLst>
-    <p:sldId id="256" r:id="rId5"/>
-    <p:sldId id="257" r:id="rId6"/>
-    <p:sldId id="258" r:id="rId7"/>
-    <p:sldId id="259" r:id="rId8"/>
-    <p:sldId id="260" r:id="rId9"/>
-    <p:sldId id="261" r:id="rId10"/>
-    <p:sldId id="262" r:id="rId11"/>
-    <p:sldId id="263" r:id="rId12"/>
-    <p:sldId id="264" r:id="rId13"/>
+    <p:sldId id="256" r:id="rId6"/>
+    <p:sldId id="257" r:id="rId7"/>
+    <p:sldId id="258" r:id="rId8"/>
+    <p:sldId id="259" r:id="rId9"/>
+    <p:sldId id="260" r:id="rId10"/>
+    <p:sldId id="261" r:id="rId11"/>
+    <p:sldId id="262" r:id="rId12"/>
+    <p:sldId id="263" r:id="rId13"/>
+    <p:sldId id="264" r:id="rId14"/>
+    <p:sldId id="265" r:id="rId15"/>
+    <p:sldId id="266" r:id="rId16"/>
+    <p:sldId id="267" r:id="rId17"/>
   </p:sldIdLst>
   <p:sldSz cx="12192000" cy="6858000"/>
   <p:notesSz cx="7772400" cy="10058400"/>
@@ -1725,7 +1729,7 @@
       </p:grpSpPr>
       <p:sp>
         <p:nvSpPr>
-          <p:cNvPr id="77" name="PlaceHolder 1"/>
+          <p:cNvPr id="74" name="PlaceHolder 1"/>
           <p:cNvSpPr>
             <a:spLocks noGrp="1"/>
           </p:cNvSpPr>
@@ -1751,7 +1755,7 @@
       </p:sp>
       <p:sp>
         <p:nvSpPr>
-          <p:cNvPr id="78" name="PlaceHolder 2"/>
+          <p:cNvPr id="75" name="PlaceHolder 2"/>
           <p:cNvSpPr>
             <a:spLocks noGrp="1"/>
           </p:cNvSpPr>
@@ -1800,7 +1804,7 @@
       </p:grpSpPr>
       <p:sp>
         <p:nvSpPr>
-          <p:cNvPr id="79" name="PlaceHolder 1"/>
+          <p:cNvPr id="76" name="PlaceHolder 1"/>
           <p:cNvSpPr>
             <a:spLocks noGrp="1"/>
           </p:cNvSpPr>
@@ -1826,7 +1830,7 @@
       </p:sp>
       <p:sp>
         <p:nvSpPr>
-          <p:cNvPr id="80" name="PlaceHolder 2"/>
+          <p:cNvPr id="77" name="PlaceHolder 2"/>
           <p:cNvSpPr>
             <a:spLocks noGrp="1"/>
           </p:cNvSpPr>
@@ -1874,7 +1878,7 @@
       </p:grpSpPr>
       <p:sp>
         <p:nvSpPr>
-          <p:cNvPr id="81" name="PlaceHolder 1"/>
+          <p:cNvPr id="78" name="PlaceHolder 1"/>
           <p:cNvSpPr>
             <a:spLocks noGrp="1"/>
           </p:cNvSpPr>
@@ -1900,7 +1904,7 @@
       </p:sp>
       <p:sp>
         <p:nvSpPr>
-          <p:cNvPr id="82" name="PlaceHolder 2"/>
+          <p:cNvPr id="79" name="PlaceHolder 2"/>
           <p:cNvSpPr>
             <a:spLocks noGrp="1"/>
           </p:cNvSpPr>
@@ -1926,7 +1930,7 @@
       </p:sp>
       <p:sp>
         <p:nvSpPr>
-          <p:cNvPr id="83" name="PlaceHolder 3"/>
+          <p:cNvPr id="80" name="PlaceHolder 3"/>
           <p:cNvSpPr>
             <a:spLocks noGrp="1"/>
           </p:cNvSpPr>
@@ -1974,7 +1978,7 @@
       </p:grpSpPr>
       <p:sp>
         <p:nvSpPr>
-          <p:cNvPr id="84" name="PlaceHolder 1"/>
+          <p:cNvPr id="81" name="PlaceHolder 1"/>
           <p:cNvSpPr>
             <a:spLocks noGrp="1"/>
           </p:cNvSpPr>
@@ -2096,7 +2100,7 @@
       </p:grpSpPr>
       <p:sp>
         <p:nvSpPr>
-          <p:cNvPr id="85" name="PlaceHolder 1"/>
+          <p:cNvPr id="82" name="PlaceHolder 1"/>
           <p:cNvSpPr>
             <a:spLocks noGrp="1"/>
           </p:cNvSpPr>
@@ -2145,7 +2149,7 @@
       </p:grpSpPr>
       <p:sp>
         <p:nvSpPr>
-          <p:cNvPr id="86" name="PlaceHolder 1"/>
+          <p:cNvPr id="83" name="PlaceHolder 1"/>
           <p:cNvSpPr>
             <a:spLocks noGrp="1"/>
           </p:cNvSpPr>
@@ -2171,7 +2175,7 @@
       </p:sp>
       <p:sp>
         <p:nvSpPr>
-          <p:cNvPr id="87" name="PlaceHolder 2"/>
+          <p:cNvPr id="84" name="PlaceHolder 2"/>
           <p:cNvSpPr>
             <a:spLocks noGrp="1"/>
           </p:cNvSpPr>
@@ -2197,7 +2201,7 @@
       </p:sp>
       <p:sp>
         <p:nvSpPr>
-          <p:cNvPr id="88" name="PlaceHolder 3"/>
+          <p:cNvPr id="85" name="PlaceHolder 3"/>
           <p:cNvSpPr>
             <a:spLocks noGrp="1"/>
           </p:cNvSpPr>
@@ -2223,7 +2227,7 @@
       </p:sp>
       <p:sp>
         <p:nvSpPr>
-          <p:cNvPr id="89" name="PlaceHolder 4"/>
+          <p:cNvPr id="86" name="PlaceHolder 4"/>
           <p:cNvSpPr>
             <a:spLocks noGrp="1"/>
           </p:cNvSpPr>
@@ -2271,7 +2275,7 @@
       </p:grpSpPr>
       <p:sp>
         <p:nvSpPr>
-          <p:cNvPr id="90" name="PlaceHolder 1"/>
+          <p:cNvPr id="87" name="PlaceHolder 1"/>
           <p:cNvSpPr>
             <a:spLocks noGrp="1"/>
           </p:cNvSpPr>
@@ -2297,7 +2301,7 @@
       </p:sp>
       <p:sp>
         <p:nvSpPr>
-          <p:cNvPr id="91" name="PlaceHolder 2"/>
+          <p:cNvPr id="88" name="PlaceHolder 2"/>
           <p:cNvSpPr>
             <a:spLocks noGrp="1"/>
           </p:cNvSpPr>
@@ -2323,7 +2327,7 @@
       </p:sp>
       <p:sp>
         <p:nvSpPr>
-          <p:cNvPr id="92" name="PlaceHolder 3"/>
+          <p:cNvPr id="89" name="PlaceHolder 3"/>
           <p:cNvSpPr>
             <a:spLocks noGrp="1"/>
           </p:cNvSpPr>
@@ -2349,7 +2353,7 @@
       </p:sp>
       <p:sp>
         <p:nvSpPr>
-          <p:cNvPr id="93" name="PlaceHolder 4"/>
+          <p:cNvPr id="90" name="PlaceHolder 4"/>
           <p:cNvSpPr>
             <a:spLocks noGrp="1"/>
           </p:cNvSpPr>
@@ -2397,7 +2401,7 @@
       </p:grpSpPr>
       <p:sp>
         <p:nvSpPr>
-          <p:cNvPr id="94" name="PlaceHolder 1"/>
+          <p:cNvPr id="91" name="PlaceHolder 1"/>
           <p:cNvSpPr>
             <a:spLocks noGrp="1"/>
           </p:cNvSpPr>
@@ -2423,7 +2427,7 @@
       </p:sp>
       <p:sp>
         <p:nvSpPr>
-          <p:cNvPr id="95" name="PlaceHolder 2"/>
+          <p:cNvPr id="92" name="PlaceHolder 2"/>
           <p:cNvSpPr>
             <a:spLocks noGrp="1"/>
           </p:cNvSpPr>
@@ -2449,7 +2453,7 @@
       </p:sp>
       <p:sp>
         <p:nvSpPr>
-          <p:cNvPr id="96" name="PlaceHolder 3"/>
+          <p:cNvPr id="93" name="PlaceHolder 3"/>
           <p:cNvSpPr>
             <a:spLocks noGrp="1"/>
           </p:cNvSpPr>
@@ -2475,7 +2479,7 @@
       </p:sp>
       <p:sp>
         <p:nvSpPr>
-          <p:cNvPr id="97" name="PlaceHolder 4"/>
+          <p:cNvPr id="94" name="PlaceHolder 4"/>
           <p:cNvSpPr>
             <a:spLocks noGrp="1"/>
           </p:cNvSpPr>
@@ -2523,7 +2527,7 @@
       </p:grpSpPr>
       <p:sp>
         <p:nvSpPr>
-          <p:cNvPr id="98" name="PlaceHolder 1"/>
+          <p:cNvPr id="95" name="PlaceHolder 1"/>
           <p:cNvSpPr>
             <a:spLocks noGrp="1"/>
           </p:cNvSpPr>
@@ -2549,7 +2553,7 @@
       </p:sp>
       <p:sp>
         <p:nvSpPr>
-          <p:cNvPr id="99" name="PlaceHolder 2"/>
+          <p:cNvPr id="96" name="PlaceHolder 2"/>
           <p:cNvSpPr>
             <a:spLocks noGrp="1"/>
           </p:cNvSpPr>
@@ -2575,7 +2579,7 @@
       </p:sp>
       <p:sp>
         <p:nvSpPr>
-          <p:cNvPr id="100" name="PlaceHolder 3"/>
+          <p:cNvPr id="97" name="PlaceHolder 3"/>
           <p:cNvSpPr>
             <a:spLocks noGrp="1"/>
           </p:cNvSpPr>
@@ -2623,7 +2627,7 @@
       </p:grpSpPr>
       <p:sp>
         <p:nvSpPr>
-          <p:cNvPr id="101" name="PlaceHolder 1"/>
+          <p:cNvPr id="98" name="PlaceHolder 1"/>
           <p:cNvSpPr>
             <a:spLocks noGrp="1"/>
           </p:cNvSpPr>
@@ -2649,7 +2653,7 @@
       </p:sp>
       <p:sp>
         <p:nvSpPr>
-          <p:cNvPr id="102" name="PlaceHolder 2"/>
+          <p:cNvPr id="99" name="PlaceHolder 2"/>
           <p:cNvSpPr>
             <a:spLocks noGrp="1"/>
           </p:cNvSpPr>
@@ -2675,7 +2679,7 @@
       </p:sp>
       <p:sp>
         <p:nvSpPr>
-          <p:cNvPr id="103" name="PlaceHolder 3"/>
+          <p:cNvPr id="100" name="PlaceHolder 3"/>
           <p:cNvSpPr>
             <a:spLocks noGrp="1"/>
           </p:cNvSpPr>
@@ -2701,7 +2705,7 @@
       </p:sp>
       <p:sp>
         <p:nvSpPr>
-          <p:cNvPr id="104" name="PlaceHolder 4"/>
+          <p:cNvPr id="101" name="PlaceHolder 4"/>
           <p:cNvSpPr>
             <a:spLocks noGrp="1"/>
           </p:cNvSpPr>
@@ -2727,7 +2731,7 @@
       </p:sp>
       <p:sp>
         <p:nvSpPr>
-          <p:cNvPr id="105" name="PlaceHolder 5"/>
+          <p:cNvPr id="102" name="PlaceHolder 5"/>
           <p:cNvSpPr>
             <a:spLocks noGrp="1"/>
           </p:cNvSpPr>
@@ -2775,7 +2779,7 @@
       </p:grpSpPr>
       <p:sp>
         <p:nvSpPr>
-          <p:cNvPr id="106" name="PlaceHolder 1"/>
+          <p:cNvPr id="103" name="PlaceHolder 1"/>
           <p:cNvSpPr>
             <a:spLocks noGrp="1"/>
           </p:cNvSpPr>
@@ -2801,7 +2805,7 @@
       </p:sp>
       <p:sp>
         <p:nvSpPr>
-          <p:cNvPr id="107" name="PlaceHolder 2"/>
+          <p:cNvPr id="104" name="PlaceHolder 2"/>
           <p:cNvSpPr>
             <a:spLocks noGrp="1"/>
           </p:cNvSpPr>
@@ -2827,7 +2831,7 @@
       </p:sp>
       <p:sp>
         <p:nvSpPr>
-          <p:cNvPr id="108" name="PlaceHolder 3"/>
+          <p:cNvPr id="105" name="PlaceHolder 3"/>
           <p:cNvSpPr>
             <a:spLocks noGrp="1"/>
           </p:cNvSpPr>
@@ -2853,7 +2857,7 @@
       </p:sp>
       <p:pic>
         <p:nvPicPr>
-          <p:cNvPr id="109" name="" descr=""/>
+          <p:cNvPr id="106" name="" descr=""/>
           <p:cNvPicPr/>
           <p:nvPr/>
         </p:nvPicPr>
@@ -2878,7 +2882,7 @@
       </p:pic>
       <p:pic>
         <p:nvPicPr>
-          <p:cNvPr id="110" name="" descr=""/>
+          <p:cNvPr id="107" name="" descr=""/>
           <p:cNvPicPr/>
           <p:nvPr/>
         </p:nvPicPr>
@@ -2901,6 +2905,177 @@
           </a:ln>
         </p:spPr>
       </p:pic>
+    </p:spTree>
+  </p:cSld>
+</p:sldLayout>
+</file>
+
+<file path=ppt/slideLayouts/slideLayout37.xml><?xml version="1.0" encoding="utf-8"?>
+<p:sldLayout xmlns:a="http://schemas.openxmlformats.org/drawingml/2006/main" xmlns:p="http://schemas.openxmlformats.org/presentationml/2006/main" xmlns:r="http://schemas.openxmlformats.org/officeDocument/2006/relationships" type="blank" preserve="1">
+  <p:cSld name="Blank Slide">
+    <p:spTree>
+      <p:nvGrpSpPr>
+        <p:cNvPr id="1" name=""/>
+        <p:cNvGrpSpPr/>
+        <p:nvPr/>
+      </p:nvGrpSpPr>
+      <p:grpSpPr>
+        <a:xfrm>
+          <a:off x="0" y="0"/>
+          <a:ext cx="0" cy="0"/>
+          <a:chOff x="0" y="0"/>
+          <a:chExt cx="0" cy="0"/>
+        </a:xfrm>
+      </p:grpSpPr>
+    </p:spTree>
+  </p:cSld>
+</p:sldLayout>
+</file>
+
+<file path=ppt/slideLayouts/slideLayout38.xml><?xml version="1.0" encoding="utf-8"?>
+<p:sldLayout xmlns:a="http://schemas.openxmlformats.org/drawingml/2006/main" xmlns:p="http://schemas.openxmlformats.org/presentationml/2006/main" xmlns:r="http://schemas.openxmlformats.org/officeDocument/2006/relationships" type="tx" preserve="1">
+  <p:cSld name="Title Slide">
+    <p:spTree>
+      <p:nvGrpSpPr>
+        <p:cNvPr id="1" name=""/>
+        <p:cNvGrpSpPr/>
+        <p:nvPr/>
+      </p:nvGrpSpPr>
+      <p:grpSpPr>
+        <a:xfrm>
+          <a:off x="0" y="0"/>
+          <a:ext cx="0" cy="0"/>
+          <a:chOff x="0" y="0"/>
+          <a:chExt cx="0" cy="0"/>
+        </a:xfrm>
+      </p:grpSpPr>
+      <p:sp>
+        <p:nvSpPr>
+          <p:cNvPr id="113" name="PlaceHolder 1"/>
+          <p:cNvSpPr>
+            <a:spLocks noGrp="1"/>
+          </p:cNvSpPr>
+          <p:nvPr>
+            <p:ph type="title"/>
+          </p:nvPr>
+        </p:nvSpPr>
+        <p:spPr>
+          <a:xfrm>
+            <a:off x="609480" y="273600"/>
+            <a:ext cx="10972440" cy="1145160"/>
+          </a:xfrm>
+          <a:prstGeom prst="rect">
+            <a:avLst/>
+          </a:prstGeom>
+        </p:spPr>
+        <p:txBody>
+          <a:bodyPr lIns="0" rIns="0" tIns="0" bIns="0" anchor="ctr"/>
+          <a:p>
+            <a:endParaRPr/>
+          </a:p>
+        </p:txBody>
+      </p:sp>
+      <p:sp>
+        <p:nvSpPr>
+          <p:cNvPr id="114" name="PlaceHolder 2"/>
+          <p:cNvSpPr>
+            <a:spLocks noGrp="1"/>
+          </p:cNvSpPr>
+          <p:nvPr>
+            <p:ph type="subTitle"/>
+          </p:nvPr>
+        </p:nvSpPr>
+        <p:spPr>
+          <a:xfrm>
+            <a:off x="609480" y="1604520"/>
+            <a:ext cx="10972440" cy="3977640"/>
+          </a:xfrm>
+          <a:prstGeom prst="rect">
+            <a:avLst/>
+          </a:prstGeom>
+        </p:spPr>
+        <p:txBody>
+          <a:bodyPr lIns="0" rIns="0" tIns="0" bIns="0" anchor="ctr"/>
+          <a:p>
+            <a:pPr algn="ctr"/>
+            <a:endParaRPr/>
+          </a:p>
+        </p:txBody>
+      </p:sp>
+    </p:spTree>
+  </p:cSld>
+</p:sldLayout>
+</file>
+
+<file path=ppt/slideLayouts/slideLayout39.xml><?xml version="1.0" encoding="utf-8"?>
+<p:sldLayout xmlns:a="http://schemas.openxmlformats.org/drawingml/2006/main" xmlns:p="http://schemas.openxmlformats.org/presentationml/2006/main" xmlns:r="http://schemas.openxmlformats.org/officeDocument/2006/relationships" type="obj" preserve="1">
+  <p:cSld name="Title, Content">
+    <p:spTree>
+      <p:nvGrpSpPr>
+        <p:cNvPr id="1" name=""/>
+        <p:cNvGrpSpPr/>
+        <p:nvPr/>
+      </p:nvGrpSpPr>
+      <p:grpSpPr>
+        <a:xfrm>
+          <a:off x="0" y="0"/>
+          <a:ext cx="0" cy="0"/>
+          <a:chOff x="0" y="0"/>
+          <a:chExt cx="0" cy="0"/>
+        </a:xfrm>
+      </p:grpSpPr>
+      <p:sp>
+        <p:nvSpPr>
+          <p:cNvPr id="115" name="PlaceHolder 1"/>
+          <p:cNvSpPr>
+            <a:spLocks noGrp="1"/>
+          </p:cNvSpPr>
+          <p:nvPr>
+            <p:ph type="title"/>
+          </p:nvPr>
+        </p:nvSpPr>
+        <p:spPr>
+          <a:xfrm>
+            <a:off x="609480" y="273600"/>
+            <a:ext cx="10972440" cy="1145160"/>
+          </a:xfrm>
+          <a:prstGeom prst="rect">
+            <a:avLst/>
+          </a:prstGeom>
+        </p:spPr>
+        <p:txBody>
+          <a:bodyPr lIns="0" rIns="0" tIns="0" bIns="0" anchor="ctr"/>
+          <a:p>
+            <a:endParaRPr/>
+          </a:p>
+        </p:txBody>
+      </p:sp>
+      <p:sp>
+        <p:nvSpPr>
+          <p:cNvPr id="116" name="PlaceHolder 2"/>
+          <p:cNvSpPr>
+            <a:spLocks noGrp="1"/>
+          </p:cNvSpPr>
+          <p:nvPr>
+            <p:ph type="body"/>
+          </p:nvPr>
+        </p:nvSpPr>
+        <p:spPr>
+          <a:xfrm>
+            <a:off x="609480" y="1604520"/>
+            <a:ext cx="10972440" cy="3977280"/>
+          </a:xfrm>
+          <a:prstGeom prst="rect">
+            <a:avLst/>
+          </a:prstGeom>
+        </p:spPr>
+        <p:txBody>
+          <a:bodyPr lIns="0" rIns="0" tIns="0" bIns="0"/>
+          <a:p>
+            <a:endParaRPr/>
+          </a:p>
+        </p:txBody>
+      </p:sp>
     </p:spTree>
   </p:cSld>
 </p:sldLayout>
@@ -3001,6 +3176,983 @@
           </a:p>
         </p:txBody>
       </p:sp>
+    </p:spTree>
+  </p:cSld>
+</p:sldLayout>
+</file>
+
+<file path=ppt/slideLayouts/slideLayout40.xml><?xml version="1.0" encoding="utf-8"?>
+<p:sldLayout xmlns:a="http://schemas.openxmlformats.org/drawingml/2006/main" xmlns:p="http://schemas.openxmlformats.org/presentationml/2006/main" xmlns:r="http://schemas.openxmlformats.org/officeDocument/2006/relationships" type="twoObj" preserve="1">
+  <p:cSld name="Title, 2 Content">
+    <p:spTree>
+      <p:nvGrpSpPr>
+        <p:cNvPr id="1" name=""/>
+        <p:cNvGrpSpPr/>
+        <p:nvPr/>
+      </p:nvGrpSpPr>
+      <p:grpSpPr>
+        <a:xfrm>
+          <a:off x="0" y="0"/>
+          <a:ext cx="0" cy="0"/>
+          <a:chOff x="0" y="0"/>
+          <a:chExt cx="0" cy="0"/>
+        </a:xfrm>
+      </p:grpSpPr>
+      <p:sp>
+        <p:nvSpPr>
+          <p:cNvPr id="117" name="PlaceHolder 1"/>
+          <p:cNvSpPr>
+            <a:spLocks noGrp="1"/>
+          </p:cNvSpPr>
+          <p:nvPr>
+            <p:ph type="title"/>
+          </p:nvPr>
+        </p:nvSpPr>
+        <p:spPr>
+          <a:xfrm>
+            <a:off x="609480" y="273600"/>
+            <a:ext cx="10972440" cy="1145160"/>
+          </a:xfrm>
+          <a:prstGeom prst="rect">
+            <a:avLst/>
+          </a:prstGeom>
+        </p:spPr>
+        <p:txBody>
+          <a:bodyPr lIns="0" rIns="0" tIns="0" bIns="0" anchor="ctr"/>
+          <a:p>
+            <a:endParaRPr/>
+          </a:p>
+        </p:txBody>
+      </p:sp>
+      <p:sp>
+        <p:nvSpPr>
+          <p:cNvPr id="118" name="PlaceHolder 2"/>
+          <p:cNvSpPr>
+            <a:spLocks noGrp="1"/>
+          </p:cNvSpPr>
+          <p:nvPr>
+            <p:ph type="body"/>
+          </p:nvPr>
+        </p:nvSpPr>
+        <p:spPr>
+          <a:xfrm>
+            <a:off x="609480" y="1604520"/>
+            <a:ext cx="5354280" cy="3977280"/>
+          </a:xfrm>
+          <a:prstGeom prst="rect">
+            <a:avLst/>
+          </a:prstGeom>
+        </p:spPr>
+        <p:txBody>
+          <a:bodyPr lIns="0" rIns="0" tIns="0" bIns="0"/>
+          <a:p>
+            <a:endParaRPr/>
+          </a:p>
+        </p:txBody>
+      </p:sp>
+      <p:sp>
+        <p:nvSpPr>
+          <p:cNvPr id="119" name="PlaceHolder 3"/>
+          <p:cNvSpPr>
+            <a:spLocks noGrp="1"/>
+          </p:cNvSpPr>
+          <p:nvPr>
+            <p:ph type="body"/>
+          </p:nvPr>
+        </p:nvSpPr>
+        <p:spPr>
+          <a:xfrm>
+            <a:off x="6231960" y="1604520"/>
+            <a:ext cx="5354280" cy="3977280"/>
+          </a:xfrm>
+          <a:prstGeom prst="rect">
+            <a:avLst/>
+          </a:prstGeom>
+        </p:spPr>
+        <p:txBody>
+          <a:bodyPr lIns="0" rIns="0" tIns="0" bIns="0"/>
+          <a:p>
+            <a:endParaRPr/>
+          </a:p>
+        </p:txBody>
+      </p:sp>
+    </p:spTree>
+  </p:cSld>
+</p:sldLayout>
+</file>
+
+<file path=ppt/slideLayouts/slideLayout41.xml><?xml version="1.0" encoding="utf-8"?>
+<p:sldLayout xmlns:a="http://schemas.openxmlformats.org/drawingml/2006/main" xmlns:p="http://schemas.openxmlformats.org/presentationml/2006/main" xmlns:r="http://schemas.openxmlformats.org/officeDocument/2006/relationships" type="titleOnly" preserve="1">
+  <p:cSld name="Title Only">
+    <p:spTree>
+      <p:nvGrpSpPr>
+        <p:cNvPr id="1" name=""/>
+        <p:cNvGrpSpPr/>
+        <p:nvPr/>
+      </p:nvGrpSpPr>
+      <p:grpSpPr>
+        <a:xfrm>
+          <a:off x="0" y="0"/>
+          <a:ext cx="0" cy="0"/>
+          <a:chOff x="0" y="0"/>
+          <a:chExt cx="0" cy="0"/>
+        </a:xfrm>
+      </p:grpSpPr>
+      <p:sp>
+        <p:nvSpPr>
+          <p:cNvPr id="120" name="PlaceHolder 1"/>
+          <p:cNvSpPr>
+            <a:spLocks noGrp="1"/>
+          </p:cNvSpPr>
+          <p:nvPr>
+            <p:ph type="title"/>
+          </p:nvPr>
+        </p:nvSpPr>
+        <p:spPr>
+          <a:xfrm>
+            <a:off x="609480" y="273600"/>
+            <a:ext cx="10972440" cy="1145160"/>
+          </a:xfrm>
+          <a:prstGeom prst="rect">
+            <a:avLst/>
+          </a:prstGeom>
+        </p:spPr>
+        <p:txBody>
+          <a:bodyPr lIns="0" rIns="0" tIns="0" bIns="0" anchor="ctr"/>
+          <a:p>
+            <a:endParaRPr/>
+          </a:p>
+        </p:txBody>
+      </p:sp>
+    </p:spTree>
+  </p:cSld>
+</p:sldLayout>
+</file>
+
+<file path=ppt/slideLayouts/slideLayout42.xml><?xml version="1.0" encoding="utf-8"?>
+<p:sldLayout xmlns:a="http://schemas.openxmlformats.org/drawingml/2006/main" xmlns:p="http://schemas.openxmlformats.org/presentationml/2006/main" xmlns:r="http://schemas.openxmlformats.org/officeDocument/2006/relationships" type="objOnly" preserve="1">
+  <p:cSld name="Centered Text">
+    <p:spTree>
+      <p:nvGrpSpPr>
+        <p:cNvPr id="1" name=""/>
+        <p:cNvGrpSpPr/>
+        <p:nvPr/>
+      </p:nvGrpSpPr>
+      <p:grpSpPr>
+        <a:xfrm>
+          <a:off x="0" y="0"/>
+          <a:ext cx="0" cy="0"/>
+          <a:chOff x="0" y="0"/>
+          <a:chExt cx="0" cy="0"/>
+        </a:xfrm>
+      </p:grpSpPr>
+      <p:sp>
+        <p:nvSpPr>
+          <p:cNvPr id="121" name="PlaceHolder 1"/>
+          <p:cNvSpPr>
+            <a:spLocks noGrp="1"/>
+          </p:cNvSpPr>
+          <p:nvPr>
+            <p:ph type="subTitle"/>
+          </p:nvPr>
+        </p:nvSpPr>
+        <p:spPr>
+          <a:xfrm>
+            <a:off x="609480" y="273600"/>
+            <a:ext cx="10972440" cy="5308200"/>
+          </a:xfrm>
+          <a:prstGeom prst="rect">
+            <a:avLst/>
+          </a:prstGeom>
+        </p:spPr>
+        <p:txBody>
+          <a:bodyPr lIns="0" rIns="0" tIns="0" bIns="0" anchor="ctr"/>
+          <a:p>
+            <a:pPr algn="ctr"/>
+            <a:endParaRPr/>
+          </a:p>
+        </p:txBody>
+      </p:sp>
+    </p:spTree>
+  </p:cSld>
+</p:sldLayout>
+</file>
+
+<file path=ppt/slideLayouts/slideLayout43.xml><?xml version="1.0" encoding="utf-8"?>
+<p:sldLayout xmlns:a="http://schemas.openxmlformats.org/drawingml/2006/main" xmlns:p="http://schemas.openxmlformats.org/presentationml/2006/main" xmlns:r="http://schemas.openxmlformats.org/officeDocument/2006/relationships" type="twoObjAndObj" preserve="1">
+  <p:cSld name="Title, 2 Content and Content">
+    <p:spTree>
+      <p:nvGrpSpPr>
+        <p:cNvPr id="1" name=""/>
+        <p:cNvGrpSpPr/>
+        <p:nvPr/>
+      </p:nvGrpSpPr>
+      <p:grpSpPr>
+        <a:xfrm>
+          <a:off x="0" y="0"/>
+          <a:ext cx="0" cy="0"/>
+          <a:chOff x="0" y="0"/>
+          <a:chExt cx="0" cy="0"/>
+        </a:xfrm>
+      </p:grpSpPr>
+      <p:sp>
+        <p:nvSpPr>
+          <p:cNvPr id="122" name="PlaceHolder 1"/>
+          <p:cNvSpPr>
+            <a:spLocks noGrp="1"/>
+          </p:cNvSpPr>
+          <p:nvPr>
+            <p:ph type="title"/>
+          </p:nvPr>
+        </p:nvSpPr>
+        <p:spPr>
+          <a:xfrm>
+            <a:off x="609480" y="273600"/>
+            <a:ext cx="10972440" cy="1145160"/>
+          </a:xfrm>
+          <a:prstGeom prst="rect">
+            <a:avLst/>
+          </a:prstGeom>
+        </p:spPr>
+        <p:txBody>
+          <a:bodyPr lIns="0" rIns="0" tIns="0" bIns="0" anchor="ctr"/>
+          <a:p>
+            <a:endParaRPr/>
+          </a:p>
+        </p:txBody>
+      </p:sp>
+      <p:sp>
+        <p:nvSpPr>
+          <p:cNvPr id="123" name="PlaceHolder 2"/>
+          <p:cNvSpPr>
+            <a:spLocks noGrp="1"/>
+          </p:cNvSpPr>
+          <p:nvPr>
+            <p:ph type="body"/>
+          </p:nvPr>
+        </p:nvSpPr>
+        <p:spPr>
+          <a:xfrm>
+            <a:off x="609480" y="1604520"/>
+            <a:ext cx="5354280" cy="1896840"/>
+          </a:xfrm>
+          <a:prstGeom prst="rect">
+            <a:avLst/>
+          </a:prstGeom>
+        </p:spPr>
+        <p:txBody>
+          <a:bodyPr lIns="0" rIns="0" tIns="0" bIns="0"/>
+          <a:p>
+            <a:endParaRPr/>
+          </a:p>
+        </p:txBody>
+      </p:sp>
+      <p:sp>
+        <p:nvSpPr>
+          <p:cNvPr id="124" name="PlaceHolder 3"/>
+          <p:cNvSpPr>
+            <a:spLocks noGrp="1"/>
+          </p:cNvSpPr>
+          <p:nvPr>
+            <p:ph type="body"/>
+          </p:nvPr>
+        </p:nvSpPr>
+        <p:spPr>
+          <a:xfrm>
+            <a:off x="609480" y="3682080"/>
+            <a:ext cx="5354280" cy="1896840"/>
+          </a:xfrm>
+          <a:prstGeom prst="rect">
+            <a:avLst/>
+          </a:prstGeom>
+        </p:spPr>
+        <p:txBody>
+          <a:bodyPr lIns="0" rIns="0" tIns="0" bIns="0"/>
+          <a:p>
+            <a:endParaRPr/>
+          </a:p>
+        </p:txBody>
+      </p:sp>
+      <p:sp>
+        <p:nvSpPr>
+          <p:cNvPr id="125" name="PlaceHolder 4"/>
+          <p:cNvSpPr>
+            <a:spLocks noGrp="1"/>
+          </p:cNvSpPr>
+          <p:nvPr>
+            <p:ph type="body"/>
+          </p:nvPr>
+        </p:nvSpPr>
+        <p:spPr>
+          <a:xfrm>
+            <a:off x="6231960" y="1604520"/>
+            <a:ext cx="5354280" cy="3977280"/>
+          </a:xfrm>
+          <a:prstGeom prst="rect">
+            <a:avLst/>
+          </a:prstGeom>
+        </p:spPr>
+        <p:txBody>
+          <a:bodyPr lIns="0" rIns="0" tIns="0" bIns="0"/>
+          <a:p>
+            <a:endParaRPr/>
+          </a:p>
+        </p:txBody>
+      </p:sp>
+    </p:spTree>
+  </p:cSld>
+</p:sldLayout>
+</file>
+
+<file path=ppt/slideLayouts/slideLayout44.xml><?xml version="1.0" encoding="utf-8"?>
+<p:sldLayout xmlns:a="http://schemas.openxmlformats.org/drawingml/2006/main" xmlns:p="http://schemas.openxmlformats.org/presentationml/2006/main" xmlns:r="http://schemas.openxmlformats.org/officeDocument/2006/relationships" type="objAndTwoObj" preserve="1">
+  <p:cSld name="Title Content and 2 Content">
+    <p:spTree>
+      <p:nvGrpSpPr>
+        <p:cNvPr id="1" name=""/>
+        <p:cNvGrpSpPr/>
+        <p:nvPr/>
+      </p:nvGrpSpPr>
+      <p:grpSpPr>
+        <a:xfrm>
+          <a:off x="0" y="0"/>
+          <a:ext cx="0" cy="0"/>
+          <a:chOff x="0" y="0"/>
+          <a:chExt cx="0" cy="0"/>
+        </a:xfrm>
+      </p:grpSpPr>
+      <p:sp>
+        <p:nvSpPr>
+          <p:cNvPr id="126" name="PlaceHolder 1"/>
+          <p:cNvSpPr>
+            <a:spLocks noGrp="1"/>
+          </p:cNvSpPr>
+          <p:nvPr>
+            <p:ph type="title"/>
+          </p:nvPr>
+        </p:nvSpPr>
+        <p:spPr>
+          <a:xfrm>
+            <a:off x="609480" y="273600"/>
+            <a:ext cx="10972440" cy="1145160"/>
+          </a:xfrm>
+          <a:prstGeom prst="rect">
+            <a:avLst/>
+          </a:prstGeom>
+        </p:spPr>
+        <p:txBody>
+          <a:bodyPr lIns="0" rIns="0" tIns="0" bIns="0" anchor="ctr"/>
+          <a:p>
+            <a:endParaRPr/>
+          </a:p>
+        </p:txBody>
+      </p:sp>
+      <p:sp>
+        <p:nvSpPr>
+          <p:cNvPr id="127" name="PlaceHolder 2"/>
+          <p:cNvSpPr>
+            <a:spLocks noGrp="1"/>
+          </p:cNvSpPr>
+          <p:nvPr>
+            <p:ph type="body"/>
+          </p:nvPr>
+        </p:nvSpPr>
+        <p:spPr>
+          <a:xfrm>
+            <a:off x="609480" y="1604520"/>
+            <a:ext cx="5354280" cy="3977280"/>
+          </a:xfrm>
+          <a:prstGeom prst="rect">
+            <a:avLst/>
+          </a:prstGeom>
+        </p:spPr>
+        <p:txBody>
+          <a:bodyPr lIns="0" rIns="0" tIns="0" bIns="0"/>
+          <a:p>
+            <a:endParaRPr/>
+          </a:p>
+        </p:txBody>
+      </p:sp>
+      <p:sp>
+        <p:nvSpPr>
+          <p:cNvPr id="128" name="PlaceHolder 3"/>
+          <p:cNvSpPr>
+            <a:spLocks noGrp="1"/>
+          </p:cNvSpPr>
+          <p:nvPr>
+            <p:ph type="body"/>
+          </p:nvPr>
+        </p:nvSpPr>
+        <p:spPr>
+          <a:xfrm>
+            <a:off x="6231960" y="1604520"/>
+            <a:ext cx="5354280" cy="1896840"/>
+          </a:xfrm>
+          <a:prstGeom prst="rect">
+            <a:avLst/>
+          </a:prstGeom>
+        </p:spPr>
+        <p:txBody>
+          <a:bodyPr lIns="0" rIns="0" tIns="0" bIns="0"/>
+          <a:p>
+            <a:endParaRPr/>
+          </a:p>
+        </p:txBody>
+      </p:sp>
+      <p:sp>
+        <p:nvSpPr>
+          <p:cNvPr id="129" name="PlaceHolder 4"/>
+          <p:cNvSpPr>
+            <a:spLocks noGrp="1"/>
+          </p:cNvSpPr>
+          <p:nvPr>
+            <p:ph type="body"/>
+          </p:nvPr>
+        </p:nvSpPr>
+        <p:spPr>
+          <a:xfrm>
+            <a:off x="6231960" y="3682080"/>
+            <a:ext cx="5354280" cy="1896840"/>
+          </a:xfrm>
+          <a:prstGeom prst="rect">
+            <a:avLst/>
+          </a:prstGeom>
+        </p:spPr>
+        <p:txBody>
+          <a:bodyPr lIns="0" rIns="0" tIns="0" bIns="0"/>
+          <a:p>
+            <a:endParaRPr/>
+          </a:p>
+        </p:txBody>
+      </p:sp>
+    </p:spTree>
+  </p:cSld>
+</p:sldLayout>
+</file>
+
+<file path=ppt/slideLayouts/slideLayout45.xml><?xml version="1.0" encoding="utf-8"?>
+<p:sldLayout xmlns:a="http://schemas.openxmlformats.org/drawingml/2006/main" xmlns:p="http://schemas.openxmlformats.org/presentationml/2006/main" xmlns:r="http://schemas.openxmlformats.org/officeDocument/2006/relationships" type="twoObjOverTx" preserve="1">
+  <p:cSld name="Title, 2 Content over Content">
+    <p:spTree>
+      <p:nvGrpSpPr>
+        <p:cNvPr id="1" name=""/>
+        <p:cNvGrpSpPr/>
+        <p:nvPr/>
+      </p:nvGrpSpPr>
+      <p:grpSpPr>
+        <a:xfrm>
+          <a:off x="0" y="0"/>
+          <a:ext cx="0" cy="0"/>
+          <a:chOff x="0" y="0"/>
+          <a:chExt cx="0" cy="0"/>
+        </a:xfrm>
+      </p:grpSpPr>
+      <p:sp>
+        <p:nvSpPr>
+          <p:cNvPr id="130" name="PlaceHolder 1"/>
+          <p:cNvSpPr>
+            <a:spLocks noGrp="1"/>
+          </p:cNvSpPr>
+          <p:nvPr>
+            <p:ph type="title"/>
+          </p:nvPr>
+        </p:nvSpPr>
+        <p:spPr>
+          <a:xfrm>
+            <a:off x="609480" y="273600"/>
+            <a:ext cx="10972440" cy="1145160"/>
+          </a:xfrm>
+          <a:prstGeom prst="rect">
+            <a:avLst/>
+          </a:prstGeom>
+        </p:spPr>
+        <p:txBody>
+          <a:bodyPr lIns="0" rIns="0" tIns="0" bIns="0" anchor="ctr"/>
+          <a:p>
+            <a:endParaRPr/>
+          </a:p>
+        </p:txBody>
+      </p:sp>
+      <p:sp>
+        <p:nvSpPr>
+          <p:cNvPr id="131" name="PlaceHolder 2"/>
+          <p:cNvSpPr>
+            <a:spLocks noGrp="1"/>
+          </p:cNvSpPr>
+          <p:nvPr>
+            <p:ph type="body"/>
+          </p:nvPr>
+        </p:nvSpPr>
+        <p:spPr>
+          <a:xfrm>
+            <a:off x="609480" y="1604520"/>
+            <a:ext cx="5354280" cy="1896840"/>
+          </a:xfrm>
+          <a:prstGeom prst="rect">
+            <a:avLst/>
+          </a:prstGeom>
+        </p:spPr>
+        <p:txBody>
+          <a:bodyPr lIns="0" rIns="0" tIns="0" bIns="0"/>
+          <a:p>
+            <a:endParaRPr/>
+          </a:p>
+        </p:txBody>
+      </p:sp>
+      <p:sp>
+        <p:nvSpPr>
+          <p:cNvPr id="132" name="PlaceHolder 3"/>
+          <p:cNvSpPr>
+            <a:spLocks noGrp="1"/>
+          </p:cNvSpPr>
+          <p:nvPr>
+            <p:ph type="body"/>
+          </p:nvPr>
+        </p:nvSpPr>
+        <p:spPr>
+          <a:xfrm>
+            <a:off x="6231960" y="1604520"/>
+            <a:ext cx="5354280" cy="1896840"/>
+          </a:xfrm>
+          <a:prstGeom prst="rect">
+            <a:avLst/>
+          </a:prstGeom>
+        </p:spPr>
+        <p:txBody>
+          <a:bodyPr lIns="0" rIns="0" tIns="0" bIns="0"/>
+          <a:p>
+            <a:endParaRPr/>
+          </a:p>
+        </p:txBody>
+      </p:sp>
+      <p:sp>
+        <p:nvSpPr>
+          <p:cNvPr id="133" name="PlaceHolder 4"/>
+          <p:cNvSpPr>
+            <a:spLocks noGrp="1"/>
+          </p:cNvSpPr>
+          <p:nvPr>
+            <p:ph type="body"/>
+          </p:nvPr>
+        </p:nvSpPr>
+        <p:spPr>
+          <a:xfrm>
+            <a:off x="609480" y="3682080"/>
+            <a:ext cx="10972440" cy="1896840"/>
+          </a:xfrm>
+          <a:prstGeom prst="rect">
+            <a:avLst/>
+          </a:prstGeom>
+        </p:spPr>
+        <p:txBody>
+          <a:bodyPr lIns="0" rIns="0" tIns="0" bIns="0"/>
+          <a:p>
+            <a:endParaRPr/>
+          </a:p>
+        </p:txBody>
+      </p:sp>
+    </p:spTree>
+  </p:cSld>
+</p:sldLayout>
+</file>
+
+<file path=ppt/slideLayouts/slideLayout46.xml><?xml version="1.0" encoding="utf-8"?>
+<p:sldLayout xmlns:a="http://schemas.openxmlformats.org/drawingml/2006/main" xmlns:p="http://schemas.openxmlformats.org/presentationml/2006/main" xmlns:r="http://schemas.openxmlformats.org/officeDocument/2006/relationships" type="objOverTx" preserve="1">
+  <p:cSld name="Title, Content over Content">
+    <p:spTree>
+      <p:nvGrpSpPr>
+        <p:cNvPr id="1" name=""/>
+        <p:cNvGrpSpPr/>
+        <p:nvPr/>
+      </p:nvGrpSpPr>
+      <p:grpSpPr>
+        <a:xfrm>
+          <a:off x="0" y="0"/>
+          <a:ext cx="0" cy="0"/>
+          <a:chOff x="0" y="0"/>
+          <a:chExt cx="0" cy="0"/>
+        </a:xfrm>
+      </p:grpSpPr>
+      <p:sp>
+        <p:nvSpPr>
+          <p:cNvPr id="134" name="PlaceHolder 1"/>
+          <p:cNvSpPr>
+            <a:spLocks noGrp="1"/>
+          </p:cNvSpPr>
+          <p:nvPr>
+            <p:ph type="title"/>
+          </p:nvPr>
+        </p:nvSpPr>
+        <p:spPr>
+          <a:xfrm>
+            <a:off x="609480" y="273600"/>
+            <a:ext cx="10972440" cy="1145160"/>
+          </a:xfrm>
+          <a:prstGeom prst="rect">
+            <a:avLst/>
+          </a:prstGeom>
+        </p:spPr>
+        <p:txBody>
+          <a:bodyPr lIns="0" rIns="0" tIns="0" bIns="0" anchor="ctr"/>
+          <a:p>
+            <a:endParaRPr/>
+          </a:p>
+        </p:txBody>
+      </p:sp>
+      <p:sp>
+        <p:nvSpPr>
+          <p:cNvPr id="135" name="PlaceHolder 2"/>
+          <p:cNvSpPr>
+            <a:spLocks noGrp="1"/>
+          </p:cNvSpPr>
+          <p:nvPr>
+            <p:ph type="body"/>
+          </p:nvPr>
+        </p:nvSpPr>
+        <p:spPr>
+          <a:xfrm>
+            <a:off x="609480" y="1604520"/>
+            <a:ext cx="10972440" cy="1896840"/>
+          </a:xfrm>
+          <a:prstGeom prst="rect">
+            <a:avLst/>
+          </a:prstGeom>
+        </p:spPr>
+        <p:txBody>
+          <a:bodyPr lIns="0" rIns="0" tIns="0" bIns="0"/>
+          <a:p>
+            <a:endParaRPr/>
+          </a:p>
+        </p:txBody>
+      </p:sp>
+      <p:sp>
+        <p:nvSpPr>
+          <p:cNvPr id="136" name="PlaceHolder 3"/>
+          <p:cNvSpPr>
+            <a:spLocks noGrp="1"/>
+          </p:cNvSpPr>
+          <p:nvPr>
+            <p:ph type="body"/>
+          </p:nvPr>
+        </p:nvSpPr>
+        <p:spPr>
+          <a:xfrm>
+            <a:off x="609480" y="3682080"/>
+            <a:ext cx="10972440" cy="1896840"/>
+          </a:xfrm>
+          <a:prstGeom prst="rect">
+            <a:avLst/>
+          </a:prstGeom>
+        </p:spPr>
+        <p:txBody>
+          <a:bodyPr lIns="0" rIns="0" tIns="0" bIns="0"/>
+          <a:p>
+            <a:endParaRPr/>
+          </a:p>
+        </p:txBody>
+      </p:sp>
+    </p:spTree>
+  </p:cSld>
+</p:sldLayout>
+</file>
+
+<file path=ppt/slideLayouts/slideLayout47.xml><?xml version="1.0" encoding="utf-8"?>
+<p:sldLayout xmlns:a="http://schemas.openxmlformats.org/drawingml/2006/main" xmlns:p="http://schemas.openxmlformats.org/presentationml/2006/main" xmlns:r="http://schemas.openxmlformats.org/officeDocument/2006/relationships" type="fourObj" preserve="1">
+  <p:cSld name="Title, 4 Content">
+    <p:spTree>
+      <p:nvGrpSpPr>
+        <p:cNvPr id="1" name=""/>
+        <p:cNvGrpSpPr/>
+        <p:nvPr/>
+      </p:nvGrpSpPr>
+      <p:grpSpPr>
+        <a:xfrm>
+          <a:off x="0" y="0"/>
+          <a:ext cx="0" cy="0"/>
+          <a:chOff x="0" y="0"/>
+          <a:chExt cx="0" cy="0"/>
+        </a:xfrm>
+      </p:grpSpPr>
+      <p:sp>
+        <p:nvSpPr>
+          <p:cNvPr id="137" name="PlaceHolder 1"/>
+          <p:cNvSpPr>
+            <a:spLocks noGrp="1"/>
+          </p:cNvSpPr>
+          <p:nvPr>
+            <p:ph type="title"/>
+          </p:nvPr>
+        </p:nvSpPr>
+        <p:spPr>
+          <a:xfrm>
+            <a:off x="609480" y="273600"/>
+            <a:ext cx="10972440" cy="1145160"/>
+          </a:xfrm>
+          <a:prstGeom prst="rect">
+            <a:avLst/>
+          </a:prstGeom>
+        </p:spPr>
+        <p:txBody>
+          <a:bodyPr lIns="0" rIns="0" tIns="0" bIns="0" anchor="ctr"/>
+          <a:p>
+            <a:endParaRPr/>
+          </a:p>
+        </p:txBody>
+      </p:sp>
+      <p:sp>
+        <p:nvSpPr>
+          <p:cNvPr id="138" name="PlaceHolder 2"/>
+          <p:cNvSpPr>
+            <a:spLocks noGrp="1"/>
+          </p:cNvSpPr>
+          <p:nvPr>
+            <p:ph type="body"/>
+          </p:nvPr>
+        </p:nvSpPr>
+        <p:spPr>
+          <a:xfrm>
+            <a:off x="609480" y="1604520"/>
+            <a:ext cx="5354280" cy="1896840"/>
+          </a:xfrm>
+          <a:prstGeom prst="rect">
+            <a:avLst/>
+          </a:prstGeom>
+        </p:spPr>
+        <p:txBody>
+          <a:bodyPr lIns="0" rIns="0" tIns="0" bIns="0"/>
+          <a:p>
+            <a:endParaRPr/>
+          </a:p>
+        </p:txBody>
+      </p:sp>
+      <p:sp>
+        <p:nvSpPr>
+          <p:cNvPr id="139" name="PlaceHolder 3"/>
+          <p:cNvSpPr>
+            <a:spLocks noGrp="1"/>
+          </p:cNvSpPr>
+          <p:nvPr>
+            <p:ph type="body"/>
+          </p:nvPr>
+        </p:nvSpPr>
+        <p:spPr>
+          <a:xfrm>
+            <a:off x="6231960" y="1604520"/>
+            <a:ext cx="5354280" cy="1896840"/>
+          </a:xfrm>
+          <a:prstGeom prst="rect">
+            <a:avLst/>
+          </a:prstGeom>
+        </p:spPr>
+        <p:txBody>
+          <a:bodyPr lIns="0" rIns="0" tIns="0" bIns="0"/>
+          <a:p>
+            <a:endParaRPr/>
+          </a:p>
+        </p:txBody>
+      </p:sp>
+      <p:sp>
+        <p:nvSpPr>
+          <p:cNvPr id="140" name="PlaceHolder 4"/>
+          <p:cNvSpPr>
+            <a:spLocks noGrp="1"/>
+          </p:cNvSpPr>
+          <p:nvPr>
+            <p:ph type="body"/>
+          </p:nvPr>
+        </p:nvSpPr>
+        <p:spPr>
+          <a:xfrm>
+            <a:off x="6231960" y="3682080"/>
+            <a:ext cx="5354280" cy="1896840"/>
+          </a:xfrm>
+          <a:prstGeom prst="rect">
+            <a:avLst/>
+          </a:prstGeom>
+        </p:spPr>
+        <p:txBody>
+          <a:bodyPr lIns="0" rIns="0" tIns="0" bIns="0"/>
+          <a:p>
+            <a:endParaRPr/>
+          </a:p>
+        </p:txBody>
+      </p:sp>
+      <p:sp>
+        <p:nvSpPr>
+          <p:cNvPr id="141" name="PlaceHolder 5"/>
+          <p:cNvSpPr>
+            <a:spLocks noGrp="1"/>
+          </p:cNvSpPr>
+          <p:nvPr>
+            <p:ph type="body"/>
+          </p:nvPr>
+        </p:nvSpPr>
+        <p:spPr>
+          <a:xfrm>
+            <a:off x="609480" y="3682080"/>
+            <a:ext cx="5354280" cy="1896840"/>
+          </a:xfrm>
+          <a:prstGeom prst="rect">
+            <a:avLst/>
+          </a:prstGeom>
+        </p:spPr>
+        <p:txBody>
+          <a:bodyPr lIns="0" rIns="0" tIns="0" bIns="0"/>
+          <a:p>
+            <a:endParaRPr/>
+          </a:p>
+        </p:txBody>
+      </p:sp>
+    </p:spTree>
+  </p:cSld>
+</p:sldLayout>
+</file>
+
+<file path=ppt/slideLayouts/slideLayout48.xml><?xml version="1.0" encoding="utf-8"?>
+<p:sldLayout xmlns:a="http://schemas.openxmlformats.org/drawingml/2006/main" xmlns:p="http://schemas.openxmlformats.org/presentationml/2006/main" xmlns:r="http://schemas.openxmlformats.org/officeDocument/2006/relationships" type="blank" preserve="1">
+  <p:cSld name="Title, 6 Content">
+    <p:spTree>
+      <p:nvGrpSpPr>
+        <p:cNvPr id="1" name=""/>
+        <p:cNvGrpSpPr/>
+        <p:nvPr/>
+      </p:nvGrpSpPr>
+      <p:grpSpPr>
+        <a:xfrm>
+          <a:off x="0" y="0"/>
+          <a:ext cx="0" cy="0"/>
+          <a:chOff x="0" y="0"/>
+          <a:chExt cx="0" cy="0"/>
+        </a:xfrm>
+      </p:grpSpPr>
+      <p:sp>
+        <p:nvSpPr>
+          <p:cNvPr id="142" name="PlaceHolder 1"/>
+          <p:cNvSpPr>
+            <a:spLocks noGrp="1"/>
+          </p:cNvSpPr>
+          <p:nvPr>
+            <p:ph type="title"/>
+          </p:nvPr>
+        </p:nvSpPr>
+        <p:spPr>
+          <a:xfrm>
+            <a:off x="609480" y="273600"/>
+            <a:ext cx="10972440" cy="1145160"/>
+          </a:xfrm>
+          <a:prstGeom prst="rect">
+            <a:avLst/>
+          </a:prstGeom>
+        </p:spPr>
+        <p:txBody>
+          <a:bodyPr lIns="0" rIns="0" tIns="0" bIns="0" anchor="ctr"/>
+          <a:p>
+            <a:endParaRPr/>
+          </a:p>
+        </p:txBody>
+      </p:sp>
+      <p:sp>
+        <p:nvSpPr>
+          <p:cNvPr id="143" name="PlaceHolder 2"/>
+          <p:cNvSpPr>
+            <a:spLocks noGrp="1"/>
+          </p:cNvSpPr>
+          <p:nvPr>
+            <p:ph type="body"/>
+          </p:nvPr>
+        </p:nvSpPr>
+        <p:spPr>
+          <a:xfrm>
+            <a:off x="609480" y="1604520"/>
+            <a:ext cx="10972440" cy="3977280"/>
+          </a:xfrm>
+          <a:prstGeom prst="rect">
+            <a:avLst/>
+          </a:prstGeom>
+        </p:spPr>
+        <p:txBody>
+          <a:bodyPr lIns="0" rIns="0" tIns="0" bIns="0"/>
+          <a:p>
+            <a:endParaRPr/>
+          </a:p>
+        </p:txBody>
+      </p:sp>
+      <p:sp>
+        <p:nvSpPr>
+          <p:cNvPr id="144" name="PlaceHolder 3"/>
+          <p:cNvSpPr>
+            <a:spLocks noGrp="1"/>
+          </p:cNvSpPr>
+          <p:nvPr>
+            <p:ph type="body"/>
+          </p:nvPr>
+        </p:nvSpPr>
+        <p:spPr>
+          <a:xfrm>
+            <a:off x="609480" y="1604520"/>
+            <a:ext cx="10972440" cy="3977280"/>
+          </a:xfrm>
+          <a:prstGeom prst="rect">
+            <a:avLst/>
+          </a:prstGeom>
+        </p:spPr>
+        <p:txBody>
+          <a:bodyPr lIns="0" rIns="0" tIns="0" bIns="0"/>
+          <a:p>
+            <a:endParaRPr/>
+          </a:p>
+        </p:txBody>
+      </p:sp>
+      <p:pic>
+        <p:nvPicPr>
+          <p:cNvPr id="145" name="" descr=""/>
+          <p:cNvPicPr/>
+          <p:nvPr/>
+        </p:nvPicPr>
+        <p:blipFill>
+          <a:blip r:embed="rId2"/>
+          <a:stretch>
+            <a:fillRect/>
+          </a:stretch>
+        </p:blipFill>
+        <p:spPr>
+          <a:xfrm>
+            <a:off x="3602880" y="1604520"/>
+            <a:ext cx="4984920" cy="3977280"/>
+          </a:xfrm>
+          <a:prstGeom prst="rect">
+            <a:avLst/>
+          </a:prstGeom>
+          <a:ln>
+            <a:noFill/>
+          </a:ln>
+        </p:spPr>
+      </p:pic>
+      <p:pic>
+        <p:nvPicPr>
+          <p:cNvPr id="146" name="" descr=""/>
+          <p:cNvPicPr/>
+          <p:nvPr/>
+        </p:nvPicPr>
+        <p:blipFill>
+          <a:blip r:embed="rId3"/>
+          <a:stretch>
+            <a:fillRect/>
+          </a:stretch>
+        </p:blipFill>
+        <p:spPr>
+          <a:xfrm>
+            <a:off x="3602880" y="1604520"/>
+            <a:ext cx="4984920" cy="3977280"/>
+          </a:xfrm>
+          <a:prstGeom prst="rect">
+            <a:avLst/>
+          </a:prstGeom>
+          <a:ln>
+            <a:noFill/>
+          </a:ln>
+        </p:spPr>
+      </p:pic>
     </p:spTree>
   </p:cSld>
 </p:sldLayout>
@@ -3518,7 +4670,7 @@
         <p:spPr>
           <a:xfrm>
             <a:off x="609480" y="273600"/>
-            <a:ext cx="10972080" cy="1144800"/>
+            <a:ext cx="10972440" cy="1144800"/>
           </a:xfrm>
           <a:prstGeom prst="rect">
             <a:avLst/>
@@ -3527,8 +4679,9 @@
         <p:txBody>
           <a:bodyPr lIns="0" rIns="0" tIns="0" bIns="0" anchor="ctr"/>
           <a:p>
+            <a:pPr algn="ctr"/>
             <a:r>
-              <a:rPr lang="en-US">
+              <a:rPr lang="en-US" sz="4400">
                 <a:latin typeface="Arial"/>
               </a:rPr>
               <a:t>Click to edit the title text format</a:t>
@@ -3550,7 +4703,7 @@
         <p:spPr>
           <a:xfrm>
             <a:off x="609480" y="1604520"/>
-            <a:ext cx="10972080" cy="3976920"/>
+            <a:ext cx="10972440" cy="3977280"/>
           </a:xfrm>
           <a:prstGeom prst="rect">
             <a:avLst/>
@@ -3565,7 +4718,7 @@
               <a:buChar char=""/>
             </a:pPr>
             <a:r>
-              <a:rPr lang="en-US">
+              <a:rPr lang="en-US" sz="3200">
                 <a:latin typeface="Arial"/>
               </a:rPr>
               <a:t>Click to edit the outline text format</a:t>
@@ -3579,7 +4732,7 @@
               <a:buChar char=""/>
             </a:pPr>
             <a:r>
-              <a:rPr lang="en-US">
+              <a:rPr lang="en-US" sz="2800">
                 <a:latin typeface="Arial"/>
               </a:rPr>
               <a:t>Second Outline Level</a:t>
@@ -3593,7 +4746,7 @@
               <a:buChar char=""/>
             </a:pPr>
             <a:r>
-              <a:rPr lang="en-US">
+              <a:rPr lang="en-US" sz="2400">
                 <a:latin typeface="Arial"/>
               </a:rPr>
               <a:t>Third Outline Level</a:t>
@@ -3607,7 +4760,7 @@
               <a:buChar char=""/>
             </a:pPr>
             <a:r>
-              <a:rPr lang="en-US">
+              <a:rPr lang="en-US" sz="2000">
                 <a:latin typeface="Arial"/>
               </a:rPr>
               <a:t>Fourth Outline Level</a:t>
@@ -3621,7 +4774,7 @@
               <a:buChar char=""/>
             </a:pPr>
             <a:r>
-              <a:rPr lang="en-US">
+              <a:rPr lang="en-US" sz="2000">
                 <a:latin typeface="Arial"/>
               </a:rPr>
               <a:t>Fifth Outline Level</a:t>
@@ -3635,7 +4788,7 @@
               <a:buChar char=""/>
             </a:pPr>
             <a:r>
-              <a:rPr lang="en-US">
+              <a:rPr lang="en-US" sz="2000">
                 <a:latin typeface="Arial"/>
               </a:rPr>
               <a:t>Sixth Outline Level</a:t>
@@ -3649,7 +4802,7 @@
               <a:buChar char=""/>
             </a:pPr>
             <a:r>
-              <a:rPr lang="en-US">
+              <a:rPr lang="en-US" sz="2000">
                 <a:latin typeface="Arial"/>
               </a:rPr>
               <a:t>Seventh Outline Level</a:t>
@@ -3907,112 +5060,6 @@
             <a:spLocks noGrp="1"/>
           </p:cNvSpPr>
           <p:nvPr>
-            <p:ph type="dt"/>
-          </p:nvPr>
-        </p:nvSpPr>
-        <p:spPr>
-          <a:xfrm>
-            <a:off x="838080" y="6356520"/>
-            <a:ext cx="2742840" cy="364680"/>
-          </a:xfrm>
-          <a:prstGeom prst="rect">
-            <a:avLst/>
-          </a:prstGeom>
-        </p:spPr>
-        <p:txBody>
-          <a:bodyPr anchor="ctr"/>
-          <a:p>
-            <a:pPr>
-              <a:lnSpc>
-                <a:spcPct val="100000"/>
-              </a:lnSpc>
-            </a:pPr>
-            <a:r>
-              <a:rPr lang="en-US" sz="1200">
-                <a:solidFill>
-                  <a:srgbClr val="8b8b8b"/>
-                </a:solidFill>
-                <a:latin typeface="Calibri"/>
-              </a:rPr>
-              <a:t>1/25/19</a:t>
-            </a:r>
-            <a:endParaRPr/>
-          </a:p>
-        </p:txBody>
-      </p:sp>
-      <p:sp>
-        <p:nvSpPr>
-          <p:cNvPr id="73" name="PlaceHolder 2"/>
-          <p:cNvSpPr>
-            <a:spLocks noGrp="1"/>
-          </p:cNvSpPr>
-          <p:nvPr>
-            <p:ph type="ftr"/>
-          </p:nvPr>
-        </p:nvSpPr>
-        <p:spPr>
-          <a:xfrm>
-            <a:off x="4038480" y="6356520"/>
-            <a:ext cx="4114440" cy="364680"/>
-          </a:xfrm>
-          <a:prstGeom prst="rect">
-            <a:avLst/>
-          </a:prstGeom>
-        </p:spPr>
-        <p:txBody>
-          <a:bodyPr anchor="ctr"/>
-          <a:p>
-            <a:endParaRPr/>
-          </a:p>
-        </p:txBody>
-      </p:sp>
-      <p:sp>
-        <p:nvSpPr>
-          <p:cNvPr id="74" name="PlaceHolder 3"/>
-          <p:cNvSpPr>
-            <a:spLocks noGrp="1"/>
-          </p:cNvSpPr>
-          <p:nvPr>
-            <p:ph type="sldNum"/>
-          </p:nvPr>
-        </p:nvSpPr>
-        <p:spPr>
-          <a:xfrm>
-            <a:off x="8610480" y="6356520"/>
-            <a:ext cx="2742840" cy="364680"/>
-          </a:xfrm>
-          <a:prstGeom prst="rect">
-            <a:avLst/>
-          </a:prstGeom>
-        </p:spPr>
-        <p:txBody>
-          <a:bodyPr anchor="ctr"/>
-          <a:p>
-            <a:pPr algn="r">
-              <a:lnSpc>
-                <a:spcPct val="100000"/>
-              </a:lnSpc>
-            </a:pPr>
-            <a:fld id="{FA82F5ED-7CF2-4C33-B097-DCBB668CAEDE}" type="slidenum">
-              <a:rPr lang="en-US" sz="1200">
-                <a:solidFill>
-                  <a:srgbClr val="8b8b8b"/>
-                </a:solidFill>
-                <a:latin typeface="Calibri"/>
-              </a:rPr>
-              <a:t>&lt;number&gt;</a:t>
-            </a:fld>
-            <a:endParaRPr/>
-          </a:p>
-        </p:txBody>
-      </p:sp>
-      <p:sp>
-        <p:nvSpPr>
-          <p:cNvPr id="75" name="PlaceHolder 4"/>
-          <p:cNvSpPr>
-            <a:spLocks noGrp="1"/>
-          </p:cNvSpPr>
-          <p:nvPr>
             <p:ph type="title"/>
           </p:nvPr>
         </p:nvSpPr>
@@ -4028,9 +5075,10 @@
         <p:txBody>
           <a:bodyPr lIns="0" rIns="0" tIns="0" bIns="0" anchor="ctr"/>
           <a:p>
+            <a:pPr algn="ctr"/>
             <a:r>
-              <a:rPr lang="da-DK">
-                <a:latin typeface="Calibri"/>
+              <a:rPr lang="en-US" sz="4400">
+                <a:latin typeface="Arial"/>
               </a:rPr>
               <a:t>Click to edit the title text format</a:t>
             </a:r>
@@ -4040,7 +5088,7 @@
       </p:sp>
       <p:sp>
         <p:nvSpPr>
-          <p:cNvPr id="76" name="PlaceHolder 5"/>
+          <p:cNvPr id="73" name="PlaceHolder 2"/>
           <p:cNvSpPr>
             <a:spLocks noGrp="1"/>
           </p:cNvSpPr>
@@ -4066,8 +5114,8 @@
               <a:buChar char=""/>
             </a:pPr>
             <a:r>
-              <a:rPr lang="da-DK" sz="2800">
-                <a:latin typeface="Calibri"/>
+              <a:rPr lang="en-US" sz="3200">
+                <a:latin typeface="Arial"/>
               </a:rPr>
               <a:t>Click to edit the outline text format</a:t>
             </a:r>
@@ -4080,8 +5128,8 @@
               <a:buChar char=""/>
             </a:pPr>
             <a:r>
-              <a:rPr lang="da-DK" sz="2000">
-                <a:latin typeface="Calibri"/>
+              <a:rPr lang="en-US" sz="2800">
+                <a:latin typeface="Arial"/>
               </a:rPr>
               <a:t>Second Outline Level</a:t>
             </a:r>
@@ -4094,8 +5142,8 @@
               <a:buChar char=""/>
             </a:pPr>
             <a:r>
-              <a:rPr lang="da-DK">
-                <a:latin typeface="Calibri"/>
+              <a:rPr lang="en-US" sz="2400">
+                <a:latin typeface="Arial"/>
               </a:rPr>
               <a:t>Third Outline Level</a:t>
             </a:r>
@@ -4108,8 +5156,8 @@
               <a:buChar char=""/>
             </a:pPr>
             <a:r>
-              <a:rPr lang="da-DK">
-                <a:latin typeface="Calibri"/>
+              <a:rPr lang="en-US" sz="2000">
+                <a:latin typeface="Arial"/>
               </a:rPr>
               <a:t>Fourth Outline Level</a:t>
             </a:r>
@@ -4122,8 +5170,8 @@
               <a:buChar char=""/>
             </a:pPr>
             <a:r>
-              <a:rPr lang="da-DK" sz="2000">
-                <a:latin typeface="Calibri"/>
+              <a:rPr lang="en-US" sz="2000">
+                <a:latin typeface="Arial"/>
               </a:rPr>
               <a:t>Fifth Outline Level</a:t>
             </a:r>
@@ -4136,8 +5184,8 @@
               <a:buChar char=""/>
             </a:pPr>
             <a:r>
-              <a:rPr lang="da-DK" sz="2000">
-                <a:latin typeface="Calibri"/>
+              <a:rPr lang="en-US" sz="2000">
+                <a:latin typeface="Arial"/>
               </a:rPr>
               <a:t>Sixth Outline Level</a:t>
             </a:r>
@@ -4150,8 +5198,8 @@
               <a:buChar char=""/>
             </a:pPr>
             <a:r>
-              <a:rPr lang="da-DK" sz="2000">
-                <a:latin typeface="Calibri"/>
+              <a:rPr lang="en-US" sz="2000">
+                <a:latin typeface="Arial"/>
               </a:rPr>
               <a:t>Seventh Outline Level</a:t>
             </a:r>
@@ -4175,6 +5223,309 @@
     <p:sldLayoutId id="2147483684" r:id="rId11"/>
     <p:sldLayoutId id="2147483685" r:id="rId12"/>
     <p:sldLayoutId id="2147483686" r:id="rId13"/>
+  </p:sldLayoutIdLst>
+</p:sldMaster>
+</file>
+
+<file path=ppt/slideMasters/slideMaster4.xml><?xml version="1.0" encoding="utf-8"?>
+<p:sldMaster xmlns:a="http://schemas.openxmlformats.org/drawingml/2006/main" xmlns:p="http://schemas.openxmlformats.org/presentationml/2006/main" xmlns:r="http://schemas.openxmlformats.org/officeDocument/2006/relationships">
+  <p:cSld>
+    <p:bg>
+      <p:bgPr>
+        <a:solidFill>
+          <a:srgbClr val="ffffff"/>
+        </a:solidFill>
+      </p:bgPr>
+    </p:bg>
+    <p:spTree>
+      <p:nvGrpSpPr>
+        <p:cNvPr id="1" name=""/>
+        <p:cNvGrpSpPr/>
+        <p:nvPr/>
+      </p:nvGrpSpPr>
+      <p:grpSpPr>
+        <a:xfrm>
+          <a:off x="0" y="0"/>
+          <a:ext cx="0" cy="0"/>
+          <a:chOff x="0" y="0"/>
+          <a:chExt cx="0" cy="0"/>
+        </a:xfrm>
+      </p:grpSpPr>
+      <p:sp>
+        <p:nvSpPr>
+          <p:cNvPr id="108" name="PlaceHolder 1"/>
+          <p:cNvSpPr>
+            <a:spLocks noGrp="1"/>
+          </p:cNvSpPr>
+          <p:nvPr>
+            <p:ph type="dt"/>
+          </p:nvPr>
+        </p:nvSpPr>
+        <p:spPr>
+          <a:xfrm>
+            <a:off x="838080" y="6356520"/>
+            <a:ext cx="2742840" cy="364680"/>
+          </a:xfrm>
+          <a:prstGeom prst="rect">
+            <a:avLst/>
+          </a:prstGeom>
+        </p:spPr>
+        <p:txBody>
+          <a:bodyPr anchor="ctr"/>
+          <a:p>
+            <a:pPr>
+              <a:lnSpc>
+                <a:spcPct val="100000"/>
+              </a:lnSpc>
+            </a:pPr>
+            <a:r>
+              <a:rPr lang="en-US" sz="1200">
+                <a:solidFill>
+                  <a:srgbClr val="8b8b8b"/>
+                </a:solidFill>
+                <a:latin typeface="Calibri"/>
+              </a:rPr>
+              <a:t>1/28/19</a:t>
+            </a:r>
+            <a:endParaRPr/>
+          </a:p>
+        </p:txBody>
+      </p:sp>
+      <p:sp>
+        <p:nvSpPr>
+          <p:cNvPr id="109" name="PlaceHolder 2"/>
+          <p:cNvSpPr>
+            <a:spLocks noGrp="1"/>
+          </p:cNvSpPr>
+          <p:nvPr>
+            <p:ph type="ftr"/>
+          </p:nvPr>
+        </p:nvSpPr>
+        <p:spPr>
+          <a:xfrm>
+            <a:off x="4038480" y="6356520"/>
+            <a:ext cx="4114440" cy="364680"/>
+          </a:xfrm>
+          <a:prstGeom prst="rect">
+            <a:avLst/>
+          </a:prstGeom>
+        </p:spPr>
+        <p:txBody>
+          <a:bodyPr anchor="ctr"/>
+          <a:p>
+            <a:endParaRPr/>
+          </a:p>
+        </p:txBody>
+      </p:sp>
+      <p:sp>
+        <p:nvSpPr>
+          <p:cNvPr id="110" name="PlaceHolder 3"/>
+          <p:cNvSpPr>
+            <a:spLocks noGrp="1"/>
+          </p:cNvSpPr>
+          <p:nvPr>
+            <p:ph type="sldNum"/>
+          </p:nvPr>
+        </p:nvSpPr>
+        <p:spPr>
+          <a:xfrm>
+            <a:off x="8610480" y="6356520"/>
+            <a:ext cx="2742840" cy="364680"/>
+          </a:xfrm>
+          <a:prstGeom prst="rect">
+            <a:avLst/>
+          </a:prstGeom>
+        </p:spPr>
+        <p:txBody>
+          <a:bodyPr anchor="ctr"/>
+          <a:p>
+            <a:pPr algn="r">
+              <a:lnSpc>
+                <a:spcPct val="100000"/>
+              </a:lnSpc>
+            </a:pPr>
+            <a:fld id="{5FA64A5E-2F1F-4053-A4C4-DD5E4B0FD530}" type="slidenum">
+              <a:rPr lang="en-US" sz="1200">
+                <a:solidFill>
+                  <a:srgbClr val="8b8b8b"/>
+                </a:solidFill>
+                <a:latin typeface="Calibri"/>
+              </a:rPr>
+              <a:t>&lt;number&gt;</a:t>
+            </a:fld>
+            <a:endParaRPr/>
+          </a:p>
+        </p:txBody>
+      </p:sp>
+      <p:sp>
+        <p:nvSpPr>
+          <p:cNvPr id="111" name="PlaceHolder 4"/>
+          <p:cNvSpPr>
+            <a:spLocks noGrp="1"/>
+          </p:cNvSpPr>
+          <p:nvPr>
+            <p:ph type="title"/>
+          </p:nvPr>
+        </p:nvSpPr>
+        <p:spPr>
+          <a:xfrm>
+            <a:off x="609480" y="273600"/>
+            <a:ext cx="10972440" cy="1144800"/>
+          </a:xfrm>
+          <a:prstGeom prst="rect">
+            <a:avLst/>
+          </a:prstGeom>
+        </p:spPr>
+        <p:txBody>
+          <a:bodyPr lIns="0" rIns="0" tIns="0" bIns="0" anchor="ctr"/>
+          <a:p>
+            <a:r>
+              <a:rPr lang="da-DK">
+                <a:latin typeface="Calibri"/>
+              </a:rPr>
+              <a:t>Click to edit the title text format</a:t>
+            </a:r>
+            <a:endParaRPr/>
+          </a:p>
+        </p:txBody>
+      </p:sp>
+      <p:sp>
+        <p:nvSpPr>
+          <p:cNvPr id="112" name="PlaceHolder 5"/>
+          <p:cNvSpPr>
+            <a:spLocks noGrp="1"/>
+          </p:cNvSpPr>
+          <p:nvPr>
+            <p:ph type="body"/>
+          </p:nvPr>
+        </p:nvSpPr>
+        <p:spPr>
+          <a:xfrm>
+            <a:off x="609480" y="1604520"/>
+            <a:ext cx="10972440" cy="3977280"/>
+          </a:xfrm>
+          <a:prstGeom prst="rect">
+            <a:avLst/>
+          </a:prstGeom>
+        </p:spPr>
+        <p:txBody>
+          <a:bodyPr lIns="0" rIns="0" tIns="0" bIns="0"/>
+          <a:p>
+            <a:pPr>
+              <a:buSzPct val="45000"/>
+              <a:buFont typeface="StarSymbol"/>
+              <a:buChar char=""/>
+            </a:pPr>
+            <a:r>
+              <a:rPr lang="da-DK" sz="2800">
+                <a:latin typeface="Calibri"/>
+              </a:rPr>
+              <a:t>Click to edit the outline text format</a:t>
+            </a:r>
+            <a:endParaRPr/>
+          </a:p>
+          <a:p>
+            <a:pPr lvl="1">
+              <a:buSzPct val="75000"/>
+              <a:buFont typeface="StarSymbol"/>
+              <a:buChar char=""/>
+            </a:pPr>
+            <a:r>
+              <a:rPr lang="da-DK" sz="2000">
+                <a:latin typeface="Calibri"/>
+              </a:rPr>
+              <a:t>Second Outline Level</a:t>
+            </a:r>
+            <a:endParaRPr/>
+          </a:p>
+          <a:p>
+            <a:pPr lvl="2">
+              <a:buSzPct val="45000"/>
+              <a:buFont typeface="StarSymbol"/>
+              <a:buChar char=""/>
+            </a:pPr>
+            <a:r>
+              <a:rPr lang="da-DK">
+                <a:latin typeface="Calibri"/>
+              </a:rPr>
+              <a:t>Third Outline Level</a:t>
+            </a:r>
+            <a:endParaRPr/>
+          </a:p>
+          <a:p>
+            <a:pPr lvl="3">
+              <a:buSzPct val="75000"/>
+              <a:buFont typeface="StarSymbol"/>
+              <a:buChar char=""/>
+            </a:pPr>
+            <a:r>
+              <a:rPr lang="da-DK">
+                <a:latin typeface="Calibri"/>
+              </a:rPr>
+              <a:t>Fourth Outline Level</a:t>
+            </a:r>
+            <a:endParaRPr/>
+          </a:p>
+          <a:p>
+            <a:pPr lvl="4">
+              <a:buSzPct val="45000"/>
+              <a:buFont typeface="StarSymbol"/>
+              <a:buChar char=""/>
+            </a:pPr>
+            <a:r>
+              <a:rPr lang="da-DK" sz="2000">
+                <a:latin typeface="Calibri"/>
+              </a:rPr>
+              <a:t>Fifth Outline Level</a:t>
+            </a:r>
+            <a:endParaRPr/>
+          </a:p>
+          <a:p>
+            <a:pPr lvl="5">
+              <a:buSzPct val="45000"/>
+              <a:buFont typeface="StarSymbol"/>
+              <a:buChar char=""/>
+            </a:pPr>
+            <a:r>
+              <a:rPr lang="da-DK" sz="2000">
+                <a:latin typeface="Calibri"/>
+              </a:rPr>
+              <a:t>Sixth Outline Level</a:t>
+            </a:r>
+            <a:endParaRPr/>
+          </a:p>
+          <a:p>
+            <a:pPr lvl="6">
+              <a:buSzPct val="45000"/>
+              <a:buFont typeface="StarSymbol"/>
+              <a:buChar char=""/>
+            </a:pPr>
+            <a:r>
+              <a:rPr lang="da-DK" sz="2000">
+                <a:latin typeface="Calibri"/>
+              </a:rPr>
+              <a:t>Seventh Outline Level</a:t>
+            </a:r>
+            <a:endParaRPr/>
+          </a:p>
+        </p:txBody>
+      </p:sp>
+    </p:spTree>
+  </p:cSld>
+  <p:clrMap bg1="lt1" bg2="lt2" tx1="dk1" tx2="dk2" accent1="accent1" accent2="accent2" accent3="accent3" accent4="accent4" accent5="accent5" accent6="accent6" hlink="hlink" folHlink="folHlink"/>
+  <p:sldLayoutIdLst>
+    <p:sldLayoutId id="2147483688" r:id="rId2"/>
+    <p:sldLayoutId id="2147483689" r:id="rId3"/>
+    <p:sldLayoutId id="2147483690" r:id="rId4"/>
+    <p:sldLayoutId id="2147483691" r:id="rId5"/>
+    <p:sldLayoutId id="2147483692" r:id="rId6"/>
+    <p:sldLayoutId id="2147483693" r:id="rId7"/>
+    <p:sldLayoutId id="2147483694" r:id="rId8"/>
+    <p:sldLayoutId id="2147483695" r:id="rId9"/>
+    <p:sldLayoutId id="2147483696" r:id="rId10"/>
+    <p:sldLayoutId id="2147483697" r:id="rId11"/>
+    <p:sldLayoutId id="2147483698" r:id="rId12"/>
+    <p:sldLayoutId id="2147483699" r:id="rId13"/>
   </p:sldLayoutIdLst>
 </p:sldMaster>
 </file>
@@ -4198,14 +5549,14 @@
       </p:grpSpPr>
       <p:sp>
         <p:nvSpPr>
-          <p:cNvPr id="111" name="CustomShape 1"/>
+          <p:cNvPr id="147" name="CustomShape 1"/>
           <p:cNvSpPr/>
           <p:nvPr/>
         </p:nvSpPr>
         <p:spPr>
           <a:xfrm>
             <a:off x="1523880" y="1122480"/>
-            <a:ext cx="9142920" cy="2386440"/>
+            <a:ext cx="9142560" cy="2386080"/>
           </a:xfrm>
           <a:prstGeom prst="rect">
             <a:avLst/>
@@ -4238,14 +5589,14 @@
       </p:sp>
       <p:sp>
         <p:nvSpPr>
-          <p:cNvPr id="112" name="CustomShape 2"/>
+          <p:cNvPr id="148" name="CustomShape 2"/>
           <p:cNvSpPr/>
           <p:nvPr/>
         </p:nvSpPr>
         <p:spPr>
           <a:xfrm>
             <a:off x="1523880" y="3602160"/>
-            <a:ext cx="9142920" cy="1654560"/>
+            <a:ext cx="9142560" cy="1654200"/>
           </a:xfrm>
           <a:prstGeom prst="rect">
             <a:avLst/>
@@ -4265,6 +5616,348 @@
           <p:childTnLst>
             <p:seq>
               <p:cTn id="2" nodeType="mainSeq"/>
+              <p:prevCondLst>
+                <p:cond delay="0" evt="onPrev">
+                  <p:tgtEl>
+                    <p:sldTgt/>
+                  </p:tgtEl>
+                </p:cond>
+              </p:prevCondLst>
+              <p:nextCondLst>
+                <p:cond delay="0" evt="onNext">
+                  <p:tgtEl>
+                    <p:sldTgt/>
+                  </p:tgtEl>
+                </p:cond>
+              </p:nextCondLst>
+            </p:seq>
+          </p:childTnLst>
+        </p:cTn>
+      </p:par>
+    </p:tnLst>
+  </p:timing>
+</p:sld>
+</file>
+
+<file path=ppt/slides/slide10.xml><?xml version="1.0" encoding="utf-8"?>
+<p:sld xmlns:a="http://schemas.openxmlformats.org/drawingml/2006/main" xmlns:p="http://schemas.openxmlformats.org/presentationml/2006/main" xmlns:r="http://schemas.openxmlformats.org/officeDocument/2006/relationships">
+  <p:cSld>
+    <p:spTree>
+      <p:nvGrpSpPr>
+        <p:cNvPr id="1" name=""/>
+        <p:cNvGrpSpPr/>
+        <p:nvPr/>
+      </p:nvGrpSpPr>
+      <p:grpSpPr>
+        <a:xfrm>
+          <a:off x="0" y="0"/>
+          <a:ext cx="0" cy="0"/>
+          <a:chOff x="0" y="0"/>
+          <a:chExt cx="0" cy="0"/>
+        </a:xfrm>
+      </p:grpSpPr>
+      <p:pic>
+        <p:nvPicPr>
+          <p:cNvPr id="164" name="Picture 1" descr=""/>
+          <p:cNvPicPr/>
+          <p:nvPr/>
+        </p:nvPicPr>
+        <p:blipFill>
+          <a:blip r:embed="rId1"/>
+          <a:stretch>
+            <a:fillRect/>
+          </a:stretch>
+        </p:blipFill>
+        <p:spPr>
+          <a:xfrm>
+            <a:off x="0" y="0"/>
+            <a:ext cx="11908800" cy="6698520"/>
+          </a:xfrm>
+          <a:prstGeom prst="rect">
+            <a:avLst/>
+          </a:prstGeom>
+          <a:ln>
+            <a:noFill/>
+          </a:ln>
+        </p:spPr>
+      </p:pic>
+      <p:sp>
+        <p:nvSpPr>
+          <p:cNvPr id="165" name="CustomShape 1"/>
+          <p:cNvSpPr/>
+          <p:nvPr/>
+        </p:nvSpPr>
+        <p:spPr>
+          <a:xfrm>
+            <a:off x="3521880" y="510120"/>
+            <a:ext cx="4638960" cy="364680"/>
+          </a:xfrm>
+          <a:prstGeom prst="rect">
+            <a:avLst/>
+          </a:prstGeom>
+          <a:noFill/>
+          <a:ln>
+            <a:noFill/>
+          </a:ln>
+        </p:spPr>
+        <p:txBody>
+          <a:bodyPr wrap="none" lIns="90000" rIns="90000" tIns="45000" bIns="45000"/>
+          <a:p>
+            <a:pPr>
+              <a:lnSpc>
+                <a:spcPct val="100000"/>
+              </a:lnSpc>
+            </a:pPr>
+            <a:r>
+              <a:rPr lang="en-US">
+                <a:solidFill>
+                  <a:srgbClr val="000000"/>
+                </a:solidFill>
+                <a:latin typeface="Calibri"/>
+              </a:rPr>
+              <a:t>Filename: Air_Cauchy_SiOx(3nm)_Si.xy</a:t>
+            </a:r>
+            <a:endParaRPr/>
+          </a:p>
+        </p:txBody>
+      </p:sp>
+    </p:spTree>
+  </p:cSld>
+  <p:timing>
+    <p:tnLst>
+      <p:par>
+        <p:cTn id="19" dur="indefinite" restart="never" nodeType="tmRoot">
+          <p:childTnLst>
+            <p:seq>
+              <p:cTn id="20" nodeType="mainSeq"/>
+              <p:prevCondLst>
+                <p:cond delay="0" evt="onPrev">
+                  <p:tgtEl>
+                    <p:sldTgt/>
+                  </p:tgtEl>
+                </p:cond>
+              </p:prevCondLst>
+              <p:nextCondLst>
+                <p:cond delay="0" evt="onNext">
+                  <p:tgtEl>
+                    <p:sldTgt/>
+                  </p:tgtEl>
+                </p:cond>
+              </p:nextCondLst>
+            </p:seq>
+          </p:childTnLst>
+        </p:cTn>
+      </p:par>
+    </p:tnLst>
+  </p:timing>
+</p:sld>
+</file>
+
+<file path=ppt/slides/slide11.xml><?xml version="1.0" encoding="utf-8"?>
+<p:sld xmlns:a="http://schemas.openxmlformats.org/drawingml/2006/main" xmlns:p="http://schemas.openxmlformats.org/presentationml/2006/main" xmlns:r="http://schemas.openxmlformats.org/officeDocument/2006/relationships">
+  <p:cSld>
+    <p:spTree>
+      <p:nvGrpSpPr>
+        <p:cNvPr id="1" name=""/>
+        <p:cNvGrpSpPr/>
+        <p:nvPr/>
+      </p:nvGrpSpPr>
+      <p:grpSpPr>
+        <a:xfrm>
+          <a:off x="0" y="0"/>
+          <a:ext cx="0" cy="0"/>
+          <a:chOff x="0" y="0"/>
+          <a:chExt cx="0" cy="0"/>
+        </a:xfrm>
+      </p:grpSpPr>
+      <p:pic>
+        <p:nvPicPr>
+          <p:cNvPr id="166" name="Picture 1" descr=""/>
+          <p:cNvPicPr/>
+          <p:nvPr/>
+        </p:nvPicPr>
+        <p:blipFill>
+          <a:blip r:embed="rId1"/>
+          <a:stretch>
+            <a:fillRect/>
+          </a:stretch>
+        </p:blipFill>
+        <p:spPr>
+          <a:xfrm>
+            <a:off x="0" y="0"/>
+            <a:ext cx="12498480" cy="7030080"/>
+          </a:xfrm>
+          <a:prstGeom prst="rect">
+            <a:avLst/>
+          </a:prstGeom>
+          <a:ln>
+            <a:noFill/>
+          </a:ln>
+        </p:spPr>
+      </p:pic>
+      <p:sp>
+        <p:nvSpPr>
+          <p:cNvPr id="167" name="CustomShape 1"/>
+          <p:cNvSpPr/>
+          <p:nvPr/>
+        </p:nvSpPr>
+        <p:spPr>
+          <a:xfrm>
+            <a:off x="3521880" y="510120"/>
+            <a:ext cx="4638960" cy="364680"/>
+          </a:xfrm>
+          <a:prstGeom prst="rect">
+            <a:avLst/>
+          </a:prstGeom>
+          <a:noFill/>
+          <a:ln>
+            <a:noFill/>
+          </a:ln>
+        </p:spPr>
+        <p:txBody>
+          <a:bodyPr wrap="none" lIns="90000" rIns="90000" tIns="45000" bIns="45000"/>
+          <a:p>
+            <a:pPr>
+              <a:lnSpc>
+                <a:spcPct val="100000"/>
+              </a:lnSpc>
+            </a:pPr>
+            <a:r>
+              <a:rPr lang="en-US">
+                <a:solidFill>
+                  <a:srgbClr val="000000"/>
+                </a:solidFill>
+                <a:latin typeface="Calibri"/>
+              </a:rPr>
+              <a:t>Filename: Air_Cauchy_SiOx(2nm)_Si.xy</a:t>
+            </a:r>
+            <a:endParaRPr/>
+          </a:p>
+        </p:txBody>
+      </p:sp>
+    </p:spTree>
+  </p:cSld>
+  <p:timing>
+    <p:tnLst>
+      <p:par>
+        <p:cTn id="21" dur="indefinite" restart="never" nodeType="tmRoot">
+          <p:childTnLst>
+            <p:seq>
+              <p:cTn id="22" nodeType="mainSeq"/>
+              <p:prevCondLst>
+                <p:cond delay="0" evt="onPrev">
+                  <p:tgtEl>
+                    <p:sldTgt/>
+                  </p:tgtEl>
+                </p:cond>
+              </p:prevCondLst>
+              <p:nextCondLst>
+                <p:cond delay="0" evt="onNext">
+                  <p:tgtEl>
+                    <p:sldTgt/>
+                  </p:tgtEl>
+                </p:cond>
+              </p:nextCondLst>
+            </p:seq>
+          </p:childTnLst>
+        </p:cTn>
+      </p:par>
+    </p:tnLst>
+  </p:timing>
+</p:sld>
+</file>
+
+<file path=ppt/slides/slide12.xml><?xml version="1.0" encoding="utf-8"?>
+<p:sld xmlns:a="http://schemas.openxmlformats.org/drawingml/2006/main" xmlns:p="http://schemas.openxmlformats.org/presentationml/2006/main" xmlns:r="http://schemas.openxmlformats.org/officeDocument/2006/relationships">
+  <p:cSld>
+    <p:spTree>
+      <p:nvGrpSpPr>
+        <p:cNvPr id="1" name=""/>
+        <p:cNvGrpSpPr/>
+        <p:nvPr/>
+      </p:nvGrpSpPr>
+      <p:grpSpPr>
+        <a:xfrm>
+          <a:off x="0" y="0"/>
+          <a:ext cx="0" cy="0"/>
+          <a:chOff x="0" y="0"/>
+          <a:chExt cx="0" cy="0"/>
+        </a:xfrm>
+      </p:grpSpPr>
+      <p:pic>
+        <p:nvPicPr>
+          <p:cNvPr id="168" name="Picture 1" descr=""/>
+          <p:cNvPicPr/>
+          <p:nvPr/>
+        </p:nvPicPr>
+        <p:blipFill>
+          <a:blip r:embed="rId1"/>
+          <a:stretch>
+            <a:fillRect/>
+          </a:stretch>
+        </p:blipFill>
+        <p:spPr>
+          <a:xfrm>
+            <a:off x="0" y="0"/>
+            <a:ext cx="12191760" cy="6857640"/>
+          </a:xfrm>
+          <a:prstGeom prst="rect">
+            <a:avLst/>
+          </a:prstGeom>
+          <a:ln>
+            <a:noFill/>
+          </a:ln>
+        </p:spPr>
+      </p:pic>
+      <p:sp>
+        <p:nvSpPr>
+          <p:cNvPr id="169" name="CustomShape 1"/>
+          <p:cNvSpPr/>
+          <p:nvPr/>
+        </p:nvSpPr>
+        <p:spPr>
+          <a:xfrm>
+            <a:off x="3521880" y="510120"/>
+            <a:ext cx="4638960" cy="364680"/>
+          </a:xfrm>
+          <a:prstGeom prst="rect">
+            <a:avLst/>
+          </a:prstGeom>
+          <a:noFill/>
+          <a:ln>
+            <a:noFill/>
+          </a:ln>
+        </p:spPr>
+        <p:txBody>
+          <a:bodyPr wrap="none" lIns="90000" rIns="90000" tIns="45000" bIns="45000"/>
+          <a:p>
+            <a:pPr>
+              <a:lnSpc>
+                <a:spcPct val="100000"/>
+              </a:lnSpc>
+            </a:pPr>
+            <a:r>
+              <a:rPr lang="en-US">
+                <a:solidFill>
+                  <a:srgbClr val="000000"/>
+                </a:solidFill>
+                <a:latin typeface="Calibri"/>
+              </a:rPr>
+              <a:t>Filename: Air_Cauchy_SiOx(1nm)_Si.xy</a:t>
+            </a:r>
+            <a:endParaRPr/>
+          </a:p>
+        </p:txBody>
+      </p:sp>
+    </p:spTree>
+  </p:cSld>
+  <p:timing>
+    <p:tnLst>
+      <p:par>
+        <p:cTn id="23" dur="indefinite" restart="never" nodeType="tmRoot">
+          <p:childTnLst>
+            <p:seq>
+              <p:cTn id="24" nodeType="mainSeq"/>
               <p:prevCondLst>
                 <p:cond delay="0" evt="onPrev">
                   <p:tgtEl>
@@ -4307,7 +6000,7 @@
       </p:grpSpPr>
       <p:pic>
         <p:nvPicPr>
-          <p:cNvPr id="113" name="Picture 8" descr=""/>
+          <p:cNvPr id="149" name="Picture 8" descr=""/>
           <p:cNvPicPr/>
           <p:nvPr/>
         </p:nvPicPr>
@@ -4320,7 +6013,7 @@
         <p:spPr>
           <a:xfrm>
             <a:off x="0" y="0"/>
-            <a:ext cx="12191040" cy="6856920"/>
+            <a:ext cx="12190680" cy="6856560"/>
           </a:xfrm>
           <a:prstGeom prst="rect">
             <a:avLst/>
@@ -4332,14 +6025,14 @@
       </p:pic>
       <p:sp>
         <p:nvSpPr>
-          <p:cNvPr id="114" name="CustomShape 1"/>
+          <p:cNvPr id="150" name="CustomShape 1"/>
           <p:cNvSpPr/>
           <p:nvPr/>
         </p:nvSpPr>
         <p:spPr>
           <a:xfrm>
             <a:off x="3091680" y="5197320"/>
-            <a:ext cx="3368520" cy="637560"/>
+            <a:ext cx="3368160" cy="637200"/>
           </a:xfrm>
           <a:prstGeom prst="rect">
             <a:avLst/>
@@ -4438,7 +6131,7 @@
       </p:grpSpPr>
       <p:pic>
         <p:nvPicPr>
-          <p:cNvPr id="115" name="Picture 1" descr=""/>
+          <p:cNvPr id="151" name="Picture 1" descr=""/>
           <p:cNvPicPr/>
           <p:nvPr/>
         </p:nvPicPr>
@@ -4451,7 +6144,7 @@
         <p:spPr>
           <a:xfrm>
             <a:off x="0" y="-2520"/>
-            <a:ext cx="12195000" cy="6859440"/>
+            <a:ext cx="12194640" cy="6859080"/>
           </a:xfrm>
           <a:prstGeom prst="rect">
             <a:avLst/>
@@ -4463,14 +6156,14 @@
       </p:pic>
       <p:sp>
         <p:nvSpPr>
-          <p:cNvPr id="116" name="CustomShape 1"/>
+          <p:cNvPr id="152" name="CustomShape 1"/>
           <p:cNvSpPr/>
           <p:nvPr/>
         </p:nvSpPr>
         <p:spPr>
           <a:xfrm>
             <a:off x="1788120" y="5299920"/>
-            <a:ext cx="3050280" cy="637560"/>
+            <a:ext cx="3049920" cy="637200"/>
           </a:xfrm>
           <a:prstGeom prst="rect">
             <a:avLst/>
@@ -4569,7 +6262,7 @@
       </p:grpSpPr>
       <p:pic>
         <p:nvPicPr>
-          <p:cNvPr id="117" name="Picture 1" descr=""/>
+          <p:cNvPr id="153" name="Picture 1" descr=""/>
           <p:cNvPicPr/>
           <p:nvPr/>
         </p:nvPicPr>
@@ -4582,7 +6275,7 @@
         <p:spPr>
           <a:xfrm>
             <a:off x="0" y="0"/>
-            <a:ext cx="12191040" cy="6856920"/>
+            <a:ext cx="12190680" cy="6856560"/>
           </a:xfrm>
           <a:prstGeom prst="rect">
             <a:avLst/>
@@ -4594,14 +6287,14 @@
       </p:pic>
       <p:sp>
         <p:nvSpPr>
-          <p:cNvPr id="118" name="CustomShape 1"/>
+          <p:cNvPr id="154" name="CustomShape 1"/>
           <p:cNvSpPr/>
           <p:nvPr/>
         </p:nvSpPr>
         <p:spPr>
           <a:xfrm>
             <a:off x="2175120" y="5159880"/>
-            <a:ext cx="3152160" cy="363960"/>
+            <a:ext cx="3151800" cy="363600"/>
           </a:xfrm>
           <a:prstGeom prst="rect">
             <a:avLst/>
@@ -4700,7 +6393,7 @@
       </p:grpSpPr>
       <p:pic>
         <p:nvPicPr>
-          <p:cNvPr id="119" name="Picture 1" descr=""/>
+          <p:cNvPr id="155" name="Picture 1" descr=""/>
           <p:cNvPicPr/>
           <p:nvPr/>
         </p:nvPicPr>
@@ -4713,7 +6406,7 @@
         <p:spPr>
           <a:xfrm>
             <a:off x="0" y="0"/>
-            <a:ext cx="12191040" cy="6856920"/>
+            <a:ext cx="12190680" cy="6856560"/>
           </a:xfrm>
           <a:prstGeom prst="rect">
             <a:avLst/>
@@ -4725,14 +6418,14 @@
       </p:pic>
       <p:sp>
         <p:nvSpPr>
-          <p:cNvPr id="120" name="CustomShape 1"/>
+          <p:cNvPr id="156" name="CustomShape 1"/>
           <p:cNvSpPr/>
           <p:nvPr/>
         </p:nvSpPr>
         <p:spPr>
           <a:xfrm>
             <a:off x="2161800" y="5159880"/>
-            <a:ext cx="3318480" cy="363960"/>
+            <a:ext cx="3318120" cy="363600"/>
           </a:xfrm>
           <a:prstGeom prst="rect">
             <a:avLst/>
@@ -4814,7 +6507,7 @@
       </p:grpSpPr>
       <p:pic>
         <p:nvPicPr>
-          <p:cNvPr id="121" name="Picture 1" descr=""/>
+          <p:cNvPr id="157" name="Picture 1" descr=""/>
           <p:cNvPicPr/>
           <p:nvPr/>
         </p:nvPicPr>
@@ -4827,7 +6520,7 @@
         <p:spPr>
           <a:xfrm>
             <a:off x="0" y="0"/>
-            <a:ext cx="12191040" cy="6856920"/>
+            <a:ext cx="12190680" cy="6856560"/>
           </a:xfrm>
           <a:prstGeom prst="rect">
             <a:avLst/>
@@ -4839,14 +6532,14 @@
       </p:pic>
       <p:sp>
         <p:nvSpPr>
-          <p:cNvPr id="122" name="CustomShape 1"/>
+          <p:cNvPr id="158" name="CustomShape 1"/>
           <p:cNvSpPr/>
           <p:nvPr/>
         </p:nvSpPr>
         <p:spPr>
           <a:xfrm>
             <a:off x="251640" y="5113080"/>
-            <a:ext cx="6012720" cy="363960"/>
+            <a:ext cx="6012360" cy="363600"/>
           </a:xfrm>
           <a:prstGeom prst="rect">
             <a:avLst/>
@@ -4945,7 +6638,7 @@
       </p:grpSpPr>
       <p:pic>
         <p:nvPicPr>
-          <p:cNvPr id="123" name="Picture 3" descr=""/>
+          <p:cNvPr id="159" name="Picture 3" descr=""/>
           <p:cNvPicPr/>
           <p:nvPr/>
         </p:nvPicPr>
@@ -4958,7 +6651,7 @@
         <p:spPr>
           <a:xfrm>
             <a:off x="0" y="360"/>
-            <a:ext cx="12191400" cy="6857280"/>
+            <a:ext cx="12191040" cy="6856920"/>
           </a:xfrm>
           <a:prstGeom prst="rect">
             <a:avLst/>
@@ -5019,7 +6712,7 @@
       </p:grpSpPr>
       <p:pic>
         <p:nvPicPr>
-          <p:cNvPr id="124" name="Picture 1" descr=""/>
+          <p:cNvPr id="160" name="Picture 1" descr=""/>
           <p:cNvPicPr/>
           <p:nvPr/>
         </p:nvPicPr>
@@ -5032,7 +6725,7 @@
         <p:spPr>
           <a:xfrm>
             <a:off x="0" y="96480"/>
-            <a:ext cx="12191760" cy="6761160"/>
+            <a:ext cx="12191400" cy="6760800"/>
           </a:xfrm>
           <a:prstGeom prst="rect">
             <a:avLst/>
@@ -5044,14 +6737,14 @@
       </p:pic>
       <p:sp>
         <p:nvSpPr>
-          <p:cNvPr id="125" name="CustomShape 1"/>
+          <p:cNvPr id="161" name="CustomShape 1"/>
           <p:cNvSpPr/>
           <p:nvPr/>
         </p:nvSpPr>
         <p:spPr>
           <a:xfrm>
             <a:off x="236880" y="5319360"/>
-            <a:ext cx="3949920" cy="364680"/>
+            <a:ext cx="3949560" cy="364320"/>
           </a:xfrm>
           <a:prstGeom prst="rect">
             <a:avLst/>
@@ -5133,7 +6826,7 @@
       </p:grpSpPr>
       <p:pic>
         <p:nvPicPr>
-          <p:cNvPr id="126" name="Picture 1" descr=""/>
+          <p:cNvPr id="162" name="Picture 1" descr=""/>
           <p:cNvPicPr/>
           <p:nvPr/>
         </p:nvPicPr>
@@ -5146,7 +6839,7 @@
         <p:spPr>
           <a:xfrm>
             <a:off x="0" y="0"/>
-            <a:ext cx="12191760" cy="6857640"/>
+            <a:ext cx="12191400" cy="6857280"/>
           </a:xfrm>
           <a:prstGeom prst="rect">
             <a:avLst/>
@@ -5158,14 +6851,14 @@
       </p:pic>
       <p:sp>
         <p:nvSpPr>
-          <p:cNvPr id="127" name="CustomShape 1"/>
+          <p:cNvPr id="163" name="CustomShape 1"/>
           <p:cNvSpPr/>
           <p:nvPr/>
         </p:nvSpPr>
         <p:spPr>
           <a:xfrm>
             <a:off x="1103760" y="5222520"/>
-            <a:ext cx="4638960" cy="364680"/>
+            <a:ext cx="4638600" cy="364320"/>
           </a:xfrm>
           <a:prstGeom prst="rect">
             <a:avLst/>
@@ -5895,4 +7588,227 @@
     </a:fmtScheme>
   </a:themeElements>
 </a:theme>
+</file>
+
+<file path=ppt/theme/theme4.xml><?xml version="1.0" encoding="utf-8"?>
+<a:theme xmlns:a="http://schemas.openxmlformats.org/drawingml/2006/main" name="Office Theme">
+  <a:themeElements>
+    <a:clrScheme name="Office">
+      <a:dk1>
+        <a:sysClr val="windowText" lastClr="000000"/>
+      </a:dk1>
+      <a:lt1>
+        <a:sysClr val="window" lastClr="FFFFFF"/>
+      </a:lt1>
+      <a:dk2>
+        <a:srgbClr val="1F497D"/>
+      </a:dk2>
+      <a:lt2>
+        <a:srgbClr val="EEECE1"/>
+      </a:lt2>
+      <a:accent1>
+        <a:srgbClr val="4F81BD"/>
+      </a:accent1>
+      <a:accent2>
+        <a:srgbClr val="C0504D"/>
+      </a:accent2>
+      <a:accent3>
+        <a:srgbClr val="9BBB59"/>
+      </a:accent3>
+      <a:accent4>
+        <a:srgbClr val="8064A2"/>
+      </a:accent4>
+      <a:accent5>
+        <a:srgbClr val="4BACC6"/>
+      </a:accent5>
+      <a:accent6>
+        <a:srgbClr val="F79646"/>
+      </a:accent6>
+      <a:hlink>
+        <a:srgbClr val="0000FF"/>
+      </a:hlink>
+      <a:folHlink>
+        <a:srgbClr val="800080"/>
+      </a:folHlink>
+    </a:clrScheme>
+    <a:fontScheme name="Office">
+      <a:majorFont>
+        <a:latin typeface="Arial"/>
+        <a:ea typeface="DejaVu Sans"/>
+        <a:cs typeface="DejaVu Sans"/>
+      </a:majorFont>
+      <a:minorFont>
+        <a:latin typeface="Arial"/>
+        <a:ea typeface="DejaVu Sans"/>
+        <a:cs typeface="DejaVu Sans"/>
+      </a:minorFont>
+    </a:fontScheme>
+    <a:fmtScheme name="Office">
+      <a:fillStyleLst>
+        <a:solidFill>
+          <a:schemeClr val="phClr"/>
+        </a:solidFill>
+        <a:gradFill rotWithShape="1">
+          <a:gsLst>
+            <a:gs pos="0">
+              <a:schemeClr val="phClr">
+                <a:tint val="50000"/>
+                <a:satMod val="300000"/>
+              </a:schemeClr>
+            </a:gs>
+            <a:gs pos="35000">
+              <a:schemeClr val="phClr">
+                <a:tint val="37000"/>
+                <a:satMod val="300000"/>
+              </a:schemeClr>
+            </a:gs>
+            <a:gs pos="100000">
+              <a:schemeClr val="phClr">
+                <a:tint val="15000"/>
+                <a:satMod val="350000"/>
+              </a:schemeClr>
+            </a:gs>
+          </a:gsLst>
+          <a:lin ang="16200000" scaled="1"/>
+        </a:gradFill>
+        <a:gradFill rotWithShape="1">
+          <a:gsLst>
+            <a:gs pos="0">
+              <a:schemeClr val="phClr">
+                <a:shade val="51000"/>
+                <a:satMod val="130000"/>
+              </a:schemeClr>
+            </a:gs>
+            <a:gs pos="80000">
+              <a:schemeClr val="phClr">
+                <a:shade val="93000"/>
+                <a:satMod val="130000"/>
+              </a:schemeClr>
+            </a:gs>
+            <a:gs pos="100000">
+              <a:schemeClr val="phClr">
+                <a:shade val="94000"/>
+                <a:satMod val="135000"/>
+              </a:schemeClr>
+            </a:gs>
+          </a:gsLst>
+          <a:lin ang="16200000" scaled="0"/>
+        </a:gradFill>
+      </a:fillStyleLst>
+      <a:lnStyleLst>
+        <a:ln w="9525" cap="flat" cmpd="sng" algn="ctr">
+          <a:solidFill>
+            <a:schemeClr val="phClr">
+              <a:shade val="95000"/>
+              <a:satMod val="105000"/>
+            </a:schemeClr>
+          </a:solidFill>
+          <a:prstDash val="solid"/>
+        </a:ln>
+        <a:ln w="25400" cap="flat" cmpd="sng" algn="ctr">
+          <a:solidFill>
+            <a:schemeClr val="phClr"/>
+          </a:solidFill>
+          <a:prstDash val="solid"/>
+        </a:ln>
+        <a:ln w="38100" cap="flat" cmpd="sng" algn="ctr">
+          <a:solidFill>
+            <a:schemeClr val="phClr"/>
+          </a:solidFill>
+          <a:prstDash val="solid"/>
+        </a:ln>
+      </a:lnStyleLst>
+      <a:effectStyleLst>
+        <a:effectStyle>
+          <a:effectLst>
+            <a:outerShdw blurRad="40000" dist="20000" dir="5400000" rotWithShape="0">
+              <a:srgbClr val="000000">
+                <a:alpha val="38000"/>
+              </a:srgbClr>
+            </a:outerShdw>
+          </a:effectLst>
+        </a:effectStyle>
+        <a:effectStyle>
+          <a:effectLst>
+            <a:outerShdw blurRad="40000" dist="23000" dir="5400000" rotWithShape="0">
+              <a:srgbClr val="000000">
+                <a:alpha val="35000"/>
+              </a:srgbClr>
+            </a:outerShdw>
+          </a:effectLst>
+        </a:effectStyle>
+        <a:effectStyle>
+          <a:effectLst>
+            <a:outerShdw blurRad="40000" dist="23000" dir="5400000" rotWithShape="0">
+              <a:srgbClr val="000000">
+                <a:alpha val="35000"/>
+              </a:srgbClr>
+            </a:outerShdw>
+          </a:effectLst>
+          <a:scene3d>
+            <a:camera prst="orthographicFront">
+              <a:rot lat="0" lon="0" rev="0"/>
+            </a:camera>
+            <a:lightRig rig="threePt" dir="t">
+              <a:rot lat="0" lon="0" rev="1200000"/>
+            </a:lightRig>
+          </a:scene3d>
+          <a:sp3d>
+            <a:bevelT w="63500" h="25400"/>
+          </a:sp3d>
+        </a:effectStyle>
+      </a:effectStyleLst>
+      <a:bgFillStyleLst>
+        <a:solidFill>
+          <a:schemeClr val="phClr"/>
+        </a:solidFill>
+        <a:gradFill rotWithShape="1">
+          <a:gsLst>
+            <a:gs pos="0">
+              <a:schemeClr val="phClr">
+                <a:tint val="40000"/>
+                <a:satMod val="350000"/>
+              </a:schemeClr>
+            </a:gs>
+            <a:gs pos="40000">
+              <a:schemeClr val="phClr">
+                <a:tint val="45000"/>
+                <a:shade val="99000"/>
+                <a:satMod val="350000"/>
+              </a:schemeClr>
+            </a:gs>
+            <a:gs pos="100000">
+              <a:schemeClr val="phClr">
+                <a:shade val="20000"/>
+                <a:satMod val="255000"/>
+              </a:schemeClr>
+            </a:gs>
+          </a:gsLst>
+          <a:path path="circle">
+            <a:fillToRect l="50000" t="-80000" r="50000" b="180000"/>
+          </a:path>
+        </a:gradFill>
+        <a:gradFill rotWithShape="1">
+          <a:gsLst>
+            <a:gs pos="0">
+              <a:schemeClr val="phClr">
+                <a:tint val="80000"/>
+                <a:satMod val="300000"/>
+              </a:schemeClr>
+            </a:gs>
+            <a:gs pos="100000">
+              <a:schemeClr val="phClr">
+                <a:shade val="30000"/>
+                <a:satMod val="200000"/>
+              </a:schemeClr>
+            </a:gs>
+          </a:gsLst>
+          <a:path path="circle">
+            <a:fillToRect l="50000" t="50000" r="50000" b="50000"/>
+          </a:path>
+        </a:gradFill>
+      </a:bgFillStyleLst>
+    </a:fmtScheme>
+  </a:themeElements>
+</a:theme>
 </file>
</xml_diff>